<commit_message>
UPDATE ppt and xls
Spreadsheet tool is updated
Ppt tech present is updated
Only points are covered in ppt
</commit_message>
<xml_diff>
--- a/PFlammam - Lucia V1 rev3/PFlammam - Lucia V1 - technical presentation.pptx
+++ b/PFlammam - Lucia V1 rev3/PFlammam - Lucia V1 - technical presentation.pptx
@@ -363,7 +363,7 @@
           <a:p>
             <a:fld id="{DB28F327-BEE5-45AC-9CE6-84AF0ACB1493}" type="slidenum">
               <a:rPr lang="es-MX" smtClean="0"/>
-              <a:t>‹Nº›</a:t>
+              <a:t>‹#›</a:t>
             </a:fld>
             <a:endParaRPr lang="es-MX"/>
           </a:p>
@@ -578,7 +578,7 @@
           <p:cNvPr id="2" name="Título 1">
             <a:extLst>
               <a:ext uri="{FF2B5EF4-FFF2-40B4-BE49-F238E27FC236}">
-                <a16:creationId xmlns:a16="http://schemas.microsoft.com/office/drawing/2014/main" id="{C68F5251-D223-BC64-D677-1BEF02B6E87F}"/>
+                <a16:creationId xmlns="" xmlns:a16="http://schemas.microsoft.com/office/drawing/2014/main" id="{C68F5251-D223-BC64-D677-1BEF02B6E87F}"/>
               </a:ext>
             </a:extLst>
           </p:cNvPr>
@@ -616,7 +616,7 @@
           <p:cNvPr id="3" name="Subtítulo 2">
             <a:extLst>
               <a:ext uri="{FF2B5EF4-FFF2-40B4-BE49-F238E27FC236}">
-                <a16:creationId xmlns:a16="http://schemas.microsoft.com/office/drawing/2014/main" id="{3F4A65FE-8D2A-DD67-B7B2-6214BCC7FFB3}"/>
+                <a16:creationId xmlns="" xmlns:a16="http://schemas.microsoft.com/office/drawing/2014/main" id="{3F4A65FE-8D2A-DD67-B7B2-6214BCC7FFB3}"/>
               </a:ext>
             </a:extLst>
           </p:cNvPr>
@@ -687,7 +687,7 @@
           <p:cNvPr id="4" name="Marcador de fecha 3">
             <a:extLst>
               <a:ext uri="{FF2B5EF4-FFF2-40B4-BE49-F238E27FC236}">
-                <a16:creationId xmlns:a16="http://schemas.microsoft.com/office/drawing/2014/main" id="{464258EB-91E8-2924-CBD4-96B87E7215B3}"/>
+                <a16:creationId xmlns="" xmlns:a16="http://schemas.microsoft.com/office/drawing/2014/main" id="{464258EB-91E8-2924-CBD4-96B87E7215B3}"/>
               </a:ext>
             </a:extLst>
           </p:cNvPr>
@@ -716,7 +716,7 @@
           <p:cNvPr id="5" name="Marcador de pie de página 4">
             <a:extLst>
               <a:ext uri="{FF2B5EF4-FFF2-40B4-BE49-F238E27FC236}">
-                <a16:creationId xmlns:a16="http://schemas.microsoft.com/office/drawing/2014/main" id="{DE84EB14-DDAA-D28A-7BDC-5CA4FD1477E1}"/>
+                <a16:creationId xmlns="" xmlns:a16="http://schemas.microsoft.com/office/drawing/2014/main" id="{DE84EB14-DDAA-D28A-7BDC-5CA4FD1477E1}"/>
               </a:ext>
             </a:extLst>
           </p:cNvPr>
@@ -741,7 +741,7 @@
           <p:cNvPr id="6" name="Marcador de número de diapositiva 5">
             <a:extLst>
               <a:ext uri="{FF2B5EF4-FFF2-40B4-BE49-F238E27FC236}">
-                <a16:creationId xmlns:a16="http://schemas.microsoft.com/office/drawing/2014/main" id="{020C777D-DB97-B69E-A018-FD1F6A2F2EA2}"/>
+                <a16:creationId xmlns="" xmlns:a16="http://schemas.microsoft.com/office/drawing/2014/main" id="{020C777D-DB97-B69E-A018-FD1F6A2F2EA2}"/>
               </a:ext>
             </a:extLst>
           </p:cNvPr>
@@ -759,7 +759,7 @@
           <a:p>
             <a:fld id="{404251BF-4705-4018-84B9-81FA3FF8E3D2}" type="slidenum">
               <a:rPr lang="es-MX" smtClean="0"/>
-              <a:t>‹Nº›</a:t>
+              <a:t>‹#›</a:t>
             </a:fld>
             <a:endParaRPr lang="es-MX"/>
           </a:p>
@@ -800,7 +800,7 @@
           <p:cNvPr id="2" name="Título 1">
             <a:extLst>
               <a:ext uri="{FF2B5EF4-FFF2-40B4-BE49-F238E27FC236}">
-                <a16:creationId xmlns:a16="http://schemas.microsoft.com/office/drawing/2014/main" id="{885B19B8-5854-260F-CB96-1B6829523669}"/>
+                <a16:creationId xmlns="" xmlns:a16="http://schemas.microsoft.com/office/drawing/2014/main" id="{885B19B8-5854-260F-CB96-1B6829523669}"/>
               </a:ext>
             </a:extLst>
           </p:cNvPr>
@@ -829,7 +829,7 @@
           <p:cNvPr id="3" name="Marcador de texto vertical 2">
             <a:extLst>
               <a:ext uri="{FF2B5EF4-FFF2-40B4-BE49-F238E27FC236}">
-                <a16:creationId xmlns:a16="http://schemas.microsoft.com/office/drawing/2014/main" id="{EA8F2339-935A-BA50-6D17-C11D9A50303F}"/>
+                <a16:creationId xmlns="" xmlns:a16="http://schemas.microsoft.com/office/drawing/2014/main" id="{EA8F2339-935A-BA50-6D17-C11D9A50303F}"/>
               </a:ext>
             </a:extLst>
           </p:cNvPr>
@@ -887,7 +887,7 @@
           <p:cNvPr id="4" name="Marcador de fecha 3">
             <a:extLst>
               <a:ext uri="{FF2B5EF4-FFF2-40B4-BE49-F238E27FC236}">
-                <a16:creationId xmlns:a16="http://schemas.microsoft.com/office/drawing/2014/main" id="{C0D93516-4160-7AF2-1AD2-1717A1759DF3}"/>
+                <a16:creationId xmlns="" xmlns:a16="http://schemas.microsoft.com/office/drawing/2014/main" id="{C0D93516-4160-7AF2-1AD2-1717A1759DF3}"/>
               </a:ext>
             </a:extLst>
           </p:cNvPr>
@@ -916,7 +916,7 @@
           <p:cNvPr id="5" name="Marcador de pie de página 4">
             <a:extLst>
               <a:ext uri="{FF2B5EF4-FFF2-40B4-BE49-F238E27FC236}">
-                <a16:creationId xmlns:a16="http://schemas.microsoft.com/office/drawing/2014/main" id="{18C2BD7C-43C5-6A6A-2A56-049FECED01E8}"/>
+                <a16:creationId xmlns="" xmlns:a16="http://schemas.microsoft.com/office/drawing/2014/main" id="{18C2BD7C-43C5-6A6A-2A56-049FECED01E8}"/>
               </a:ext>
             </a:extLst>
           </p:cNvPr>
@@ -941,7 +941,7 @@
           <p:cNvPr id="6" name="Marcador de número de diapositiva 5">
             <a:extLst>
               <a:ext uri="{FF2B5EF4-FFF2-40B4-BE49-F238E27FC236}">
-                <a16:creationId xmlns:a16="http://schemas.microsoft.com/office/drawing/2014/main" id="{C702C113-1630-F4FE-6B7A-DE6028EAF0DC}"/>
+                <a16:creationId xmlns="" xmlns:a16="http://schemas.microsoft.com/office/drawing/2014/main" id="{C702C113-1630-F4FE-6B7A-DE6028EAF0DC}"/>
               </a:ext>
             </a:extLst>
           </p:cNvPr>
@@ -959,7 +959,7 @@
           <a:p>
             <a:fld id="{404251BF-4705-4018-84B9-81FA3FF8E3D2}" type="slidenum">
               <a:rPr lang="es-MX" smtClean="0"/>
-              <a:t>‹Nº›</a:t>
+              <a:t>‹#›</a:t>
             </a:fld>
             <a:endParaRPr lang="es-MX"/>
           </a:p>
@@ -1000,7 +1000,7 @@
           <p:cNvPr id="2" name="Título vertical 1">
             <a:extLst>
               <a:ext uri="{FF2B5EF4-FFF2-40B4-BE49-F238E27FC236}">
-                <a16:creationId xmlns:a16="http://schemas.microsoft.com/office/drawing/2014/main" id="{35FD6614-0E5D-8F5D-E64C-B2F5267FAFB7}"/>
+                <a16:creationId xmlns="" xmlns:a16="http://schemas.microsoft.com/office/drawing/2014/main" id="{35FD6614-0E5D-8F5D-E64C-B2F5267FAFB7}"/>
               </a:ext>
             </a:extLst>
           </p:cNvPr>
@@ -1034,7 +1034,7 @@
           <p:cNvPr id="3" name="Marcador de texto vertical 2">
             <a:extLst>
               <a:ext uri="{FF2B5EF4-FFF2-40B4-BE49-F238E27FC236}">
-                <a16:creationId xmlns:a16="http://schemas.microsoft.com/office/drawing/2014/main" id="{CF0EED13-C02A-F3ED-C589-DF5EF8C49BD7}"/>
+                <a16:creationId xmlns="" xmlns:a16="http://schemas.microsoft.com/office/drawing/2014/main" id="{CF0EED13-C02A-F3ED-C589-DF5EF8C49BD7}"/>
               </a:ext>
             </a:extLst>
           </p:cNvPr>
@@ -1097,7 +1097,7 @@
           <p:cNvPr id="4" name="Marcador de fecha 3">
             <a:extLst>
               <a:ext uri="{FF2B5EF4-FFF2-40B4-BE49-F238E27FC236}">
-                <a16:creationId xmlns:a16="http://schemas.microsoft.com/office/drawing/2014/main" id="{EB7BDC0A-C2D7-3843-E6F7-DF6981CF3BDF}"/>
+                <a16:creationId xmlns="" xmlns:a16="http://schemas.microsoft.com/office/drawing/2014/main" id="{EB7BDC0A-C2D7-3843-E6F7-DF6981CF3BDF}"/>
               </a:ext>
             </a:extLst>
           </p:cNvPr>
@@ -1126,7 +1126,7 @@
           <p:cNvPr id="5" name="Marcador de pie de página 4">
             <a:extLst>
               <a:ext uri="{FF2B5EF4-FFF2-40B4-BE49-F238E27FC236}">
-                <a16:creationId xmlns:a16="http://schemas.microsoft.com/office/drawing/2014/main" id="{9F55993D-DADC-BB7C-FB1A-9828BFA237F6}"/>
+                <a16:creationId xmlns="" xmlns:a16="http://schemas.microsoft.com/office/drawing/2014/main" id="{9F55993D-DADC-BB7C-FB1A-9828BFA237F6}"/>
               </a:ext>
             </a:extLst>
           </p:cNvPr>
@@ -1151,7 +1151,7 @@
           <p:cNvPr id="6" name="Marcador de número de diapositiva 5">
             <a:extLst>
               <a:ext uri="{FF2B5EF4-FFF2-40B4-BE49-F238E27FC236}">
-                <a16:creationId xmlns:a16="http://schemas.microsoft.com/office/drawing/2014/main" id="{3BAFEC26-7124-8F71-80CD-4C6F3E3DC2A2}"/>
+                <a16:creationId xmlns="" xmlns:a16="http://schemas.microsoft.com/office/drawing/2014/main" id="{3BAFEC26-7124-8F71-80CD-4C6F3E3DC2A2}"/>
               </a:ext>
             </a:extLst>
           </p:cNvPr>
@@ -1169,7 +1169,7 @@
           <a:p>
             <a:fld id="{404251BF-4705-4018-84B9-81FA3FF8E3D2}" type="slidenum">
               <a:rPr lang="es-MX" smtClean="0"/>
-              <a:t>‹Nº›</a:t>
+              <a:t>‹#›</a:t>
             </a:fld>
             <a:endParaRPr lang="es-MX"/>
           </a:p>
@@ -1210,7 +1210,7 @@
           <p:cNvPr id="2" name="Título 1">
             <a:extLst>
               <a:ext uri="{FF2B5EF4-FFF2-40B4-BE49-F238E27FC236}">
-                <a16:creationId xmlns:a16="http://schemas.microsoft.com/office/drawing/2014/main" id="{7D2E4EE2-F889-3074-9997-AF6C4F9D6A83}"/>
+                <a16:creationId xmlns="" xmlns:a16="http://schemas.microsoft.com/office/drawing/2014/main" id="{7D2E4EE2-F889-3074-9997-AF6C4F9D6A83}"/>
               </a:ext>
             </a:extLst>
           </p:cNvPr>
@@ -1239,7 +1239,7 @@
           <p:cNvPr id="3" name="Marcador de contenido 2">
             <a:extLst>
               <a:ext uri="{FF2B5EF4-FFF2-40B4-BE49-F238E27FC236}">
-                <a16:creationId xmlns:a16="http://schemas.microsoft.com/office/drawing/2014/main" id="{C236082A-49F3-8097-81BB-B8BDD75B747C}"/>
+                <a16:creationId xmlns="" xmlns:a16="http://schemas.microsoft.com/office/drawing/2014/main" id="{C236082A-49F3-8097-81BB-B8BDD75B747C}"/>
               </a:ext>
             </a:extLst>
           </p:cNvPr>
@@ -1297,7 +1297,7 @@
           <p:cNvPr id="4" name="Marcador de fecha 3">
             <a:extLst>
               <a:ext uri="{FF2B5EF4-FFF2-40B4-BE49-F238E27FC236}">
-                <a16:creationId xmlns:a16="http://schemas.microsoft.com/office/drawing/2014/main" id="{1FBF5EA1-958A-FE14-14ED-F5DDBBF4E116}"/>
+                <a16:creationId xmlns="" xmlns:a16="http://schemas.microsoft.com/office/drawing/2014/main" id="{1FBF5EA1-958A-FE14-14ED-F5DDBBF4E116}"/>
               </a:ext>
             </a:extLst>
           </p:cNvPr>
@@ -1326,7 +1326,7 @@
           <p:cNvPr id="5" name="Marcador de pie de página 4">
             <a:extLst>
               <a:ext uri="{FF2B5EF4-FFF2-40B4-BE49-F238E27FC236}">
-                <a16:creationId xmlns:a16="http://schemas.microsoft.com/office/drawing/2014/main" id="{DBB1B2F9-BA97-397C-0A95-CF66A84143A0}"/>
+                <a16:creationId xmlns="" xmlns:a16="http://schemas.microsoft.com/office/drawing/2014/main" id="{DBB1B2F9-BA97-397C-0A95-CF66A84143A0}"/>
               </a:ext>
             </a:extLst>
           </p:cNvPr>
@@ -1351,7 +1351,7 @@
           <p:cNvPr id="6" name="Marcador de número de diapositiva 5">
             <a:extLst>
               <a:ext uri="{FF2B5EF4-FFF2-40B4-BE49-F238E27FC236}">
-                <a16:creationId xmlns:a16="http://schemas.microsoft.com/office/drawing/2014/main" id="{DE2F542E-A793-5753-EA04-A2D047EE8D73}"/>
+                <a16:creationId xmlns="" xmlns:a16="http://schemas.microsoft.com/office/drawing/2014/main" id="{DE2F542E-A793-5753-EA04-A2D047EE8D73}"/>
               </a:ext>
             </a:extLst>
           </p:cNvPr>
@@ -1369,7 +1369,7 @@
           <a:p>
             <a:fld id="{404251BF-4705-4018-84B9-81FA3FF8E3D2}" type="slidenum">
               <a:rPr lang="es-MX" smtClean="0"/>
-              <a:t>‹Nº›</a:t>
+              <a:t>‹#›</a:t>
             </a:fld>
             <a:endParaRPr lang="es-MX"/>
           </a:p>
@@ -1410,7 +1410,7 @@
           <p:cNvPr id="2" name="Título 1">
             <a:extLst>
               <a:ext uri="{FF2B5EF4-FFF2-40B4-BE49-F238E27FC236}">
-                <a16:creationId xmlns:a16="http://schemas.microsoft.com/office/drawing/2014/main" id="{C12F8EC0-6FE4-21EE-0999-41500DA69A5D}"/>
+                <a16:creationId xmlns="" xmlns:a16="http://schemas.microsoft.com/office/drawing/2014/main" id="{C12F8EC0-6FE4-21EE-0999-41500DA69A5D}"/>
               </a:ext>
             </a:extLst>
           </p:cNvPr>
@@ -1448,7 +1448,7 @@
           <p:cNvPr id="3" name="Marcador de texto 2">
             <a:extLst>
               <a:ext uri="{FF2B5EF4-FFF2-40B4-BE49-F238E27FC236}">
-                <a16:creationId xmlns:a16="http://schemas.microsoft.com/office/drawing/2014/main" id="{AAFEFE82-C496-46BF-24AD-3A2E4C024B34}"/>
+                <a16:creationId xmlns="" xmlns:a16="http://schemas.microsoft.com/office/drawing/2014/main" id="{AAFEFE82-C496-46BF-24AD-3A2E4C024B34}"/>
               </a:ext>
             </a:extLst>
           </p:cNvPr>
@@ -1573,7 +1573,7 @@
           <p:cNvPr id="4" name="Marcador de fecha 3">
             <a:extLst>
               <a:ext uri="{FF2B5EF4-FFF2-40B4-BE49-F238E27FC236}">
-                <a16:creationId xmlns:a16="http://schemas.microsoft.com/office/drawing/2014/main" id="{66983407-AB5D-BF9A-FBAB-084762521C54}"/>
+                <a16:creationId xmlns="" xmlns:a16="http://schemas.microsoft.com/office/drawing/2014/main" id="{66983407-AB5D-BF9A-FBAB-084762521C54}"/>
               </a:ext>
             </a:extLst>
           </p:cNvPr>
@@ -1602,7 +1602,7 @@
           <p:cNvPr id="5" name="Marcador de pie de página 4">
             <a:extLst>
               <a:ext uri="{FF2B5EF4-FFF2-40B4-BE49-F238E27FC236}">
-                <a16:creationId xmlns:a16="http://schemas.microsoft.com/office/drawing/2014/main" id="{A4091B16-700E-54A4-365B-884593DAECF3}"/>
+                <a16:creationId xmlns="" xmlns:a16="http://schemas.microsoft.com/office/drawing/2014/main" id="{A4091B16-700E-54A4-365B-884593DAECF3}"/>
               </a:ext>
             </a:extLst>
           </p:cNvPr>
@@ -1627,7 +1627,7 @@
           <p:cNvPr id="6" name="Marcador de número de diapositiva 5">
             <a:extLst>
               <a:ext uri="{FF2B5EF4-FFF2-40B4-BE49-F238E27FC236}">
-                <a16:creationId xmlns:a16="http://schemas.microsoft.com/office/drawing/2014/main" id="{617E1B6B-5F0B-DA12-3F53-D096E1224374}"/>
+                <a16:creationId xmlns="" xmlns:a16="http://schemas.microsoft.com/office/drawing/2014/main" id="{617E1B6B-5F0B-DA12-3F53-D096E1224374}"/>
               </a:ext>
             </a:extLst>
           </p:cNvPr>
@@ -1645,7 +1645,7 @@
           <a:p>
             <a:fld id="{404251BF-4705-4018-84B9-81FA3FF8E3D2}" type="slidenum">
               <a:rPr lang="es-MX" smtClean="0"/>
-              <a:t>‹Nº›</a:t>
+              <a:t>‹#›</a:t>
             </a:fld>
             <a:endParaRPr lang="es-MX"/>
           </a:p>
@@ -1686,7 +1686,7 @@
           <p:cNvPr id="2" name="Título 1">
             <a:extLst>
               <a:ext uri="{FF2B5EF4-FFF2-40B4-BE49-F238E27FC236}">
-                <a16:creationId xmlns:a16="http://schemas.microsoft.com/office/drawing/2014/main" id="{917BE101-93AD-A4F6-2218-966EEAA06938}"/>
+                <a16:creationId xmlns="" xmlns:a16="http://schemas.microsoft.com/office/drawing/2014/main" id="{917BE101-93AD-A4F6-2218-966EEAA06938}"/>
               </a:ext>
             </a:extLst>
           </p:cNvPr>
@@ -1715,7 +1715,7 @@
           <p:cNvPr id="3" name="Marcador de contenido 2">
             <a:extLst>
               <a:ext uri="{FF2B5EF4-FFF2-40B4-BE49-F238E27FC236}">
-                <a16:creationId xmlns:a16="http://schemas.microsoft.com/office/drawing/2014/main" id="{D927AB96-2137-7115-C296-851F579A94C7}"/>
+                <a16:creationId xmlns="" xmlns:a16="http://schemas.microsoft.com/office/drawing/2014/main" id="{D927AB96-2137-7115-C296-851F579A94C7}"/>
               </a:ext>
             </a:extLst>
           </p:cNvPr>
@@ -1778,7 +1778,7 @@
           <p:cNvPr id="4" name="Marcador de contenido 3">
             <a:extLst>
               <a:ext uri="{FF2B5EF4-FFF2-40B4-BE49-F238E27FC236}">
-                <a16:creationId xmlns:a16="http://schemas.microsoft.com/office/drawing/2014/main" id="{85653190-5E9F-C666-A5CA-E5400CDB9916}"/>
+                <a16:creationId xmlns="" xmlns:a16="http://schemas.microsoft.com/office/drawing/2014/main" id="{85653190-5E9F-C666-A5CA-E5400CDB9916}"/>
               </a:ext>
             </a:extLst>
           </p:cNvPr>
@@ -1841,7 +1841,7 @@
           <p:cNvPr id="5" name="Marcador de fecha 4">
             <a:extLst>
               <a:ext uri="{FF2B5EF4-FFF2-40B4-BE49-F238E27FC236}">
-                <a16:creationId xmlns:a16="http://schemas.microsoft.com/office/drawing/2014/main" id="{2287A35D-19C4-6423-2182-6F7AEF7D868A}"/>
+                <a16:creationId xmlns="" xmlns:a16="http://schemas.microsoft.com/office/drawing/2014/main" id="{2287A35D-19C4-6423-2182-6F7AEF7D868A}"/>
               </a:ext>
             </a:extLst>
           </p:cNvPr>
@@ -1870,7 +1870,7 @@
           <p:cNvPr id="6" name="Marcador de pie de página 5">
             <a:extLst>
               <a:ext uri="{FF2B5EF4-FFF2-40B4-BE49-F238E27FC236}">
-                <a16:creationId xmlns:a16="http://schemas.microsoft.com/office/drawing/2014/main" id="{6A20EBBC-FFE4-BF34-584D-1103DDD1E59B}"/>
+                <a16:creationId xmlns="" xmlns:a16="http://schemas.microsoft.com/office/drawing/2014/main" id="{6A20EBBC-FFE4-BF34-584D-1103DDD1E59B}"/>
               </a:ext>
             </a:extLst>
           </p:cNvPr>
@@ -1895,7 +1895,7 @@
           <p:cNvPr id="7" name="Marcador de número de diapositiva 6">
             <a:extLst>
               <a:ext uri="{FF2B5EF4-FFF2-40B4-BE49-F238E27FC236}">
-                <a16:creationId xmlns:a16="http://schemas.microsoft.com/office/drawing/2014/main" id="{32069CD5-9784-24F5-FD3F-2CE7FEEEAFA5}"/>
+                <a16:creationId xmlns="" xmlns:a16="http://schemas.microsoft.com/office/drawing/2014/main" id="{32069CD5-9784-24F5-FD3F-2CE7FEEEAFA5}"/>
               </a:ext>
             </a:extLst>
           </p:cNvPr>
@@ -1913,7 +1913,7 @@
           <a:p>
             <a:fld id="{404251BF-4705-4018-84B9-81FA3FF8E3D2}" type="slidenum">
               <a:rPr lang="es-MX" smtClean="0"/>
-              <a:t>‹Nº›</a:t>
+              <a:t>‹#›</a:t>
             </a:fld>
             <a:endParaRPr lang="es-MX"/>
           </a:p>
@@ -1954,7 +1954,7 @@
           <p:cNvPr id="2" name="Título 1">
             <a:extLst>
               <a:ext uri="{FF2B5EF4-FFF2-40B4-BE49-F238E27FC236}">
-                <a16:creationId xmlns:a16="http://schemas.microsoft.com/office/drawing/2014/main" id="{0AC6574D-AD08-47C4-E8FA-8F244F9BFAFD}"/>
+                <a16:creationId xmlns="" xmlns:a16="http://schemas.microsoft.com/office/drawing/2014/main" id="{0AC6574D-AD08-47C4-E8FA-8F244F9BFAFD}"/>
               </a:ext>
             </a:extLst>
           </p:cNvPr>
@@ -1988,7 +1988,7 @@
           <p:cNvPr id="3" name="Marcador de texto 2">
             <a:extLst>
               <a:ext uri="{FF2B5EF4-FFF2-40B4-BE49-F238E27FC236}">
-                <a16:creationId xmlns:a16="http://schemas.microsoft.com/office/drawing/2014/main" id="{20EF632E-3FF8-7DD5-F21D-8CB63B8FEDFA}"/>
+                <a16:creationId xmlns="" xmlns:a16="http://schemas.microsoft.com/office/drawing/2014/main" id="{20EF632E-3FF8-7DD5-F21D-8CB63B8FEDFA}"/>
               </a:ext>
             </a:extLst>
           </p:cNvPr>
@@ -2059,7 +2059,7 @@
           <p:cNvPr id="4" name="Marcador de contenido 3">
             <a:extLst>
               <a:ext uri="{FF2B5EF4-FFF2-40B4-BE49-F238E27FC236}">
-                <a16:creationId xmlns:a16="http://schemas.microsoft.com/office/drawing/2014/main" id="{AFA83C99-17BF-FB92-B9A6-6B9D02FA248F}"/>
+                <a16:creationId xmlns="" xmlns:a16="http://schemas.microsoft.com/office/drawing/2014/main" id="{AFA83C99-17BF-FB92-B9A6-6B9D02FA248F}"/>
               </a:ext>
             </a:extLst>
           </p:cNvPr>
@@ -2122,7 +2122,7 @@
           <p:cNvPr id="5" name="Marcador de texto 4">
             <a:extLst>
               <a:ext uri="{FF2B5EF4-FFF2-40B4-BE49-F238E27FC236}">
-                <a16:creationId xmlns:a16="http://schemas.microsoft.com/office/drawing/2014/main" id="{5FE508B0-6C5A-C9B0-FC6B-343EBA1D78DE}"/>
+                <a16:creationId xmlns="" xmlns:a16="http://schemas.microsoft.com/office/drawing/2014/main" id="{5FE508B0-6C5A-C9B0-FC6B-343EBA1D78DE}"/>
               </a:ext>
             </a:extLst>
           </p:cNvPr>
@@ -2193,7 +2193,7 @@
           <p:cNvPr id="6" name="Marcador de contenido 5">
             <a:extLst>
               <a:ext uri="{FF2B5EF4-FFF2-40B4-BE49-F238E27FC236}">
-                <a16:creationId xmlns:a16="http://schemas.microsoft.com/office/drawing/2014/main" id="{10B9C372-15AA-19D9-9B22-DB1573661A8F}"/>
+                <a16:creationId xmlns="" xmlns:a16="http://schemas.microsoft.com/office/drawing/2014/main" id="{10B9C372-15AA-19D9-9B22-DB1573661A8F}"/>
               </a:ext>
             </a:extLst>
           </p:cNvPr>
@@ -2256,7 +2256,7 @@
           <p:cNvPr id="7" name="Marcador de fecha 6">
             <a:extLst>
               <a:ext uri="{FF2B5EF4-FFF2-40B4-BE49-F238E27FC236}">
-                <a16:creationId xmlns:a16="http://schemas.microsoft.com/office/drawing/2014/main" id="{46408DFA-ED9B-85E0-43F4-D76EC22CA284}"/>
+                <a16:creationId xmlns="" xmlns:a16="http://schemas.microsoft.com/office/drawing/2014/main" id="{46408DFA-ED9B-85E0-43F4-D76EC22CA284}"/>
               </a:ext>
             </a:extLst>
           </p:cNvPr>
@@ -2285,7 +2285,7 @@
           <p:cNvPr id="8" name="Marcador de pie de página 7">
             <a:extLst>
               <a:ext uri="{FF2B5EF4-FFF2-40B4-BE49-F238E27FC236}">
-                <a16:creationId xmlns:a16="http://schemas.microsoft.com/office/drawing/2014/main" id="{B616F6DF-AA3E-072D-4717-93B1D48354DD}"/>
+                <a16:creationId xmlns="" xmlns:a16="http://schemas.microsoft.com/office/drawing/2014/main" id="{B616F6DF-AA3E-072D-4717-93B1D48354DD}"/>
               </a:ext>
             </a:extLst>
           </p:cNvPr>
@@ -2310,7 +2310,7 @@
           <p:cNvPr id="9" name="Marcador de número de diapositiva 8">
             <a:extLst>
               <a:ext uri="{FF2B5EF4-FFF2-40B4-BE49-F238E27FC236}">
-                <a16:creationId xmlns:a16="http://schemas.microsoft.com/office/drawing/2014/main" id="{09AB09DC-E5C6-7D7D-977D-8340C0737E4D}"/>
+                <a16:creationId xmlns="" xmlns:a16="http://schemas.microsoft.com/office/drawing/2014/main" id="{09AB09DC-E5C6-7D7D-977D-8340C0737E4D}"/>
               </a:ext>
             </a:extLst>
           </p:cNvPr>
@@ -2328,7 +2328,7 @@
           <a:p>
             <a:fld id="{404251BF-4705-4018-84B9-81FA3FF8E3D2}" type="slidenum">
               <a:rPr lang="es-MX" smtClean="0"/>
-              <a:t>‹Nº›</a:t>
+              <a:t>‹#›</a:t>
             </a:fld>
             <a:endParaRPr lang="es-MX"/>
           </a:p>
@@ -2369,7 +2369,7 @@
           <p:cNvPr id="2" name="Título 1">
             <a:extLst>
               <a:ext uri="{FF2B5EF4-FFF2-40B4-BE49-F238E27FC236}">
-                <a16:creationId xmlns:a16="http://schemas.microsoft.com/office/drawing/2014/main" id="{08011C47-A5E1-52D3-713F-69DAB3CBE5A3}"/>
+                <a16:creationId xmlns="" xmlns:a16="http://schemas.microsoft.com/office/drawing/2014/main" id="{08011C47-A5E1-52D3-713F-69DAB3CBE5A3}"/>
               </a:ext>
             </a:extLst>
           </p:cNvPr>
@@ -2398,7 +2398,7 @@
           <p:cNvPr id="3" name="Marcador de fecha 2">
             <a:extLst>
               <a:ext uri="{FF2B5EF4-FFF2-40B4-BE49-F238E27FC236}">
-                <a16:creationId xmlns:a16="http://schemas.microsoft.com/office/drawing/2014/main" id="{1C518C19-B858-A8DC-36D3-86800D8685BC}"/>
+                <a16:creationId xmlns="" xmlns:a16="http://schemas.microsoft.com/office/drawing/2014/main" id="{1C518C19-B858-A8DC-36D3-86800D8685BC}"/>
               </a:ext>
             </a:extLst>
           </p:cNvPr>
@@ -2427,7 +2427,7 @@
           <p:cNvPr id="4" name="Marcador de pie de página 3">
             <a:extLst>
               <a:ext uri="{FF2B5EF4-FFF2-40B4-BE49-F238E27FC236}">
-                <a16:creationId xmlns:a16="http://schemas.microsoft.com/office/drawing/2014/main" id="{41F53B55-5D75-1FD8-7305-4050FDD68411}"/>
+                <a16:creationId xmlns="" xmlns:a16="http://schemas.microsoft.com/office/drawing/2014/main" id="{41F53B55-5D75-1FD8-7305-4050FDD68411}"/>
               </a:ext>
             </a:extLst>
           </p:cNvPr>
@@ -2452,7 +2452,7 @@
           <p:cNvPr id="5" name="Marcador de número de diapositiva 4">
             <a:extLst>
               <a:ext uri="{FF2B5EF4-FFF2-40B4-BE49-F238E27FC236}">
-                <a16:creationId xmlns:a16="http://schemas.microsoft.com/office/drawing/2014/main" id="{500FEE24-67A8-7C20-546D-BCEB3EEE2CC7}"/>
+                <a16:creationId xmlns="" xmlns:a16="http://schemas.microsoft.com/office/drawing/2014/main" id="{500FEE24-67A8-7C20-546D-BCEB3EEE2CC7}"/>
               </a:ext>
             </a:extLst>
           </p:cNvPr>
@@ -2470,7 +2470,7 @@
           <a:p>
             <a:fld id="{404251BF-4705-4018-84B9-81FA3FF8E3D2}" type="slidenum">
               <a:rPr lang="es-MX" smtClean="0"/>
-              <a:t>‹Nº›</a:t>
+              <a:t>‹#›</a:t>
             </a:fld>
             <a:endParaRPr lang="es-MX"/>
           </a:p>
@@ -2511,7 +2511,7 @@
           <p:cNvPr id="2" name="Marcador de fecha 1">
             <a:extLst>
               <a:ext uri="{FF2B5EF4-FFF2-40B4-BE49-F238E27FC236}">
-                <a16:creationId xmlns:a16="http://schemas.microsoft.com/office/drawing/2014/main" id="{DE40A591-B9B4-C1D0-2520-DB39CAD388E6}"/>
+                <a16:creationId xmlns="" xmlns:a16="http://schemas.microsoft.com/office/drawing/2014/main" id="{DE40A591-B9B4-C1D0-2520-DB39CAD388E6}"/>
               </a:ext>
             </a:extLst>
           </p:cNvPr>
@@ -2540,7 +2540,7 @@
           <p:cNvPr id="3" name="Marcador de pie de página 2">
             <a:extLst>
               <a:ext uri="{FF2B5EF4-FFF2-40B4-BE49-F238E27FC236}">
-                <a16:creationId xmlns:a16="http://schemas.microsoft.com/office/drawing/2014/main" id="{59DB7BC8-513F-96E7-0F35-8CDD700E2FC2}"/>
+                <a16:creationId xmlns="" xmlns:a16="http://schemas.microsoft.com/office/drawing/2014/main" id="{59DB7BC8-513F-96E7-0F35-8CDD700E2FC2}"/>
               </a:ext>
             </a:extLst>
           </p:cNvPr>
@@ -2565,7 +2565,7 @@
           <p:cNvPr id="4" name="Marcador de número de diapositiva 3">
             <a:extLst>
               <a:ext uri="{FF2B5EF4-FFF2-40B4-BE49-F238E27FC236}">
-                <a16:creationId xmlns:a16="http://schemas.microsoft.com/office/drawing/2014/main" id="{7AE4AC45-E002-BEEB-8B8E-44514FE6BF11}"/>
+                <a16:creationId xmlns="" xmlns:a16="http://schemas.microsoft.com/office/drawing/2014/main" id="{7AE4AC45-E002-BEEB-8B8E-44514FE6BF11}"/>
               </a:ext>
             </a:extLst>
           </p:cNvPr>
@@ -2583,7 +2583,7 @@
           <a:p>
             <a:fld id="{404251BF-4705-4018-84B9-81FA3FF8E3D2}" type="slidenum">
               <a:rPr lang="es-MX" smtClean="0"/>
-              <a:t>‹Nº›</a:t>
+              <a:t>‹#›</a:t>
             </a:fld>
             <a:endParaRPr lang="es-MX"/>
           </a:p>
@@ -2624,7 +2624,7 @@
           <p:cNvPr id="2" name="Título 1">
             <a:extLst>
               <a:ext uri="{FF2B5EF4-FFF2-40B4-BE49-F238E27FC236}">
-                <a16:creationId xmlns:a16="http://schemas.microsoft.com/office/drawing/2014/main" id="{A6FC0222-34BC-EBA6-7A21-952CD9074429}"/>
+                <a16:creationId xmlns="" xmlns:a16="http://schemas.microsoft.com/office/drawing/2014/main" id="{A6FC0222-34BC-EBA6-7A21-952CD9074429}"/>
               </a:ext>
             </a:extLst>
           </p:cNvPr>
@@ -2662,7 +2662,7 @@
           <p:cNvPr id="3" name="Marcador de contenido 2">
             <a:extLst>
               <a:ext uri="{FF2B5EF4-FFF2-40B4-BE49-F238E27FC236}">
-                <a16:creationId xmlns:a16="http://schemas.microsoft.com/office/drawing/2014/main" id="{1B2DED37-96F5-2838-76FF-E8FC4633590A}"/>
+                <a16:creationId xmlns="" xmlns:a16="http://schemas.microsoft.com/office/drawing/2014/main" id="{1B2DED37-96F5-2838-76FF-E8FC4633590A}"/>
               </a:ext>
             </a:extLst>
           </p:cNvPr>
@@ -2753,7 +2753,7 @@
           <p:cNvPr id="4" name="Marcador de texto 3">
             <a:extLst>
               <a:ext uri="{FF2B5EF4-FFF2-40B4-BE49-F238E27FC236}">
-                <a16:creationId xmlns:a16="http://schemas.microsoft.com/office/drawing/2014/main" id="{F7204234-1783-9477-4B7F-9E1C2285F215}"/>
+                <a16:creationId xmlns="" xmlns:a16="http://schemas.microsoft.com/office/drawing/2014/main" id="{F7204234-1783-9477-4B7F-9E1C2285F215}"/>
               </a:ext>
             </a:extLst>
           </p:cNvPr>
@@ -2824,7 +2824,7 @@
           <p:cNvPr id="5" name="Marcador de fecha 4">
             <a:extLst>
               <a:ext uri="{FF2B5EF4-FFF2-40B4-BE49-F238E27FC236}">
-                <a16:creationId xmlns:a16="http://schemas.microsoft.com/office/drawing/2014/main" id="{E4AB8F47-7E0B-AC5B-B99B-1397BBF4E1B0}"/>
+                <a16:creationId xmlns="" xmlns:a16="http://schemas.microsoft.com/office/drawing/2014/main" id="{E4AB8F47-7E0B-AC5B-B99B-1397BBF4E1B0}"/>
               </a:ext>
             </a:extLst>
           </p:cNvPr>
@@ -2853,7 +2853,7 @@
           <p:cNvPr id="6" name="Marcador de pie de página 5">
             <a:extLst>
               <a:ext uri="{FF2B5EF4-FFF2-40B4-BE49-F238E27FC236}">
-                <a16:creationId xmlns:a16="http://schemas.microsoft.com/office/drawing/2014/main" id="{27444E72-2B34-6E35-EB8C-540D1757191F}"/>
+                <a16:creationId xmlns="" xmlns:a16="http://schemas.microsoft.com/office/drawing/2014/main" id="{27444E72-2B34-6E35-EB8C-540D1757191F}"/>
               </a:ext>
             </a:extLst>
           </p:cNvPr>
@@ -2878,7 +2878,7 @@
           <p:cNvPr id="7" name="Marcador de número de diapositiva 6">
             <a:extLst>
               <a:ext uri="{FF2B5EF4-FFF2-40B4-BE49-F238E27FC236}">
-                <a16:creationId xmlns:a16="http://schemas.microsoft.com/office/drawing/2014/main" id="{BA0BA796-5219-8949-D532-E68CFCD5B791}"/>
+                <a16:creationId xmlns="" xmlns:a16="http://schemas.microsoft.com/office/drawing/2014/main" id="{BA0BA796-5219-8949-D532-E68CFCD5B791}"/>
               </a:ext>
             </a:extLst>
           </p:cNvPr>
@@ -2896,7 +2896,7 @@
           <a:p>
             <a:fld id="{404251BF-4705-4018-84B9-81FA3FF8E3D2}" type="slidenum">
               <a:rPr lang="es-MX" smtClean="0"/>
-              <a:t>‹Nº›</a:t>
+              <a:t>‹#›</a:t>
             </a:fld>
             <a:endParaRPr lang="es-MX"/>
           </a:p>
@@ -2937,7 +2937,7 @@
           <p:cNvPr id="2" name="Título 1">
             <a:extLst>
               <a:ext uri="{FF2B5EF4-FFF2-40B4-BE49-F238E27FC236}">
-                <a16:creationId xmlns:a16="http://schemas.microsoft.com/office/drawing/2014/main" id="{DF931805-E0DF-1EF9-C110-CAC93E17C24B}"/>
+                <a16:creationId xmlns="" xmlns:a16="http://schemas.microsoft.com/office/drawing/2014/main" id="{DF931805-E0DF-1EF9-C110-CAC93E17C24B}"/>
               </a:ext>
             </a:extLst>
           </p:cNvPr>
@@ -2975,7 +2975,7 @@
           <p:cNvPr id="3" name="Marcador de posición de imagen 2">
             <a:extLst>
               <a:ext uri="{FF2B5EF4-FFF2-40B4-BE49-F238E27FC236}">
-                <a16:creationId xmlns:a16="http://schemas.microsoft.com/office/drawing/2014/main" id="{D13ACECD-8E37-357C-8FBF-04124CEBC472}"/>
+                <a16:creationId xmlns="" xmlns:a16="http://schemas.microsoft.com/office/drawing/2014/main" id="{D13ACECD-8E37-357C-8FBF-04124CEBC472}"/>
               </a:ext>
             </a:extLst>
           </p:cNvPr>
@@ -3042,7 +3042,7 @@
           <p:cNvPr id="4" name="Marcador de texto 3">
             <a:extLst>
               <a:ext uri="{FF2B5EF4-FFF2-40B4-BE49-F238E27FC236}">
-                <a16:creationId xmlns:a16="http://schemas.microsoft.com/office/drawing/2014/main" id="{A76933F9-CE62-7A51-2526-EF47F52B49CD}"/>
+                <a16:creationId xmlns="" xmlns:a16="http://schemas.microsoft.com/office/drawing/2014/main" id="{A76933F9-CE62-7A51-2526-EF47F52B49CD}"/>
               </a:ext>
             </a:extLst>
           </p:cNvPr>
@@ -3113,7 +3113,7 @@
           <p:cNvPr id="5" name="Marcador de fecha 4">
             <a:extLst>
               <a:ext uri="{FF2B5EF4-FFF2-40B4-BE49-F238E27FC236}">
-                <a16:creationId xmlns:a16="http://schemas.microsoft.com/office/drawing/2014/main" id="{61295AB3-0527-0650-4A5E-8E39C3FEBC5F}"/>
+                <a16:creationId xmlns="" xmlns:a16="http://schemas.microsoft.com/office/drawing/2014/main" id="{61295AB3-0527-0650-4A5E-8E39C3FEBC5F}"/>
               </a:ext>
             </a:extLst>
           </p:cNvPr>
@@ -3142,7 +3142,7 @@
           <p:cNvPr id="6" name="Marcador de pie de página 5">
             <a:extLst>
               <a:ext uri="{FF2B5EF4-FFF2-40B4-BE49-F238E27FC236}">
-                <a16:creationId xmlns:a16="http://schemas.microsoft.com/office/drawing/2014/main" id="{EC74B01D-04E3-41D7-9835-5139255EA9B1}"/>
+                <a16:creationId xmlns="" xmlns:a16="http://schemas.microsoft.com/office/drawing/2014/main" id="{EC74B01D-04E3-41D7-9835-5139255EA9B1}"/>
               </a:ext>
             </a:extLst>
           </p:cNvPr>
@@ -3167,7 +3167,7 @@
           <p:cNvPr id="7" name="Marcador de número de diapositiva 6">
             <a:extLst>
               <a:ext uri="{FF2B5EF4-FFF2-40B4-BE49-F238E27FC236}">
-                <a16:creationId xmlns:a16="http://schemas.microsoft.com/office/drawing/2014/main" id="{09D3E2DD-D6F1-4D4F-8C0B-D77DCA7B4F41}"/>
+                <a16:creationId xmlns="" xmlns:a16="http://schemas.microsoft.com/office/drawing/2014/main" id="{09D3E2DD-D6F1-4D4F-8C0B-D77DCA7B4F41}"/>
               </a:ext>
             </a:extLst>
           </p:cNvPr>
@@ -3185,7 +3185,7 @@
           <a:p>
             <a:fld id="{404251BF-4705-4018-84B9-81FA3FF8E3D2}" type="slidenum">
               <a:rPr lang="es-MX" smtClean="0"/>
-              <a:t>‹Nº›</a:t>
+              <a:t>‹#›</a:t>
             </a:fld>
             <a:endParaRPr lang="es-MX"/>
           </a:p>
@@ -3231,7 +3231,7 @@
           <p:cNvPr id="2" name="Marcador de título 1">
             <a:extLst>
               <a:ext uri="{FF2B5EF4-FFF2-40B4-BE49-F238E27FC236}">
-                <a16:creationId xmlns:a16="http://schemas.microsoft.com/office/drawing/2014/main" id="{D700FFC7-6AF2-7718-31AD-61B3B9EAFA0E}"/>
+                <a16:creationId xmlns="" xmlns:a16="http://schemas.microsoft.com/office/drawing/2014/main" id="{D700FFC7-6AF2-7718-31AD-61B3B9EAFA0E}"/>
               </a:ext>
             </a:extLst>
           </p:cNvPr>
@@ -3270,7 +3270,7 @@
           <p:cNvPr id="3" name="Marcador de texto 2">
             <a:extLst>
               <a:ext uri="{FF2B5EF4-FFF2-40B4-BE49-F238E27FC236}">
-                <a16:creationId xmlns:a16="http://schemas.microsoft.com/office/drawing/2014/main" id="{D0845A47-E640-38C6-B77C-4374D64C3E73}"/>
+                <a16:creationId xmlns="" xmlns:a16="http://schemas.microsoft.com/office/drawing/2014/main" id="{D0845A47-E640-38C6-B77C-4374D64C3E73}"/>
               </a:ext>
             </a:extLst>
           </p:cNvPr>
@@ -3338,7 +3338,7 @@
           <p:cNvPr id="4" name="Marcador de fecha 3">
             <a:extLst>
               <a:ext uri="{FF2B5EF4-FFF2-40B4-BE49-F238E27FC236}">
-                <a16:creationId xmlns:a16="http://schemas.microsoft.com/office/drawing/2014/main" id="{BA621615-6EE4-8999-4974-FC8345B0F043}"/>
+                <a16:creationId xmlns="" xmlns:a16="http://schemas.microsoft.com/office/drawing/2014/main" id="{BA621615-6EE4-8999-4974-FC8345B0F043}"/>
               </a:ext>
             </a:extLst>
           </p:cNvPr>
@@ -3385,7 +3385,7 @@
           <p:cNvPr id="5" name="Marcador de pie de página 4">
             <a:extLst>
               <a:ext uri="{FF2B5EF4-FFF2-40B4-BE49-F238E27FC236}">
-                <a16:creationId xmlns:a16="http://schemas.microsoft.com/office/drawing/2014/main" id="{1453D141-D99F-08DF-89A5-CE133A10F331}"/>
+                <a16:creationId xmlns="" xmlns:a16="http://schemas.microsoft.com/office/drawing/2014/main" id="{1453D141-D99F-08DF-89A5-CE133A10F331}"/>
               </a:ext>
             </a:extLst>
           </p:cNvPr>
@@ -3428,7 +3428,7 @@
           <p:cNvPr id="6" name="Marcador de número de diapositiva 5">
             <a:extLst>
               <a:ext uri="{FF2B5EF4-FFF2-40B4-BE49-F238E27FC236}">
-                <a16:creationId xmlns:a16="http://schemas.microsoft.com/office/drawing/2014/main" id="{E4B33CF8-1115-CD03-F7AD-24C3565823E7}"/>
+                <a16:creationId xmlns="" xmlns:a16="http://schemas.microsoft.com/office/drawing/2014/main" id="{E4B33CF8-1115-CD03-F7AD-24C3565823E7}"/>
               </a:ext>
             </a:extLst>
           </p:cNvPr>
@@ -3464,7 +3464,7 @@
           <a:p>
             <a:fld id="{404251BF-4705-4018-84B9-81FA3FF8E3D2}" type="slidenum">
               <a:rPr lang="es-MX" smtClean="0"/>
-              <a:t>‹Nº›</a:t>
+              <a:t>‹#›</a:t>
             </a:fld>
             <a:endParaRPr lang="es-MX"/>
           </a:p>
@@ -3796,7 +3796,7 @@
           <p:cNvPr id="9" name="Imagen 8">
             <a:extLst>
               <a:ext uri="{FF2B5EF4-FFF2-40B4-BE49-F238E27FC236}">
-                <a16:creationId xmlns:a16="http://schemas.microsoft.com/office/drawing/2014/main" id="{6635DCF3-F7E3-2C45-9336-47CAE85718A4}"/>
+                <a16:creationId xmlns="" xmlns:a16="http://schemas.microsoft.com/office/drawing/2014/main" id="{6635DCF3-F7E3-2C45-9336-47CAE85718A4}"/>
               </a:ext>
             </a:extLst>
           </p:cNvPr>
@@ -3825,7 +3825,7 @@
           <p:cNvPr id="2" name="Título 1">
             <a:extLst>
               <a:ext uri="{FF2B5EF4-FFF2-40B4-BE49-F238E27FC236}">
-                <a16:creationId xmlns:a16="http://schemas.microsoft.com/office/drawing/2014/main" id="{5EF8233C-F3DA-2ABC-9288-4BCD7433344C}"/>
+                <a16:creationId xmlns="" xmlns:a16="http://schemas.microsoft.com/office/drawing/2014/main" id="{5EF8233C-F3DA-2ABC-9288-4BCD7433344C}"/>
               </a:ext>
             </a:extLst>
           </p:cNvPr>
@@ -3900,7 +3900,7 @@
           <p:cNvPr id="3" name="Subtítulo 2">
             <a:extLst>
               <a:ext uri="{FF2B5EF4-FFF2-40B4-BE49-F238E27FC236}">
-                <a16:creationId xmlns:a16="http://schemas.microsoft.com/office/drawing/2014/main" id="{EC6C3CBE-087A-6EFC-794A-BF6D55DB7543}"/>
+                <a16:creationId xmlns="" xmlns:a16="http://schemas.microsoft.com/office/drawing/2014/main" id="{EC6C3CBE-087A-6EFC-794A-BF6D55DB7543}"/>
               </a:ext>
             </a:extLst>
           </p:cNvPr>
@@ -3961,7 +3961,7 @@
           <p:cNvPr id="12" name="Subtítulo 2">
             <a:extLst>
               <a:ext uri="{FF2B5EF4-FFF2-40B4-BE49-F238E27FC236}">
-                <a16:creationId xmlns:a16="http://schemas.microsoft.com/office/drawing/2014/main" id="{ECC718EC-22DC-2FC1-E7BF-660F4465FB20}"/>
+                <a16:creationId xmlns="" xmlns:a16="http://schemas.microsoft.com/office/drawing/2014/main" id="{ECC718EC-22DC-2FC1-E7BF-660F4465FB20}"/>
               </a:ext>
             </a:extLst>
           </p:cNvPr>
@@ -4164,7 +4164,7 @@
           <p:cNvPr id="1028" name="Picture 4" descr="Uanl vector logo - Uanl logo vector free download">
             <a:extLst>
               <a:ext uri="{FF2B5EF4-FFF2-40B4-BE49-F238E27FC236}">
-                <a16:creationId xmlns:a16="http://schemas.microsoft.com/office/drawing/2014/main" id="{A1EF89F4-4576-B62D-20F9-D2FF8A2E246A}"/>
+                <a16:creationId xmlns="" xmlns:a16="http://schemas.microsoft.com/office/drawing/2014/main" id="{A1EF89F4-4576-B62D-20F9-D2FF8A2E246A}"/>
               </a:ext>
             </a:extLst>
           </p:cNvPr>
@@ -4174,7 +4174,7 @@
           <p:nvPr/>
         </p:nvPicPr>
         <p:blipFill>
-          <a:blip r:embed="rId4">
+          <a:blip r:embed="rId4" cstate="print">
             <a:extLst>
               <a:ext uri="{28A0092B-C50C-407E-A947-70E740481C1C}">
                 <a14:useLocalDpi xmlns:a14="http://schemas.microsoft.com/office/drawing/2010/main" val="0"/>
@@ -4211,7 +4211,7 @@
           <p:cNvPr id="17" name="Grupo 16">
             <a:extLst>
               <a:ext uri="{FF2B5EF4-FFF2-40B4-BE49-F238E27FC236}">
-                <a16:creationId xmlns:a16="http://schemas.microsoft.com/office/drawing/2014/main" id="{BD8C79D3-8F40-4825-FCB3-7DA537F5D17C}"/>
+                <a16:creationId xmlns="" xmlns:a16="http://schemas.microsoft.com/office/drawing/2014/main" id="{BD8C79D3-8F40-4825-FCB3-7DA537F5D17C}"/>
               </a:ext>
             </a:extLst>
           </p:cNvPr>
@@ -4231,7 +4231,7 @@
             <p:cNvPr id="14" name="Grupo 13">
               <a:extLst>
                 <a:ext uri="{FF2B5EF4-FFF2-40B4-BE49-F238E27FC236}">
-                  <a16:creationId xmlns:a16="http://schemas.microsoft.com/office/drawing/2014/main" id="{7618CDC3-6984-FA21-1D90-EF5639665330}"/>
+                  <a16:creationId xmlns="" xmlns:a16="http://schemas.microsoft.com/office/drawing/2014/main" id="{7618CDC3-6984-FA21-1D90-EF5639665330}"/>
                 </a:ext>
               </a:extLst>
             </p:cNvPr>
@@ -4251,7 +4251,7 @@
               <p:cNvPr id="1034" name="Picture 10" descr="Universidad Autónoma de Nuevo León">
                 <a:extLst>
                   <a:ext uri="{FF2B5EF4-FFF2-40B4-BE49-F238E27FC236}">
-                    <a16:creationId xmlns:a16="http://schemas.microsoft.com/office/drawing/2014/main" id="{614962FF-F8BC-8C60-D531-371C411ED902}"/>
+                    <a16:creationId xmlns="" xmlns:a16="http://schemas.microsoft.com/office/drawing/2014/main" id="{614962FF-F8BC-8C60-D531-371C411ED902}"/>
                   </a:ext>
                 </a:extLst>
               </p:cNvPr>
@@ -4298,7 +4298,7 @@
               <p:cNvPr id="1036" name="Picture 12" descr="Fisico Matematico Logo Símbolos Coloridos De La Matemáticas 3d Stock">
                 <a:extLst>
                   <a:ext uri="{FF2B5EF4-FFF2-40B4-BE49-F238E27FC236}">
-                    <a16:creationId xmlns:a16="http://schemas.microsoft.com/office/drawing/2014/main" id="{9DCF93C1-4712-9517-4CC0-A6074B26C461}"/>
+                    <a16:creationId xmlns="" xmlns:a16="http://schemas.microsoft.com/office/drawing/2014/main" id="{9DCF93C1-4712-9517-4CC0-A6074B26C461}"/>
                   </a:ext>
                 </a:extLst>
               </p:cNvPr>
@@ -4308,7 +4308,7 @@
               <p:nvPr/>
             </p:nvPicPr>
             <p:blipFill rotWithShape="1">
-              <a:blip r:embed="rId6">
+              <a:blip r:embed="rId6" cstate="print">
                 <a:extLst>
                   <a:ext uri="{28A0092B-C50C-407E-A947-70E740481C1C}">
                     <a14:useLocalDpi xmlns:a14="http://schemas.microsoft.com/office/drawing/2010/main" val="0"/>
@@ -4344,7 +4344,7 @@
             <p:cNvPr id="16" name="Imagen 15" descr="Logotipo, nombre de la empresa&#10;&#10;El contenido generado por IA puede ser incorrecto.">
               <a:extLst>
                 <a:ext uri="{FF2B5EF4-FFF2-40B4-BE49-F238E27FC236}">
-                  <a16:creationId xmlns:a16="http://schemas.microsoft.com/office/drawing/2014/main" id="{75D454CB-F38D-CAA4-CC76-179590684C55}"/>
+                  <a16:creationId xmlns="" xmlns:a16="http://schemas.microsoft.com/office/drawing/2014/main" id="{75D454CB-F38D-CAA4-CC76-179590684C55}"/>
                 </a:ext>
               </a:extLst>
             </p:cNvPr>
@@ -4354,7 +4354,7 @@
             <p:nvPr/>
           </p:nvPicPr>
           <p:blipFill>
-            <a:blip r:embed="rId7">
+            <a:blip r:embed="rId7" cstate="print">
               <a:extLst>
                 <a:ext uri="{28A0092B-C50C-407E-A947-70E740481C1C}">
                   <a14:useLocalDpi xmlns:a14="http://schemas.microsoft.com/office/drawing/2010/main" val="0"/>
@@ -4386,6 +4386,13 @@
   <p:clrMapOvr>
     <a:masterClrMapping/>
   </p:clrMapOvr>
+  <p:timing>
+    <p:tnLst>
+      <p:par>
+        <p:cTn id="1" dur="indefinite" restart="never" nodeType="tmRoot"/>
+      </p:par>
+    </p:tnLst>
+  </p:timing>
 </p:sld>
 </file>
 
@@ -4411,7 +4418,7 @@
           <p:cNvPr id="2" name="Título 1">
             <a:extLst>
               <a:ext uri="{FF2B5EF4-FFF2-40B4-BE49-F238E27FC236}">
-                <a16:creationId xmlns:a16="http://schemas.microsoft.com/office/drawing/2014/main" id="{7C97405F-E812-8ECA-0FBF-DE395633D086}"/>
+                <a16:creationId xmlns="" xmlns:a16="http://schemas.microsoft.com/office/drawing/2014/main" id="{7C97405F-E812-8ECA-0FBF-DE395633D086}"/>
               </a:ext>
             </a:extLst>
           </p:cNvPr>
@@ -4444,7 +4451,7 @@
           <p:cNvPr id="3" name="Marcador de contenido 2">
             <a:extLst>
               <a:ext uri="{FF2B5EF4-FFF2-40B4-BE49-F238E27FC236}">
-                <a16:creationId xmlns:a16="http://schemas.microsoft.com/office/drawing/2014/main" id="{4895F9A4-5583-A4D7-2C26-2C99E36AFD03}"/>
+                <a16:creationId xmlns="" xmlns:a16="http://schemas.microsoft.com/office/drawing/2014/main" id="{4895F9A4-5583-A4D7-2C26-2C99E36AFD03}"/>
               </a:ext>
             </a:extLst>
           </p:cNvPr>
@@ -4587,7 +4594,7 @@
           <p:cNvPr id="11" name="Imagen 10">
             <a:extLst>
               <a:ext uri="{FF2B5EF4-FFF2-40B4-BE49-F238E27FC236}">
-                <a16:creationId xmlns:a16="http://schemas.microsoft.com/office/drawing/2014/main" id="{0D66D670-FACF-9D43-855E-DD4781E3E832}"/>
+                <a16:creationId xmlns="" xmlns:a16="http://schemas.microsoft.com/office/drawing/2014/main" id="{0D66D670-FACF-9D43-855E-DD4781E3E832}"/>
               </a:ext>
             </a:extLst>
           </p:cNvPr>
@@ -4621,6 +4628,13 @@
   <p:clrMapOvr>
     <a:masterClrMapping/>
   </p:clrMapOvr>
+  <p:timing>
+    <p:tnLst>
+      <p:par>
+        <p:cTn id="1" dur="indefinite" restart="never" nodeType="tmRoot"/>
+      </p:par>
+    </p:tnLst>
+  </p:timing>
 </p:sld>
 </file>
 
@@ -4646,7 +4660,7 @@
           <p:cNvPr id="2" name="Título 1">
             <a:extLst>
               <a:ext uri="{FF2B5EF4-FFF2-40B4-BE49-F238E27FC236}">
-                <a16:creationId xmlns:a16="http://schemas.microsoft.com/office/drawing/2014/main" id="{670F0C23-FE50-8839-B107-C21CD5459C01}"/>
+                <a16:creationId xmlns="" xmlns:a16="http://schemas.microsoft.com/office/drawing/2014/main" id="{670F0C23-FE50-8839-B107-C21CD5459C01}"/>
               </a:ext>
             </a:extLst>
           </p:cNvPr>
@@ -4692,7 +4706,7 @@
           <p:cNvPr id="3" name="Marcador de contenido 2">
             <a:extLst>
               <a:ext uri="{FF2B5EF4-FFF2-40B4-BE49-F238E27FC236}">
-                <a16:creationId xmlns:a16="http://schemas.microsoft.com/office/drawing/2014/main" id="{3D773A57-4E75-6D1E-BD6A-ACA49DF5A864}"/>
+                <a16:creationId xmlns="" xmlns:a16="http://schemas.microsoft.com/office/drawing/2014/main" id="{3D773A57-4E75-6D1E-BD6A-ACA49DF5A864}"/>
               </a:ext>
             </a:extLst>
           </p:cNvPr>
@@ -4777,7 +4791,7 @@
           <p:cNvPr id="4" name="Marcador de contenido 3">
             <a:extLst>
               <a:ext uri="{FF2B5EF4-FFF2-40B4-BE49-F238E27FC236}">
-                <a16:creationId xmlns:a16="http://schemas.microsoft.com/office/drawing/2014/main" id="{3AE55076-95D7-6938-72E0-C14CE7451679}"/>
+                <a16:creationId xmlns="" xmlns:a16="http://schemas.microsoft.com/office/drawing/2014/main" id="{3AE55076-95D7-6938-72E0-C14CE7451679}"/>
               </a:ext>
             </a:extLst>
           </p:cNvPr>
@@ -4890,12 +4904,23 @@
               <a:t> o </a:t>
             </a:r>
             <a:r>
-              <a:rPr lang="es-MX" sz="2600" i="1" dirty="0">
+              <a:rPr lang="es-MX" sz="2600" i="1" dirty="0" smtClean="0">
                 <a:latin typeface="Times New Roman" panose="02020603050405020304" pitchFamily="18" charset="0"/>
                 <a:cs typeface="Times New Roman" panose="02020603050405020304" pitchFamily="18" charset="0"/>
               </a:rPr>
-              <a:t>L.</a:t>
-            </a:r>
+              <a:t>L</a:t>
+            </a:r>
+            <a:r>
+              <a:rPr lang="es-MX" sz="2600" dirty="0" smtClean="0">
+                <a:latin typeface="Times New Roman" panose="02020603050405020304" pitchFamily="18" charset="0"/>
+                <a:cs typeface="Times New Roman" panose="02020603050405020304" pitchFamily="18" charset="0"/>
+              </a:rPr>
+              <a:t> y modificaciones a motor resultante.</a:t>
+            </a:r>
+            <a:endParaRPr lang="es-MX" sz="2600" i="1" dirty="0">
+              <a:latin typeface="Times New Roman" panose="02020603050405020304" pitchFamily="18" charset="0"/>
+              <a:cs typeface="Times New Roman" panose="02020603050405020304" pitchFamily="18" charset="0"/>
+            </a:endParaRPr>
           </a:p>
         </p:txBody>
       </p:sp>
@@ -4904,7 +4929,7 @@
           <p:cNvPr id="5" name="Tabla 4">
             <a:extLst>
               <a:ext uri="{FF2B5EF4-FFF2-40B4-BE49-F238E27FC236}">
-                <a16:creationId xmlns:a16="http://schemas.microsoft.com/office/drawing/2014/main" id="{3F889370-93F9-1314-1BDB-2E9965A626D3}"/>
+                <a16:creationId xmlns="" xmlns:a16="http://schemas.microsoft.com/office/drawing/2014/main" id="{3F889370-93F9-1314-1BDB-2E9965A626D3}"/>
               </a:ext>
             </a:extLst>
           </p:cNvPr>
@@ -4914,7 +4939,7 @@
           <p:nvPr>
             <p:extLst>
               <p:ext uri="{D42A27DB-BD31-4B8C-83A1-F6EECF244321}">
-                <p14:modId xmlns:p14="http://schemas.microsoft.com/office/powerpoint/2010/main" val="3286646447"/>
+                <p14:modId xmlns:p14="http://schemas.microsoft.com/office/powerpoint/2010/main" val="2793726023"/>
               </p:ext>
             </p:extLst>
           </p:nvPr>
@@ -4933,35 +4958,35 @@
                 <a:gridCol w="805862">
                   <a:extLst>
                     <a:ext uri="{9D8B030D-6E8A-4147-A177-3AD203B41FA5}">
-                      <a16:colId xmlns:a16="http://schemas.microsoft.com/office/drawing/2014/main" val="2750924333"/>
+                      <a16:colId xmlns="" xmlns:a16="http://schemas.microsoft.com/office/drawing/2014/main" val="2750924333"/>
                     </a:ext>
                   </a:extLst>
                 </a:gridCol>
                 <a:gridCol w="929594">
                   <a:extLst>
                     <a:ext uri="{9D8B030D-6E8A-4147-A177-3AD203B41FA5}">
-                      <a16:colId xmlns:a16="http://schemas.microsoft.com/office/drawing/2014/main" val="3380261392"/>
+                      <a16:colId xmlns="" xmlns:a16="http://schemas.microsoft.com/office/drawing/2014/main" val="3380261392"/>
                     </a:ext>
                   </a:extLst>
                 </a:gridCol>
                 <a:gridCol w="1005840">
                   <a:extLst>
                     <a:ext uri="{9D8B030D-6E8A-4147-A177-3AD203B41FA5}">
-                      <a16:colId xmlns:a16="http://schemas.microsoft.com/office/drawing/2014/main" val="1252838564"/>
+                      <a16:colId xmlns="" xmlns:a16="http://schemas.microsoft.com/office/drawing/2014/main" val="1252838564"/>
                     </a:ext>
                   </a:extLst>
                 </a:gridCol>
                 <a:gridCol w="994410">
                   <a:extLst>
                     <a:ext uri="{9D8B030D-6E8A-4147-A177-3AD203B41FA5}">
-                      <a16:colId xmlns:a16="http://schemas.microsoft.com/office/drawing/2014/main" val="3201789192"/>
+                      <a16:colId xmlns="" xmlns:a16="http://schemas.microsoft.com/office/drawing/2014/main" val="3201789192"/>
                     </a:ext>
                   </a:extLst>
                 </a:gridCol>
                 <a:gridCol w="1123949">
                   <a:extLst>
                     <a:ext uri="{9D8B030D-6E8A-4147-A177-3AD203B41FA5}">
-                      <a16:colId xmlns:a16="http://schemas.microsoft.com/office/drawing/2014/main" val="3139399000"/>
+                      <a16:colId xmlns="" xmlns:a16="http://schemas.microsoft.com/office/drawing/2014/main" val="3139399000"/>
                     </a:ext>
                   </a:extLst>
                 </a:gridCol>
@@ -4973,7 +4998,10 @@
                     <a:lstStyle/>
                     <a:p>
                       <a:r>
-                        <a:rPr lang="es-MX" dirty="0"/>
+                        <a:rPr lang="es-MX" dirty="0">
+                          <a:latin typeface="Times New Roman" panose="02020603050405020304" pitchFamily="18" charset="0"/>
+                          <a:cs typeface="Times New Roman" panose="02020603050405020304" pitchFamily="18" charset="0"/>
+                        </a:rPr>
                         <a:t>Tipo</a:t>
                       </a:r>
                     </a:p>
@@ -4996,7 +5024,10 @@
                     <a:lstStyle/>
                     <a:p>
                       <a:r>
-                        <a:rPr lang="es-MX" dirty="0"/>
+                        <a:rPr lang="es-MX" dirty="0">
+                          <a:latin typeface="Times New Roman" panose="02020603050405020304" pitchFamily="18" charset="0"/>
+                          <a:cs typeface="Times New Roman" panose="02020603050405020304" pitchFamily="18" charset="0"/>
+                        </a:rPr>
                         <a:t>Tiempo comb.</a:t>
                       </a:r>
                     </a:p>
@@ -5019,7 +5050,10 @@
                     <a:lstStyle/>
                     <a:p>
                       <a:r>
-                        <a:rPr lang="es-MX" dirty="0"/>
+                        <a:rPr lang="es-MX" dirty="0">
+                          <a:latin typeface="Times New Roman" panose="02020603050405020304" pitchFamily="18" charset="0"/>
+                          <a:cs typeface="Times New Roman" panose="02020603050405020304" pitchFamily="18" charset="0"/>
+                        </a:rPr>
                         <a:t>MEOP</a:t>
                       </a:r>
                     </a:p>
@@ -5042,11 +5076,17 @@
                     <a:lstStyle/>
                     <a:p>
                       <a:r>
-                        <a:rPr lang="es-MX" dirty="0" err="1"/>
+                        <a:rPr lang="es-MX" dirty="0" err="1">
+                          <a:latin typeface="Times New Roman" panose="02020603050405020304" pitchFamily="18" charset="0"/>
+                          <a:cs typeface="Times New Roman" panose="02020603050405020304" pitchFamily="18" charset="0"/>
+                        </a:rPr>
                         <a:t>Temp</a:t>
                       </a:r>
                       <a:r>
-                        <a:rPr lang="es-MX" dirty="0"/>
+                        <a:rPr lang="es-MX" dirty="0">
+                          <a:latin typeface="Times New Roman" panose="02020603050405020304" pitchFamily="18" charset="0"/>
+                          <a:cs typeface="Times New Roman" panose="02020603050405020304" pitchFamily="18" charset="0"/>
+                        </a:rPr>
                         <a:t>. comb.</a:t>
                       </a:r>
                     </a:p>
@@ -5069,7 +5109,10 @@
                     <a:lstStyle/>
                     <a:p>
                       <a:r>
-                        <a:rPr lang="es-MX" dirty="0"/>
+                        <a:rPr lang="es-MX" dirty="0">
+                          <a:latin typeface="Times New Roman" panose="02020603050405020304" pitchFamily="18" charset="0"/>
+                          <a:cs typeface="Times New Roman" panose="02020603050405020304" pitchFamily="18" charset="0"/>
+                        </a:rPr>
                         <a:t>Masa cargada</a:t>
                       </a:r>
                     </a:p>
@@ -5088,7 +5131,7 @@
                 </a:tc>
                 <a:extLst>
                   <a:ext uri="{0D108BD9-81ED-4DB2-BD59-A6C34878D82A}">
-                    <a16:rowId xmlns:a16="http://schemas.microsoft.com/office/drawing/2014/main" val="2526786794"/>
+                    <a16:rowId xmlns="" xmlns:a16="http://schemas.microsoft.com/office/drawing/2014/main" val="2526786794"/>
                   </a:ext>
                 </a:extLst>
               </a:tr>
@@ -5099,7 +5142,10 @@
                     <a:lstStyle/>
                     <a:p>
                       <a:r>
-                        <a:rPr lang="es-MX" dirty="0"/>
+                        <a:rPr lang="es-MX" dirty="0">
+                          <a:latin typeface="Times New Roman" panose="02020603050405020304" pitchFamily="18" charset="0"/>
+                          <a:cs typeface="Times New Roman" panose="02020603050405020304" pitchFamily="18" charset="0"/>
+                        </a:rPr>
                         <a:t>H465</a:t>
                       </a:r>
                     </a:p>
@@ -5122,7 +5168,10 @@
                     <a:lstStyle/>
                     <a:p>
                       <a:r>
-                        <a:rPr lang="es-MX" dirty="0"/>
+                        <a:rPr lang="es-MX" dirty="0">
+                          <a:latin typeface="Times New Roman" panose="02020603050405020304" pitchFamily="18" charset="0"/>
+                          <a:cs typeface="Times New Roman" panose="02020603050405020304" pitchFamily="18" charset="0"/>
+                        </a:rPr>
                         <a:t>0.423 s</a:t>
                       </a:r>
                     </a:p>
@@ -5145,7 +5194,10 @@
                     <a:lstStyle/>
                     <a:p>
                       <a:r>
-                        <a:rPr lang="es-MX" dirty="0"/>
+                        <a:rPr lang="es-MX" dirty="0">
+                          <a:latin typeface="Times New Roman" panose="02020603050405020304" pitchFamily="18" charset="0"/>
+                          <a:cs typeface="Times New Roman" panose="02020603050405020304" pitchFamily="18" charset="0"/>
+                        </a:rPr>
                         <a:t>5 MPa</a:t>
                       </a:r>
                     </a:p>
@@ -5168,7 +5220,10 @@
                     <a:lstStyle/>
                     <a:p>
                       <a:r>
-                        <a:rPr lang="es-MX" dirty="0"/>
+                        <a:rPr lang="es-MX" dirty="0">
+                          <a:latin typeface="Times New Roman" panose="02020603050405020304" pitchFamily="18" charset="0"/>
+                          <a:cs typeface="Times New Roman" panose="02020603050405020304" pitchFamily="18" charset="0"/>
+                        </a:rPr>
                         <a:t>1361°C</a:t>
                       </a:r>
                     </a:p>
@@ -5191,7 +5246,10 @@
                     <a:lstStyle/>
                     <a:p>
                       <a:r>
-                        <a:rPr lang="es-MX" dirty="0"/>
+                        <a:rPr lang="es-MX" dirty="0">
+                          <a:latin typeface="Times New Roman" panose="02020603050405020304" pitchFamily="18" charset="0"/>
+                          <a:cs typeface="Times New Roman" panose="02020603050405020304" pitchFamily="18" charset="0"/>
+                        </a:rPr>
                         <a:t>1.437 kg</a:t>
                       </a:r>
                     </a:p>
@@ -5210,7 +5268,7 @@
                 </a:tc>
                 <a:extLst>
                   <a:ext uri="{0D108BD9-81ED-4DB2-BD59-A6C34878D82A}">
-                    <a16:rowId xmlns:a16="http://schemas.microsoft.com/office/drawing/2014/main" val="2478043974"/>
+                    <a16:rowId xmlns="" xmlns:a16="http://schemas.microsoft.com/office/drawing/2014/main" val="2478043974"/>
                   </a:ext>
                 </a:extLst>
               </a:tr>
@@ -5228,6 +5286,13 @@
   <p:clrMapOvr>
     <a:masterClrMapping/>
   </p:clrMapOvr>
+  <p:timing>
+    <p:tnLst>
+      <p:par>
+        <p:cTn id="1" dur="indefinite" restart="never" nodeType="tmRoot"/>
+      </p:par>
+    </p:tnLst>
+  </p:timing>
 </p:sld>
 </file>
 
@@ -5253,7 +5318,7 @@
           <p:cNvPr id="2" name="Título 1">
             <a:extLst>
               <a:ext uri="{FF2B5EF4-FFF2-40B4-BE49-F238E27FC236}">
-                <a16:creationId xmlns:a16="http://schemas.microsoft.com/office/drawing/2014/main" id="{BAB3C702-D01F-22C8-A53B-ED6B01BB12EA}"/>
+                <a16:creationId xmlns="" xmlns:a16="http://schemas.microsoft.com/office/drawing/2014/main" id="{BAB3C702-D01F-22C8-A53B-ED6B01BB12EA}"/>
               </a:ext>
             </a:extLst>
           </p:cNvPr>
@@ -5283,7 +5348,7 @@
           <p:cNvPr id="3" name="Marcador de contenido 2">
             <a:extLst>
               <a:ext uri="{FF2B5EF4-FFF2-40B4-BE49-F238E27FC236}">
-                <a16:creationId xmlns:a16="http://schemas.microsoft.com/office/drawing/2014/main" id="{2D8CD9DD-E26B-97A0-50D8-9A66444B9BE2}"/>
+                <a16:creationId xmlns="" xmlns:a16="http://schemas.microsoft.com/office/drawing/2014/main" id="{2D8CD9DD-E26B-97A0-50D8-9A66444B9BE2}"/>
               </a:ext>
             </a:extLst>
           </p:cNvPr>
@@ -5371,6 +5436,13 @@
   <p:clrMapOvr>
     <a:masterClrMapping/>
   </p:clrMapOvr>
+  <p:timing>
+    <p:tnLst>
+      <p:par>
+        <p:cTn id="1" dur="indefinite" restart="never" nodeType="tmRoot"/>
+      </p:par>
+    </p:tnLst>
+  </p:timing>
 </p:sld>
 </file>
 
@@ -5382,7 +5454,7 @@
         <p:cNvPr id="1" name="">
           <a:extLst>
             <a:ext uri="{FF2B5EF4-FFF2-40B4-BE49-F238E27FC236}">
-              <a16:creationId xmlns:a16="http://schemas.microsoft.com/office/drawing/2014/main" id="{619A8279-F2C7-EF83-0B18-F69ED4157015}"/>
+              <a16:creationId xmlns="" xmlns:a16="http://schemas.microsoft.com/office/drawing/2014/main" id="{619A8279-F2C7-EF83-0B18-F69ED4157015}"/>
             </a:ext>
           </a:extLst>
         </p:cNvPr>
@@ -5402,7 +5474,7 @@
           <p:cNvPr id="2" name="Título 1">
             <a:extLst>
               <a:ext uri="{FF2B5EF4-FFF2-40B4-BE49-F238E27FC236}">
-                <a16:creationId xmlns:a16="http://schemas.microsoft.com/office/drawing/2014/main" id="{20D59896-C85B-852E-698C-D506FB62DF06}"/>
+                <a16:creationId xmlns="" xmlns:a16="http://schemas.microsoft.com/office/drawing/2014/main" id="{20D59896-C85B-852E-698C-D506FB62DF06}"/>
               </a:ext>
             </a:extLst>
           </p:cNvPr>
@@ -5432,7 +5504,7 @@
           <p:cNvPr id="3" name="Marcador de contenido 2">
             <a:extLst>
               <a:ext uri="{FF2B5EF4-FFF2-40B4-BE49-F238E27FC236}">
-                <a16:creationId xmlns:a16="http://schemas.microsoft.com/office/drawing/2014/main" id="{DE950F92-179A-6A18-9630-BAB1FD13673F}"/>
+                <a16:creationId xmlns="" xmlns:a16="http://schemas.microsoft.com/office/drawing/2014/main" id="{DE950F92-179A-6A18-9630-BAB1FD13673F}"/>
               </a:ext>
             </a:extLst>
           </p:cNvPr>
@@ -5445,7 +5517,9 @@
         </p:nvSpPr>
         <p:spPr/>
         <p:txBody>
-          <a:bodyPr/>
+          <a:bodyPr>
+            <a:normAutofit fontScale="70000" lnSpcReduction="20000"/>
+          </a:bodyPr>
           <a:lstStyle/>
           <a:p>
             <a:r>
@@ -5455,22 +5529,12 @@
           </a:p>
           <a:p>
             <a:r>
+              <a:rPr lang="es-MX" dirty="0" smtClean="0"/>
+              <a:t>MEOP</a:t>
+            </a:r>
+            <a:r>
               <a:rPr lang="es-MX" dirty="0"/>
-              <a:t>Materiales asequibles, propelente muy documentado, </a:t>
-            </a:r>
-            <a:r>
-              <a:rPr lang="es-MX" i="1" dirty="0"/>
-              <a:t>safety factor</a:t>
-            </a:r>
-            <a:r>
-              <a:rPr lang="es-MX" dirty="0"/>
-              <a:t> muy alto</a:t>
-            </a:r>
-          </a:p>
-          <a:p>
-            <a:r>
-              <a:rPr lang="es-MX" dirty="0"/>
-              <a:t>MEOP, material, dimensiones </a:t>
+              <a:t>, material, dimensiones </a:t>
             </a:r>
             <a:r>
               <a:rPr lang="es-MX" dirty="0" err="1"/>
@@ -5478,14 +5542,48 @@
             </a:r>
             <a:r>
               <a:rPr lang="es-MX" dirty="0"/>
-              <a:t>. Propuestas prop. Mecánicas iniciales</a:t>
-            </a:r>
+              <a:t>. Propuestas prop. Mecánicas </a:t>
+            </a:r>
+            <a:r>
+              <a:rPr lang="es-MX" dirty="0" smtClean="0"/>
+              <a:t>iniciales, safety factor, relación </a:t>
+            </a:r>
+            <a:r>
+              <a:rPr lang="es-MX" dirty="0" err="1" smtClean="0"/>
+              <a:t>Kn</a:t>
+            </a:r>
+            <a:r>
+              <a:rPr lang="es-MX" dirty="0" smtClean="0"/>
+              <a:t> y MEOP</a:t>
+            </a:r>
+            <a:endParaRPr lang="es-MX" dirty="0"/>
           </a:p>
           <a:p>
             <a:r>
               <a:rPr lang="es-MX" dirty="0"/>
-              <a:t>empuje T/W, tiempo comb, fijar diámetros por material</a:t>
-            </a:r>
+              <a:t>empuje T/W, tiempo comb, fijar diámetros por </a:t>
+            </a:r>
+            <a:r>
+              <a:rPr lang="es-MX" dirty="0" smtClean="0"/>
+              <a:t>material, </a:t>
+            </a:r>
+            <a:r>
+              <a:rPr lang="es-MX" dirty="0" err="1" smtClean="0"/>
+              <a:t>propelente</a:t>
+            </a:r>
+            <a:r>
+              <a:rPr lang="es-MX" dirty="0" smtClean="0"/>
+              <a:t> doc., ablativo, grafica Cf y masa de </a:t>
+            </a:r>
+            <a:r>
+              <a:rPr lang="es-MX" dirty="0" err="1" smtClean="0"/>
+              <a:t>comb</a:t>
+            </a:r>
+            <a:r>
+              <a:rPr lang="es-MX" dirty="0" smtClean="0"/>
+              <a:t> función MEOP</a:t>
+            </a:r>
+            <a:endParaRPr lang="es-MX" dirty="0"/>
           </a:p>
         </p:txBody>
       </p:sp>
@@ -5494,7 +5592,7 @@
           <p:cNvPr id="4" name="Marcador de contenido 3">
             <a:extLst>
               <a:ext uri="{FF2B5EF4-FFF2-40B4-BE49-F238E27FC236}">
-                <a16:creationId xmlns:a16="http://schemas.microsoft.com/office/drawing/2014/main" id="{A5CEACF8-E932-108E-7ABE-547DAAA851ED}"/>
+                <a16:creationId xmlns="" xmlns:a16="http://schemas.microsoft.com/office/drawing/2014/main" id="{A5CEACF8-E932-108E-7ABE-547DAAA851ED}"/>
               </a:ext>
             </a:extLst>
           </p:cNvPr>
@@ -5507,7 +5605,9 @@
         </p:nvSpPr>
         <p:spPr/>
         <p:txBody>
-          <a:bodyPr/>
+          <a:bodyPr>
+            <a:normAutofit fontScale="70000" lnSpcReduction="20000"/>
+          </a:bodyPr>
           <a:lstStyle/>
           <a:p>
             <a:r>
@@ -5528,8 +5628,104 @@
             </a:r>
             <a:r>
               <a:rPr lang="es-MX" dirty="0"/>
-              <a:t> necesario</a:t>
-            </a:r>
+              <a:t> </a:t>
+            </a:r>
+            <a:r>
+              <a:rPr lang="es-MX" dirty="0" smtClean="0"/>
+              <a:t>necesario, grafica validación de </a:t>
+            </a:r>
+            <a:r>
+              <a:rPr lang="es-MX" dirty="0" err="1" smtClean="0"/>
+              <a:t>Kn</a:t>
+            </a:r>
+            <a:r>
+              <a:rPr lang="es-MX" dirty="0" smtClean="0"/>
+              <a:t>, grafica validación MEOP</a:t>
+            </a:r>
+          </a:p>
+          <a:p>
+            <a:r>
+              <a:rPr lang="es-MX" dirty="0" err="1" smtClean="0"/>
+              <a:t>Transf</a:t>
+            </a:r>
+            <a:r>
+              <a:rPr lang="es-MX" dirty="0" smtClean="0"/>
+              <a:t> de calor y 2da </a:t>
+            </a:r>
+            <a:r>
+              <a:rPr lang="es-MX" dirty="0" err="1" smtClean="0"/>
+              <a:t>it</a:t>
+            </a:r>
+            <a:r>
+              <a:rPr lang="es-MX" dirty="0" smtClean="0"/>
+              <a:t> de diseño </a:t>
+            </a:r>
+            <a:r>
+              <a:rPr lang="es-MX" dirty="0" err="1" smtClean="0"/>
+              <a:t>mecanico</a:t>
+            </a:r>
+            <a:r>
+              <a:rPr lang="es-MX" dirty="0" smtClean="0"/>
+              <a:t>, validación de performance y coincidencia con propuesto</a:t>
+            </a:r>
+          </a:p>
+          <a:p>
+            <a:r>
+              <a:rPr lang="es-MX" dirty="0" smtClean="0"/>
+              <a:t>Diseño de tobera, grafica parámetros y optimización, </a:t>
+            </a:r>
+            <a:r>
+              <a:rPr lang="es-MX" dirty="0" err="1" smtClean="0"/>
+              <a:t>Exp</a:t>
+            </a:r>
+            <a:r>
+              <a:rPr lang="es-MX" dirty="0" smtClean="0"/>
+              <a:t> </a:t>
+            </a:r>
+            <a:r>
+              <a:rPr lang="es-MX" dirty="0" err="1" smtClean="0"/>
+              <a:t>Rat</a:t>
+            </a:r>
+            <a:endParaRPr lang="es-MX" dirty="0"/>
+          </a:p>
+          <a:p>
+            <a:r>
+              <a:rPr lang="es-MX" dirty="0" smtClean="0"/>
+              <a:t>Uniones mecánicas (los tres tipos de fallas y que tornillo y N </a:t>
+            </a:r>
+            <a:r>
+              <a:rPr lang="es-MX" dirty="0" err="1" smtClean="0"/>
+              <a:t>cant</a:t>
+            </a:r>
+            <a:r>
+              <a:rPr lang="es-MX" dirty="0" smtClean="0"/>
+              <a:t> se </a:t>
+            </a:r>
+            <a:r>
+              <a:rPr lang="es-MX" dirty="0" err="1" smtClean="0"/>
+              <a:t>escogio</a:t>
+            </a:r>
+            <a:r>
+              <a:rPr lang="es-MX" dirty="0" smtClean="0"/>
+              <a:t>) y selladores (o-</a:t>
+            </a:r>
+            <a:r>
+              <a:rPr lang="es-MX" dirty="0" err="1" smtClean="0"/>
+              <a:t>rings</a:t>
+            </a:r>
+            <a:r>
+              <a:rPr lang="es-MX" dirty="0" smtClean="0"/>
+              <a:t>, </a:t>
+            </a:r>
+            <a:r>
+              <a:rPr lang="es-MX" dirty="0" err="1" smtClean="0"/>
+              <a:t>sealants</a:t>
+            </a:r>
+            <a:r>
+              <a:rPr lang="es-MX" dirty="0" smtClean="0"/>
+              <a:t>)</a:t>
+            </a:r>
+            <a:endParaRPr lang="es-MX" dirty="0"/>
           </a:p>
         </p:txBody>
       </p:sp>
@@ -5543,6 +5739,13 @@
   <p:clrMapOvr>
     <a:masterClrMapping/>
   </p:clrMapOvr>
+  <p:timing>
+    <p:tnLst>
+      <p:par>
+        <p:cTn id="1" dur="indefinite" restart="never" nodeType="tmRoot"/>
+      </p:par>
+    </p:tnLst>
+  </p:timing>
 </p:sld>
 </file>
 
@@ -5554,7 +5757,7 @@
         <p:cNvPr id="1" name="">
           <a:extLst>
             <a:ext uri="{FF2B5EF4-FFF2-40B4-BE49-F238E27FC236}">
-              <a16:creationId xmlns:a16="http://schemas.microsoft.com/office/drawing/2014/main" id="{BE571F52-05EF-1021-3347-CDB2E8EB7C99}"/>
+              <a16:creationId xmlns="" xmlns:a16="http://schemas.microsoft.com/office/drawing/2014/main" id="{BE571F52-05EF-1021-3347-CDB2E8EB7C99}"/>
             </a:ext>
           </a:extLst>
         </p:cNvPr>
@@ -5574,7 +5777,7 @@
           <p:cNvPr id="2" name="Título 1">
             <a:extLst>
               <a:ext uri="{FF2B5EF4-FFF2-40B4-BE49-F238E27FC236}">
-                <a16:creationId xmlns:a16="http://schemas.microsoft.com/office/drawing/2014/main" id="{5DF2C60B-4C6E-7437-4245-1CC0A26AA7B3}"/>
+                <a16:creationId xmlns="" xmlns:a16="http://schemas.microsoft.com/office/drawing/2014/main" id="{5DF2C60B-4C6E-7437-4245-1CC0A26AA7B3}"/>
               </a:ext>
             </a:extLst>
           </p:cNvPr>
@@ -5601,35 +5804,10 @@
       </p:sp>
       <p:sp>
         <p:nvSpPr>
-          <p:cNvPr id="3" name="Marcador de contenido 2">
-            <a:extLst>
-              <a:ext uri="{FF2B5EF4-FFF2-40B4-BE49-F238E27FC236}">
-                <a16:creationId xmlns:a16="http://schemas.microsoft.com/office/drawing/2014/main" id="{BD3FF43D-8218-7700-9582-65ED95B6725D}"/>
-              </a:ext>
-            </a:extLst>
-          </p:cNvPr>
-          <p:cNvSpPr>
-            <a:spLocks noGrp="1"/>
-          </p:cNvSpPr>
-          <p:nvPr>
-            <p:ph sz="half" idx="1"/>
-          </p:nvPr>
-        </p:nvSpPr>
-        <p:spPr/>
-        <p:txBody>
-          <a:bodyPr/>
-          <a:lstStyle/>
-          <a:p>
-            <a:endParaRPr lang="es-MX"/>
-          </a:p>
-        </p:txBody>
-      </p:sp>
-      <p:sp>
-        <p:nvSpPr>
-          <p:cNvPr id="4" name="Marcador de contenido 3">
-            <a:extLst>
-              <a:ext uri="{FF2B5EF4-FFF2-40B4-BE49-F238E27FC236}">
-                <a16:creationId xmlns:a16="http://schemas.microsoft.com/office/drawing/2014/main" id="{36DEF09B-05EA-AA6A-09CD-86BC1D1E0BC1}"/>
+          <p:cNvPr id="6" name="Marcador de contenido 3">
+            <a:extLst>
+              <a:ext uri="{FF2B5EF4-FFF2-40B4-BE49-F238E27FC236}">
+                <a16:creationId xmlns="" xmlns:a16="http://schemas.microsoft.com/office/drawing/2014/main" id="{A5CEACF8-E932-108E-7ABE-547DAAA851ED}"/>
               </a:ext>
             </a:extLst>
           </p:cNvPr>
@@ -5640,12 +5818,134 @@
             <p:ph sz="half" idx="2"/>
           </p:nvPr>
         </p:nvSpPr>
-        <p:spPr/>
-        <p:txBody>
-          <a:bodyPr/>
-          <a:lstStyle/>
-          <a:p>
-            <a:endParaRPr lang="es-MX"/>
+        <p:spPr>
+          <a:xfrm>
+            <a:off x="838200" y="1690688"/>
+            <a:ext cx="5181600" cy="4351338"/>
+          </a:xfrm>
+        </p:spPr>
+        <p:txBody>
+          <a:bodyPr>
+            <a:normAutofit fontScale="70000" lnSpcReduction="20000"/>
+          </a:bodyPr>
+          <a:lstStyle/>
+          <a:p>
+            <a:r>
+              <a:rPr lang="es-MX" dirty="0"/>
+              <a:t>Condición de quemado, calculo de cartuchos para </a:t>
+            </a:r>
+            <a:r>
+              <a:rPr lang="es-MX" dirty="0" err="1"/>
+              <a:t>cobustion</a:t>
+            </a:r>
+            <a:r>
+              <a:rPr lang="es-MX" dirty="0"/>
+              <a:t> SS </a:t>
+            </a:r>
+            <a:r>
+              <a:rPr lang="es-MX" dirty="0" err="1"/>
+              <a:t>Kn</a:t>
+            </a:r>
+            <a:r>
+              <a:rPr lang="es-MX" dirty="0"/>
+              <a:t> </a:t>
+            </a:r>
+            <a:r>
+              <a:rPr lang="es-MX" dirty="0" smtClean="0"/>
+              <a:t>necesario, grafica validación de </a:t>
+            </a:r>
+            <a:r>
+              <a:rPr lang="es-MX" dirty="0" err="1" smtClean="0"/>
+              <a:t>Kn</a:t>
+            </a:r>
+            <a:r>
+              <a:rPr lang="es-MX" dirty="0" smtClean="0"/>
+              <a:t>, grafica validación MEOP</a:t>
+            </a:r>
+          </a:p>
+          <a:p>
+            <a:r>
+              <a:rPr lang="es-MX" dirty="0" err="1" smtClean="0"/>
+              <a:t>Transf</a:t>
+            </a:r>
+            <a:r>
+              <a:rPr lang="es-MX" dirty="0" smtClean="0"/>
+              <a:t> de calor y 2da </a:t>
+            </a:r>
+            <a:r>
+              <a:rPr lang="es-MX" dirty="0" err="1" smtClean="0"/>
+              <a:t>it</a:t>
+            </a:r>
+            <a:r>
+              <a:rPr lang="es-MX" dirty="0" smtClean="0"/>
+              <a:t> de diseño </a:t>
+            </a:r>
+            <a:r>
+              <a:rPr lang="es-MX" dirty="0" err="1" smtClean="0"/>
+              <a:t>mecanico</a:t>
+            </a:r>
+            <a:r>
+              <a:rPr lang="es-MX" dirty="0" smtClean="0"/>
+              <a:t>, validación de performance y coincidencia con propuesto</a:t>
+            </a:r>
+          </a:p>
+          <a:p>
+            <a:r>
+              <a:rPr lang="es-MX" dirty="0" smtClean="0"/>
+              <a:t>Diseño de tobera, grafica parámetros y optimización, </a:t>
+            </a:r>
+            <a:r>
+              <a:rPr lang="es-MX" dirty="0" err="1" smtClean="0"/>
+              <a:t>Exp</a:t>
+            </a:r>
+            <a:r>
+              <a:rPr lang="es-MX" dirty="0" smtClean="0"/>
+              <a:t> </a:t>
+            </a:r>
+            <a:r>
+              <a:rPr lang="es-MX" dirty="0" err="1" smtClean="0"/>
+              <a:t>Rat</a:t>
+            </a:r>
+            <a:endParaRPr lang="es-MX" dirty="0"/>
+          </a:p>
+          <a:p>
+            <a:r>
+              <a:rPr lang="es-MX" dirty="0" smtClean="0"/>
+              <a:t>Uniones mecánicas (los tres tipos de fallas y que tornillo y N </a:t>
+            </a:r>
+            <a:r>
+              <a:rPr lang="es-MX" dirty="0" err="1" smtClean="0"/>
+              <a:t>cant</a:t>
+            </a:r>
+            <a:r>
+              <a:rPr lang="es-MX" dirty="0" smtClean="0"/>
+              <a:t> se </a:t>
+            </a:r>
+            <a:r>
+              <a:rPr lang="es-MX" dirty="0" err="1" smtClean="0"/>
+              <a:t>escogio</a:t>
+            </a:r>
+            <a:r>
+              <a:rPr lang="es-MX" dirty="0" smtClean="0"/>
+              <a:t>) y selladores (o-</a:t>
+            </a:r>
+            <a:r>
+              <a:rPr lang="es-MX" dirty="0" err="1" smtClean="0"/>
+              <a:t>rings</a:t>
+            </a:r>
+            <a:r>
+              <a:rPr lang="es-MX" dirty="0" smtClean="0"/>
+              <a:t>, </a:t>
+            </a:r>
+            <a:r>
+              <a:rPr lang="es-MX" dirty="0" err="1" smtClean="0"/>
+              <a:t>sealants</a:t>
+            </a:r>
+            <a:r>
+              <a:rPr lang="es-MX" dirty="0" smtClean="0"/>
+              <a:t>)</a:t>
+            </a:r>
+            <a:endParaRPr lang="es-MX" dirty="0"/>
           </a:p>
         </p:txBody>
       </p:sp>
@@ -5659,6 +5959,13 @@
   <p:clrMapOvr>
     <a:masterClrMapping/>
   </p:clrMapOvr>
+  <p:timing>
+    <p:tnLst>
+      <p:par>
+        <p:cTn id="1" dur="indefinite" restart="never" nodeType="tmRoot"/>
+      </p:par>
+    </p:tnLst>
+  </p:timing>
 </p:sld>
 </file>
 
@@ -5670,7 +5977,7 @@
         <p:cNvPr id="1" name="">
           <a:extLst>
             <a:ext uri="{FF2B5EF4-FFF2-40B4-BE49-F238E27FC236}">
-              <a16:creationId xmlns:a16="http://schemas.microsoft.com/office/drawing/2014/main" id="{BAA8E253-6747-9B1F-FBE9-E6CD87C5A445}"/>
+              <a16:creationId xmlns="" xmlns:a16="http://schemas.microsoft.com/office/drawing/2014/main" id="{BAA8E253-6747-9B1F-FBE9-E6CD87C5A445}"/>
             </a:ext>
           </a:extLst>
         </p:cNvPr>
@@ -5690,7 +5997,7 @@
           <p:cNvPr id="2" name="Título 1">
             <a:extLst>
               <a:ext uri="{FF2B5EF4-FFF2-40B4-BE49-F238E27FC236}">
-                <a16:creationId xmlns:a16="http://schemas.microsoft.com/office/drawing/2014/main" id="{6396FCE1-269E-47E7-6B0B-83CB1C803157}"/>
+                <a16:creationId xmlns="" xmlns:a16="http://schemas.microsoft.com/office/drawing/2014/main" id="{6396FCE1-269E-47E7-6B0B-83CB1C803157}"/>
               </a:ext>
             </a:extLst>
           </p:cNvPr>
@@ -5720,7 +6027,7 @@
           <p:cNvPr id="3" name="Marcador de contenido 2">
             <a:extLst>
               <a:ext uri="{FF2B5EF4-FFF2-40B4-BE49-F238E27FC236}">
-                <a16:creationId xmlns:a16="http://schemas.microsoft.com/office/drawing/2014/main" id="{65EDB4A7-80AE-EB79-5B23-32C347FD2312}"/>
+                <a16:creationId xmlns="" xmlns:a16="http://schemas.microsoft.com/office/drawing/2014/main" id="{65EDB4A7-80AE-EB79-5B23-32C347FD2312}"/>
               </a:ext>
             </a:extLst>
           </p:cNvPr>
@@ -5736,7 +6043,11 @@
           <a:bodyPr/>
           <a:lstStyle/>
           <a:p>
-            <a:endParaRPr lang="es-MX"/>
+            <a:r>
+              <a:rPr lang="es-MX" dirty="0" smtClean="0"/>
+              <a:t>CAD literalmente</a:t>
+            </a:r>
+            <a:endParaRPr lang="es-MX" dirty="0"/>
           </a:p>
         </p:txBody>
       </p:sp>
@@ -5745,7 +6056,7 @@
           <p:cNvPr id="4" name="Marcador de contenido 3">
             <a:extLst>
               <a:ext uri="{FF2B5EF4-FFF2-40B4-BE49-F238E27FC236}">
-                <a16:creationId xmlns:a16="http://schemas.microsoft.com/office/drawing/2014/main" id="{1D6431B4-69A1-CB17-CB70-D9632CC15269}"/>
+                <a16:creationId xmlns="" xmlns:a16="http://schemas.microsoft.com/office/drawing/2014/main" id="{1D6431B4-69A1-CB17-CB70-D9632CC15269}"/>
               </a:ext>
             </a:extLst>
           </p:cNvPr>
@@ -5761,7 +6072,27 @@
           <a:bodyPr/>
           <a:lstStyle/>
           <a:p>
-            <a:endParaRPr lang="es-MX"/>
+            <a:r>
+              <a:rPr lang="es-MX" dirty="0" smtClean="0"/>
+              <a:t>Simulaciones pendientes, complejas debido a gases de combustión y </a:t>
+            </a:r>
+            <a:r>
+              <a:rPr lang="es-MX" dirty="0" err="1" smtClean="0"/>
+              <a:t>comp</a:t>
+            </a:r>
+            <a:r>
+              <a:rPr lang="es-MX" dirty="0" smtClean="0"/>
+              <a:t> de </a:t>
+            </a:r>
+            <a:r>
+              <a:rPr lang="es-MX" dirty="0" err="1" smtClean="0"/>
+              <a:t>boundary</a:t>
+            </a:r>
+            <a:r>
+              <a:rPr lang="es-MX" dirty="0" smtClean="0"/>
+              <a:t> por flujo bifásico en material</a:t>
+            </a:r>
+            <a:endParaRPr lang="es-MX" dirty="0"/>
           </a:p>
         </p:txBody>
       </p:sp>
@@ -5775,6 +6106,13 @@
   <p:clrMapOvr>
     <a:masterClrMapping/>
   </p:clrMapOvr>
+  <p:timing>
+    <p:tnLst>
+      <p:par>
+        <p:cTn id="1" dur="indefinite" restart="never" nodeType="tmRoot"/>
+      </p:par>
+    </p:tnLst>
+  </p:timing>
 </p:sld>
 </file>
 
@@ -5786,7 +6124,7 @@
         <p:cNvPr id="1" name="">
           <a:extLst>
             <a:ext uri="{FF2B5EF4-FFF2-40B4-BE49-F238E27FC236}">
-              <a16:creationId xmlns:a16="http://schemas.microsoft.com/office/drawing/2014/main" id="{1B05AE3F-3E46-25CF-7795-E72C123AB1CA}"/>
+              <a16:creationId xmlns="" xmlns:a16="http://schemas.microsoft.com/office/drawing/2014/main" id="{1B05AE3F-3E46-25CF-7795-E72C123AB1CA}"/>
             </a:ext>
           </a:extLst>
         </p:cNvPr>
@@ -5806,7 +6144,7 @@
           <p:cNvPr id="2" name="Título 1">
             <a:extLst>
               <a:ext uri="{FF2B5EF4-FFF2-40B4-BE49-F238E27FC236}">
-                <a16:creationId xmlns:a16="http://schemas.microsoft.com/office/drawing/2014/main" id="{D86BF721-CFA0-0B79-12AE-967BA8A80533}"/>
+                <a16:creationId xmlns="" xmlns:a16="http://schemas.microsoft.com/office/drawing/2014/main" id="{D86BF721-CFA0-0B79-12AE-967BA8A80533}"/>
               </a:ext>
             </a:extLst>
           </p:cNvPr>
@@ -5836,7 +6174,7 @@
           <p:cNvPr id="3" name="Marcador de contenido 2">
             <a:extLst>
               <a:ext uri="{FF2B5EF4-FFF2-40B4-BE49-F238E27FC236}">
-                <a16:creationId xmlns:a16="http://schemas.microsoft.com/office/drawing/2014/main" id="{1A4A8CD1-135B-E096-AE71-BC1C655CF49F}"/>
+                <a16:creationId xmlns="" xmlns:a16="http://schemas.microsoft.com/office/drawing/2014/main" id="{1A4A8CD1-135B-E096-AE71-BC1C655CF49F}"/>
               </a:ext>
             </a:extLst>
           </p:cNvPr>
@@ -5852,7 +6190,11 @@
           <a:bodyPr/>
           <a:lstStyle/>
           <a:p>
-            <a:endParaRPr lang="es-MX"/>
+            <a:r>
+              <a:rPr lang="es-MX" dirty="0" smtClean="0"/>
+              <a:t>Método de manufactura por parte</a:t>
+            </a:r>
+            <a:endParaRPr lang="es-MX" dirty="0"/>
           </a:p>
         </p:txBody>
       </p:sp>
@@ -5861,7 +6203,7 @@
           <p:cNvPr id="4" name="Marcador de contenido 3">
             <a:extLst>
               <a:ext uri="{FF2B5EF4-FFF2-40B4-BE49-F238E27FC236}">
-                <a16:creationId xmlns:a16="http://schemas.microsoft.com/office/drawing/2014/main" id="{8A49EB46-BCFB-0531-809D-2CF4707CCB6C}"/>
+                <a16:creationId xmlns="" xmlns:a16="http://schemas.microsoft.com/office/drawing/2014/main" id="{8A49EB46-BCFB-0531-809D-2CF4707CCB6C}"/>
               </a:ext>
             </a:extLst>
           </p:cNvPr>
@@ -5877,7 +6219,17 @@
           <a:bodyPr/>
           <a:lstStyle/>
           <a:p>
-            <a:endParaRPr lang="es-MX"/>
+            <a:r>
+              <a:rPr lang="es-MX" dirty="0" smtClean="0"/>
+              <a:t>Enfoque a tobera y uniones mecánicas</a:t>
+            </a:r>
+          </a:p>
+          <a:p>
+            <a:r>
+              <a:rPr lang="es-MX" dirty="0" smtClean="0"/>
+              <a:t>Dibujos finales</a:t>
+            </a:r>
+            <a:endParaRPr lang="es-MX" dirty="0"/>
           </a:p>
         </p:txBody>
       </p:sp>
@@ -5891,6 +6243,13 @@
   <p:clrMapOvr>
     <a:masterClrMapping/>
   </p:clrMapOvr>
+  <p:timing>
+    <p:tnLst>
+      <p:par>
+        <p:cTn id="1" dur="indefinite" restart="never" nodeType="tmRoot"/>
+      </p:par>
+    </p:tnLst>
+  </p:timing>
 </p:sld>
 </file>
 

</xml_diff>

<commit_message>
UPDATED ppt PFlammam Lucia v1
updated ppt proyect flammam lucia v1
</commit_message>
<xml_diff>
--- a/PFlammam - Lucia V1 rev3/PFlammam - Lucia V1 - technical presentation.pptx
+++ b/PFlammam - Lucia V1 rev3/PFlammam - Lucia V1 - technical presentation.pptx
@@ -578,7 +578,7 @@
           <p:cNvPr id="2" name="Título 1">
             <a:extLst>
               <a:ext uri="{FF2B5EF4-FFF2-40B4-BE49-F238E27FC236}">
-                <a16:creationId xmlns="" xmlns:a16="http://schemas.microsoft.com/office/drawing/2014/main" id="{C68F5251-D223-BC64-D677-1BEF02B6E87F}"/>
+                <a16:creationId xmlns:a16="http://schemas.microsoft.com/office/drawing/2014/main" xmlns="" id="{C68F5251-D223-BC64-D677-1BEF02B6E87F}"/>
               </a:ext>
             </a:extLst>
           </p:cNvPr>
@@ -616,7 +616,7 @@
           <p:cNvPr id="3" name="Subtítulo 2">
             <a:extLst>
               <a:ext uri="{FF2B5EF4-FFF2-40B4-BE49-F238E27FC236}">
-                <a16:creationId xmlns="" xmlns:a16="http://schemas.microsoft.com/office/drawing/2014/main" id="{3F4A65FE-8D2A-DD67-B7B2-6214BCC7FFB3}"/>
+                <a16:creationId xmlns:a16="http://schemas.microsoft.com/office/drawing/2014/main" xmlns="" id="{3F4A65FE-8D2A-DD67-B7B2-6214BCC7FFB3}"/>
               </a:ext>
             </a:extLst>
           </p:cNvPr>
@@ -687,7 +687,7 @@
           <p:cNvPr id="4" name="Marcador de fecha 3">
             <a:extLst>
               <a:ext uri="{FF2B5EF4-FFF2-40B4-BE49-F238E27FC236}">
-                <a16:creationId xmlns="" xmlns:a16="http://schemas.microsoft.com/office/drawing/2014/main" id="{464258EB-91E8-2924-CBD4-96B87E7215B3}"/>
+                <a16:creationId xmlns:a16="http://schemas.microsoft.com/office/drawing/2014/main" xmlns="" id="{464258EB-91E8-2924-CBD4-96B87E7215B3}"/>
               </a:ext>
             </a:extLst>
           </p:cNvPr>
@@ -716,7 +716,7 @@
           <p:cNvPr id="5" name="Marcador de pie de página 4">
             <a:extLst>
               <a:ext uri="{FF2B5EF4-FFF2-40B4-BE49-F238E27FC236}">
-                <a16:creationId xmlns="" xmlns:a16="http://schemas.microsoft.com/office/drawing/2014/main" id="{DE84EB14-DDAA-D28A-7BDC-5CA4FD1477E1}"/>
+                <a16:creationId xmlns:a16="http://schemas.microsoft.com/office/drawing/2014/main" xmlns="" id="{DE84EB14-DDAA-D28A-7BDC-5CA4FD1477E1}"/>
               </a:ext>
             </a:extLst>
           </p:cNvPr>
@@ -741,7 +741,7 @@
           <p:cNvPr id="6" name="Marcador de número de diapositiva 5">
             <a:extLst>
               <a:ext uri="{FF2B5EF4-FFF2-40B4-BE49-F238E27FC236}">
-                <a16:creationId xmlns="" xmlns:a16="http://schemas.microsoft.com/office/drawing/2014/main" id="{020C777D-DB97-B69E-A018-FD1F6A2F2EA2}"/>
+                <a16:creationId xmlns:a16="http://schemas.microsoft.com/office/drawing/2014/main" xmlns="" id="{020C777D-DB97-B69E-A018-FD1F6A2F2EA2}"/>
               </a:ext>
             </a:extLst>
           </p:cNvPr>
@@ -800,7 +800,7 @@
           <p:cNvPr id="2" name="Título 1">
             <a:extLst>
               <a:ext uri="{FF2B5EF4-FFF2-40B4-BE49-F238E27FC236}">
-                <a16:creationId xmlns="" xmlns:a16="http://schemas.microsoft.com/office/drawing/2014/main" id="{885B19B8-5854-260F-CB96-1B6829523669}"/>
+                <a16:creationId xmlns:a16="http://schemas.microsoft.com/office/drawing/2014/main" xmlns="" id="{885B19B8-5854-260F-CB96-1B6829523669}"/>
               </a:ext>
             </a:extLst>
           </p:cNvPr>
@@ -829,7 +829,7 @@
           <p:cNvPr id="3" name="Marcador de texto vertical 2">
             <a:extLst>
               <a:ext uri="{FF2B5EF4-FFF2-40B4-BE49-F238E27FC236}">
-                <a16:creationId xmlns="" xmlns:a16="http://schemas.microsoft.com/office/drawing/2014/main" id="{EA8F2339-935A-BA50-6D17-C11D9A50303F}"/>
+                <a16:creationId xmlns:a16="http://schemas.microsoft.com/office/drawing/2014/main" xmlns="" id="{EA8F2339-935A-BA50-6D17-C11D9A50303F}"/>
               </a:ext>
             </a:extLst>
           </p:cNvPr>
@@ -887,7 +887,7 @@
           <p:cNvPr id="4" name="Marcador de fecha 3">
             <a:extLst>
               <a:ext uri="{FF2B5EF4-FFF2-40B4-BE49-F238E27FC236}">
-                <a16:creationId xmlns="" xmlns:a16="http://schemas.microsoft.com/office/drawing/2014/main" id="{C0D93516-4160-7AF2-1AD2-1717A1759DF3}"/>
+                <a16:creationId xmlns:a16="http://schemas.microsoft.com/office/drawing/2014/main" xmlns="" id="{C0D93516-4160-7AF2-1AD2-1717A1759DF3}"/>
               </a:ext>
             </a:extLst>
           </p:cNvPr>
@@ -916,7 +916,7 @@
           <p:cNvPr id="5" name="Marcador de pie de página 4">
             <a:extLst>
               <a:ext uri="{FF2B5EF4-FFF2-40B4-BE49-F238E27FC236}">
-                <a16:creationId xmlns="" xmlns:a16="http://schemas.microsoft.com/office/drawing/2014/main" id="{18C2BD7C-43C5-6A6A-2A56-049FECED01E8}"/>
+                <a16:creationId xmlns:a16="http://schemas.microsoft.com/office/drawing/2014/main" xmlns="" id="{18C2BD7C-43C5-6A6A-2A56-049FECED01E8}"/>
               </a:ext>
             </a:extLst>
           </p:cNvPr>
@@ -941,7 +941,7 @@
           <p:cNvPr id="6" name="Marcador de número de diapositiva 5">
             <a:extLst>
               <a:ext uri="{FF2B5EF4-FFF2-40B4-BE49-F238E27FC236}">
-                <a16:creationId xmlns="" xmlns:a16="http://schemas.microsoft.com/office/drawing/2014/main" id="{C702C113-1630-F4FE-6B7A-DE6028EAF0DC}"/>
+                <a16:creationId xmlns:a16="http://schemas.microsoft.com/office/drawing/2014/main" xmlns="" id="{C702C113-1630-F4FE-6B7A-DE6028EAF0DC}"/>
               </a:ext>
             </a:extLst>
           </p:cNvPr>
@@ -1000,7 +1000,7 @@
           <p:cNvPr id="2" name="Título vertical 1">
             <a:extLst>
               <a:ext uri="{FF2B5EF4-FFF2-40B4-BE49-F238E27FC236}">
-                <a16:creationId xmlns="" xmlns:a16="http://schemas.microsoft.com/office/drawing/2014/main" id="{35FD6614-0E5D-8F5D-E64C-B2F5267FAFB7}"/>
+                <a16:creationId xmlns:a16="http://schemas.microsoft.com/office/drawing/2014/main" xmlns="" id="{35FD6614-0E5D-8F5D-E64C-B2F5267FAFB7}"/>
               </a:ext>
             </a:extLst>
           </p:cNvPr>
@@ -1034,7 +1034,7 @@
           <p:cNvPr id="3" name="Marcador de texto vertical 2">
             <a:extLst>
               <a:ext uri="{FF2B5EF4-FFF2-40B4-BE49-F238E27FC236}">
-                <a16:creationId xmlns="" xmlns:a16="http://schemas.microsoft.com/office/drawing/2014/main" id="{CF0EED13-C02A-F3ED-C589-DF5EF8C49BD7}"/>
+                <a16:creationId xmlns:a16="http://schemas.microsoft.com/office/drawing/2014/main" xmlns="" id="{CF0EED13-C02A-F3ED-C589-DF5EF8C49BD7}"/>
               </a:ext>
             </a:extLst>
           </p:cNvPr>
@@ -1097,7 +1097,7 @@
           <p:cNvPr id="4" name="Marcador de fecha 3">
             <a:extLst>
               <a:ext uri="{FF2B5EF4-FFF2-40B4-BE49-F238E27FC236}">
-                <a16:creationId xmlns="" xmlns:a16="http://schemas.microsoft.com/office/drawing/2014/main" id="{EB7BDC0A-C2D7-3843-E6F7-DF6981CF3BDF}"/>
+                <a16:creationId xmlns:a16="http://schemas.microsoft.com/office/drawing/2014/main" xmlns="" id="{EB7BDC0A-C2D7-3843-E6F7-DF6981CF3BDF}"/>
               </a:ext>
             </a:extLst>
           </p:cNvPr>
@@ -1126,7 +1126,7 @@
           <p:cNvPr id="5" name="Marcador de pie de página 4">
             <a:extLst>
               <a:ext uri="{FF2B5EF4-FFF2-40B4-BE49-F238E27FC236}">
-                <a16:creationId xmlns="" xmlns:a16="http://schemas.microsoft.com/office/drawing/2014/main" id="{9F55993D-DADC-BB7C-FB1A-9828BFA237F6}"/>
+                <a16:creationId xmlns:a16="http://schemas.microsoft.com/office/drawing/2014/main" xmlns="" id="{9F55993D-DADC-BB7C-FB1A-9828BFA237F6}"/>
               </a:ext>
             </a:extLst>
           </p:cNvPr>
@@ -1151,7 +1151,7 @@
           <p:cNvPr id="6" name="Marcador de número de diapositiva 5">
             <a:extLst>
               <a:ext uri="{FF2B5EF4-FFF2-40B4-BE49-F238E27FC236}">
-                <a16:creationId xmlns="" xmlns:a16="http://schemas.microsoft.com/office/drawing/2014/main" id="{3BAFEC26-7124-8F71-80CD-4C6F3E3DC2A2}"/>
+                <a16:creationId xmlns:a16="http://schemas.microsoft.com/office/drawing/2014/main" xmlns="" id="{3BAFEC26-7124-8F71-80CD-4C6F3E3DC2A2}"/>
               </a:ext>
             </a:extLst>
           </p:cNvPr>
@@ -1210,7 +1210,7 @@
           <p:cNvPr id="2" name="Título 1">
             <a:extLst>
               <a:ext uri="{FF2B5EF4-FFF2-40B4-BE49-F238E27FC236}">
-                <a16:creationId xmlns="" xmlns:a16="http://schemas.microsoft.com/office/drawing/2014/main" id="{7D2E4EE2-F889-3074-9997-AF6C4F9D6A83}"/>
+                <a16:creationId xmlns:a16="http://schemas.microsoft.com/office/drawing/2014/main" xmlns="" id="{7D2E4EE2-F889-3074-9997-AF6C4F9D6A83}"/>
               </a:ext>
             </a:extLst>
           </p:cNvPr>
@@ -1239,7 +1239,7 @@
           <p:cNvPr id="3" name="Marcador de contenido 2">
             <a:extLst>
               <a:ext uri="{FF2B5EF4-FFF2-40B4-BE49-F238E27FC236}">
-                <a16:creationId xmlns="" xmlns:a16="http://schemas.microsoft.com/office/drawing/2014/main" id="{C236082A-49F3-8097-81BB-B8BDD75B747C}"/>
+                <a16:creationId xmlns:a16="http://schemas.microsoft.com/office/drawing/2014/main" xmlns="" id="{C236082A-49F3-8097-81BB-B8BDD75B747C}"/>
               </a:ext>
             </a:extLst>
           </p:cNvPr>
@@ -1297,7 +1297,7 @@
           <p:cNvPr id="4" name="Marcador de fecha 3">
             <a:extLst>
               <a:ext uri="{FF2B5EF4-FFF2-40B4-BE49-F238E27FC236}">
-                <a16:creationId xmlns="" xmlns:a16="http://schemas.microsoft.com/office/drawing/2014/main" id="{1FBF5EA1-958A-FE14-14ED-F5DDBBF4E116}"/>
+                <a16:creationId xmlns:a16="http://schemas.microsoft.com/office/drawing/2014/main" xmlns="" id="{1FBF5EA1-958A-FE14-14ED-F5DDBBF4E116}"/>
               </a:ext>
             </a:extLst>
           </p:cNvPr>
@@ -1326,7 +1326,7 @@
           <p:cNvPr id="5" name="Marcador de pie de página 4">
             <a:extLst>
               <a:ext uri="{FF2B5EF4-FFF2-40B4-BE49-F238E27FC236}">
-                <a16:creationId xmlns="" xmlns:a16="http://schemas.microsoft.com/office/drawing/2014/main" id="{DBB1B2F9-BA97-397C-0A95-CF66A84143A0}"/>
+                <a16:creationId xmlns:a16="http://schemas.microsoft.com/office/drawing/2014/main" xmlns="" id="{DBB1B2F9-BA97-397C-0A95-CF66A84143A0}"/>
               </a:ext>
             </a:extLst>
           </p:cNvPr>
@@ -1351,7 +1351,7 @@
           <p:cNvPr id="6" name="Marcador de número de diapositiva 5">
             <a:extLst>
               <a:ext uri="{FF2B5EF4-FFF2-40B4-BE49-F238E27FC236}">
-                <a16:creationId xmlns="" xmlns:a16="http://schemas.microsoft.com/office/drawing/2014/main" id="{DE2F542E-A793-5753-EA04-A2D047EE8D73}"/>
+                <a16:creationId xmlns:a16="http://schemas.microsoft.com/office/drawing/2014/main" xmlns="" id="{DE2F542E-A793-5753-EA04-A2D047EE8D73}"/>
               </a:ext>
             </a:extLst>
           </p:cNvPr>
@@ -1410,7 +1410,7 @@
           <p:cNvPr id="2" name="Título 1">
             <a:extLst>
               <a:ext uri="{FF2B5EF4-FFF2-40B4-BE49-F238E27FC236}">
-                <a16:creationId xmlns="" xmlns:a16="http://schemas.microsoft.com/office/drawing/2014/main" id="{C12F8EC0-6FE4-21EE-0999-41500DA69A5D}"/>
+                <a16:creationId xmlns:a16="http://schemas.microsoft.com/office/drawing/2014/main" xmlns="" id="{C12F8EC0-6FE4-21EE-0999-41500DA69A5D}"/>
               </a:ext>
             </a:extLst>
           </p:cNvPr>
@@ -1448,7 +1448,7 @@
           <p:cNvPr id="3" name="Marcador de texto 2">
             <a:extLst>
               <a:ext uri="{FF2B5EF4-FFF2-40B4-BE49-F238E27FC236}">
-                <a16:creationId xmlns="" xmlns:a16="http://schemas.microsoft.com/office/drawing/2014/main" id="{AAFEFE82-C496-46BF-24AD-3A2E4C024B34}"/>
+                <a16:creationId xmlns:a16="http://schemas.microsoft.com/office/drawing/2014/main" xmlns="" id="{AAFEFE82-C496-46BF-24AD-3A2E4C024B34}"/>
               </a:ext>
             </a:extLst>
           </p:cNvPr>
@@ -1573,7 +1573,7 @@
           <p:cNvPr id="4" name="Marcador de fecha 3">
             <a:extLst>
               <a:ext uri="{FF2B5EF4-FFF2-40B4-BE49-F238E27FC236}">
-                <a16:creationId xmlns="" xmlns:a16="http://schemas.microsoft.com/office/drawing/2014/main" id="{66983407-AB5D-BF9A-FBAB-084762521C54}"/>
+                <a16:creationId xmlns:a16="http://schemas.microsoft.com/office/drawing/2014/main" xmlns="" id="{66983407-AB5D-BF9A-FBAB-084762521C54}"/>
               </a:ext>
             </a:extLst>
           </p:cNvPr>
@@ -1602,7 +1602,7 @@
           <p:cNvPr id="5" name="Marcador de pie de página 4">
             <a:extLst>
               <a:ext uri="{FF2B5EF4-FFF2-40B4-BE49-F238E27FC236}">
-                <a16:creationId xmlns="" xmlns:a16="http://schemas.microsoft.com/office/drawing/2014/main" id="{A4091B16-700E-54A4-365B-884593DAECF3}"/>
+                <a16:creationId xmlns:a16="http://schemas.microsoft.com/office/drawing/2014/main" xmlns="" id="{A4091B16-700E-54A4-365B-884593DAECF3}"/>
               </a:ext>
             </a:extLst>
           </p:cNvPr>
@@ -1627,7 +1627,7 @@
           <p:cNvPr id="6" name="Marcador de número de diapositiva 5">
             <a:extLst>
               <a:ext uri="{FF2B5EF4-FFF2-40B4-BE49-F238E27FC236}">
-                <a16:creationId xmlns="" xmlns:a16="http://schemas.microsoft.com/office/drawing/2014/main" id="{617E1B6B-5F0B-DA12-3F53-D096E1224374}"/>
+                <a16:creationId xmlns:a16="http://schemas.microsoft.com/office/drawing/2014/main" xmlns="" id="{617E1B6B-5F0B-DA12-3F53-D096E1224374}"/>
               </a:ext>
             </a:extLst>
           </p:cNvPr>
@@ -1686,7 +1686,7 @@
           <p:cNvPr id="2" name="Título 1">
             <a:extLst>
               <a:ext uri="{FF2B5EF4-FFF2-40B4-BE49-F238E27FC236}">
-                <a16:creationId xmlns="" xmlns:a16="http://schemas.microsoft.com/office/drawing/2014/main" id="{917BE101-93AD-A4F6-2218-966EEAA06938}"/>
+                <a16:creationId xmlns:a16="http://schemas.microsoft.com/office/drawing/2014/main" xmlns="" id="{917BE101-93AD-A4F6-2218-966EEAA06938}"/>
               </a:ext>
             </a:extLst>
           </p:cNvPr>
@@ -1715,7 +1715,7 @@
           <p:cNvPr id="3" name="Marcador de contenido 2">
             <a:extLst>
               <a:ext uri="{FF2B5EF4-FFF2-40B4-BE49-F238E27FC236}">
-                <a16:creationId xmlns="" xmlns:a16="http://schemas.microsoft.com/office/drawing/2014/main" id="{D927AB96-2137-7115-C296-851F579A94C7}"/>
+                <a16:creationId xmlns:a16="http://schemas.microsoft.com/office/drawing/2014/main" xmlns="" id="{D927AB96-2137-7115-C296-851F579A94C7}"/>
               </a:ext>
             </a:extLst>
           </p:cNvPr>
@@ -1778,7 +1778,7 @@
           <p:cNvPr id="4" name="Marcador de contenido 3">
             <a:extLst>
               <a:ext uri="{FF2B5EF4-FFF2-40B4-BE49-F238E27FC236}">
-                <a16:creationId xmlns="" xmlns:a16="http://schemas.microsoft.com/office/drawing/2014/main" id="{85653190-5E9F-C666-A5CA-E5400CDB9916}"/>
+                <a16:creationId xmlns:a16="http://schemas.microsoft.com/office/drawing/2014/main" xmlns="" id="{85653190-5E9F-C666-A5CA-E5400CDB9916}"/>
               </a:ext>
             </a:extLst>
           </p:cNvPr>
@@ -1841,7 +1841,7 @@
           <p:cNvPr id="5" name="Marcador de fecha 4">
             <a:extLst>
               <a:ext uri="{FF2B5EF4-FFF2-40B4-BE49-F238E27FC236}">
-                <a16:creationId xmlns="" xmlns:a16="http://schemas.microsoft.com/office/drawing/2014/main" id="{2287A35D-19C4-6423-2182-6F7AEF7D868A}"/>
+                <a16:creationId xmlns:a16="http://schemas.microsoft.com/office/drawing/2014/main" xmlns="" id="{2287A35D-19C4-6423-2182-6F7AEF7D868A}"/>
               </a:ext>
             </a:extLst>
           </p:cNvPr>
@@ -1870,7 +1870,7 @@
           <p:cNvPr id="6" name="Marcador de pie de página 5">
             <a:extLst>
               <a:ext uri="{FF2B5EF4-FFF2-40B4-BE49-F238E27FC236}">
-                <a16:creationId xmlns="" xmlns:a16="http://schemas.microsoft.com/office/drawing/2014/main" id="{6A20EBBC-FFE4-BF34-584D-1103DDD1E59B}"/>
+                <a16:creationId xmlns:a16="http://schemas.microsoft.com/office/drawing/2014/main" xmlns="" id="{6A20EBBC-FFE4-BF34-584D-1103DDD1E59B}"/>
               </a:ext>
             </a:extLst>
           </p:cNvPr>
@@ -1895,7 +1895,7 @@
           <p:cNvPr id="7" name="Marcador de número de diapositiva 6">
             <a:extLst>
               <a:ext uri="{FF2B5EF4-FFF2-40B4-BE49-F238E27FC236}">
-                <a16:creationId xmlns="" xmlns:a16="http://schemas.microsoft.com/office/drawing/2014/main" id="{32069CD5-9784-24F5-FD3F-2CE7FEEEAFA5}"/>
+                <a16:creationId xmlns:a16="http://schemas.microsoft.com/office/drawing/2014/main" xmlns="" id="{32069CD5-9784-24F5-FD3F-2CE7FEEEAFA5}"/>
               </a:ext>
             </a:extLst>
           </p:cNvPr>
@@ -1954,7 +1954,7 @@
           <p:cNvPr id="2" name="Título 1">
             <a:extLst>
               <a:ext uri="{FF2B5EF4-FFF2-40B4-BE49-F238E27FC236}">
-                <a16:creationId xmlns="" xmlns:a16="http://schemas.microsoft.com/office/drawing/2014/main" id="{0AC6574D-AD08-47C4-E8FA-8F244F9BFAFD}"/>
+                <a16:creationId xmlns:a16="http://schemas.microsoft.com/office/drawing/2014/main" xmlns="" id="{0AC6574D-AD08-47C4-E8FA-8F244F9BFAFD}"/>
               </a:ext>
             </a:extLst>
           </p:cNvPr>
@@ -1988,7 +1988,7 @@
           <p:cNvPr id="3" name="Marcador de texto 2">
             <a:extLst>
               <a:ext uri="{FF2B5EF4-FFF2-40B4-BE49-F238E27FC236}">
-                <a16:creationId xmlns="" xmlns:a16="http://schemas.microsoft.com/office/drawing/2014/main" id="{20EF632E-3FF8-7DD5-F21D-8CB63B8FEDFA}"/>
+                <a16:creationId xmlns:a16="http://schemas.microsoft.com/office/drawing/2014/main" xmlns="" id="{20EF632E-3FF8-7DD5-F21D-8CB63B8FEDFA}"/>
               </a:ext>
             </a:extLst>
           </p:cNvPr>
@@ -2059,7 +2059,7 @@
           <p:cNvPr id="4" name="Marcador de contenido 3">
             <a:extLst>
               <a:ext uri="{FF2B5EF4-FFF2-40B4-BE49-F238E27FC236}">
-                <a16:creationId xmlns="" xmlns:a16="http://schemas.microsoft.com/office/drawing/2014/main" id="{AFA83C99-17BF-FB92-B9A6-6B9D02FA248F}"/>
+                <a16:creationId xmlns:a16="http://schemas.microsoft.com/office/drawing/2014/main" xmlns="" id="{AFA83C99-17BF-FB92-B9A6-6B9D02FA248F}"/>
               </a:ext>
             </a:extLst>
           </p:cNvPr>
@@ -2122,7 +2122,7 @@
           <p:cNvPr id="5" name="Marcador de texto 4">
             <a:extLst>
               <a:ext uri="{FF2B5EF4-FFF2-40B4-BE49-F238E27FC236}">
-                <a16:creationId xmlns="" xmlns:a16="http://schemas.microsoft.com/office/drawing/2014/main" id="{5FE508B0-6C5A-C9B0-FC6B-343EBA1D78DE}"/>
+                <a16:creationId xmlns:a16="http://schemas.microsoft.com/office/drawing/2014/main" xmlns="" id="{5FE508B0-6C5A-C9B0-FC6B-343EBA1D78DE}"/>
               </a:ext>
             </a:extLst>
           </p:cNvPr>
@@ -2193,7 +2193,7 @@
           <p:cNvPr id="6" name="Marcador de contenido 5">
             <a:extLst>
               <a:ext uri="{FF2B5EF4-FFF2-40B4-BE49-F238E27FC236}">
-                <a16:creationId xmlns="" xmlns:a16="http://schemas.microsoft.com/office/drawing/2014/main" id="{10B9C372-15AA-19D9-9B22-DB1573661A8F}"/>
+                <a16:creationId xmlns:a16="http://schemas.microsoft.com/office/drawing/2014/main" xmlns="" id="{10B9C372-15AA-19D9-9B22-DB1573661A8F}"/>
               </a:ext>
             </a:extLst>
           </p:cNvPr>
@@ -2256,7 +2256,7 @@
           <p:cNvPr id="7" name="Marcador de fecha 6">
             <a:extLst>
               <a:ext uri="{FF2B5EF4-FFF2-40B4-BE49-F238E27FC236}">
-                <a16:creationId xmlns="" xmlns:a16="http://schemas.microsoft.com/office/drawing/2014/main" id="{46408DFA-ED9B-85E0-43F4-D76EC22CA284}"/>
+                <a16:creationId xmlns:a16="http://schemas.microsoft.com/office/drawing/2014/main" xmlns="" id="{46408DFA-ED9B-85E0-43F4-D76EC22CA284}"/>
               </a:ext>
             </a:extLst>
           </p:cNvPr>
@@ -2285,7 +2285,7 @@
           <p:cNvPr id="8" name="Marcador de pie de página 7">
             <a:extLst>
               <a:ext uri="{FF2B5EF4-FFF2-40B4-BE49-F238E27FC236}">
-                <a16:creationId xmlns="" xmlns:a16="http://schemas.microsoft.com/office/drawing/2014/main" id="{B616F6DF-AA3E-072D-4717-93B1D48354DD}"/>
+                <a16:creationId xmlns:a16="http://schemas.microsoft.com/office/drawing/2014/main" xmlns="" id="{B616F6DF-AA3E-072D-4717-93B1D48354DD}"/>
               </a:ext>
             </a:extLst>
           </p:cNvPr>
@@ -2310,7 +2310,7 @@
           <p:cNvPr id="9" name="Marcador de número de diapositiva 8">
             <a:extLst>
               <a:ext uri="{FF2B5EF4-FFF2-40B4-BE49-F238E27FC236}">
-                <a16:creationId xmlns="" xmlns:a16="http://schemas.microsoft.com/office/drawing/2014/main" id="{09AB09DC-E5C6-7D7D-977D-8340C0737E4D}"/>
+                <a16:creationId xmlns:a16="http://schemas.microsoft.com/office/drawing/2014/main" xmlns="" id="{09AB09DC-E5C6-7D7D-977D-8340C0737E4D}"/>
               </a:ext>
             </a:extLst>
           </p:cNvPr>
@@ -2369,7 +2369,7 @@
           <p:cNvPr id="2" name="Título 1">
             <a:extLst>
               <a:ext uri="{FF2B5EF4-FFF2-40B4-BE49-F238E27FC236}">
-                <a16:creationId xmlns="" xmlns:a16="http://schemas.microsoft.com/office/drawing/2014/main" id="{08011C47-A5E1-52D3-713F-69DAB3CBE5A3}"/>
+                <a16:creationId xmlns:a16="http://schemas.microsoft.com/office/drawing/2014/main" xmlns="" id="{08011C47-A5E1-52D3-713F-69DAB3CBE5A3}"/>
               </a:ext>
             </a:extLst>
           </p:cNvPr>
@@ -2398,7 +2398,7 @@
           <p:cNvPr id="3" name="Marcador de fecha 2">
             <a:extLst>
               <a:ext uri="{FF2B5EF4-FFF2-40B4-BE49-F238E27FC236}">
-                <a16:creationId xmlns="" xmlns:a16="http://schemas.microsoft.com/office/drawing/2014/main" id="{1C518C19-B858-A8DC-36D3-86800D8685BC}"/>
+                <a16:creationId xmlns:a16="http://schemas.microsoft.com/office/drawing/2014/main" xmlns="" id="{1C518C19-B858-A8DC-36D3-86800D8685BC}"/>
               </a:ext>
             </a:extLst>
           </p:cNvPr>
@@ -2427,7 +2427,7 @@
           <p:cNvPr id="4" name="Marcador de pie de página 3">
             <a:extLst>
               <a:ext uri="{FF2B5EF4-FFF2-40B4-BE49-F238E27FC236}">
-                <a16:creationId xmlns="" xmlns:a16="http://schemas.microsoft.com/office/drawing/2014/main" id="{41F53B55-5D75-1FD8-7305-4050FDD68411}"/>
+                <a16:creationId xmlns:a16="http://schemas.microsoft.com/office/drawing/2014/main" xmlns="" id="{41F53B55-5D75-1FD8-7305-4050FDD68411}"/>
               </a:ext>
             </a:extLst>
           </p:cNvPr>
@@ -2452,7 +2452,7 @@
           <p:cNvPr id="5" name="Marcador de número de diapositiva 4">
             <a:extLst>
               <a:ext uri="{FF2B5EF4-FFF2-40B4-BE49-F238E27FC236}">
-                <a16:creationId xmlns="" xmlns:a16="http://schemas.microsoft.com/office/drawing/2014/main" id="{500FEE24-67A8-7C20-546D-BCEB3EEE2CC7}"/>
+                <a16:creationId xmlns:a16="http://schemas.microsoft.com/office/drawing/2014/main" xmlns="" id="{500FEE24-67A8-7C20-546D-BCEB3EEE2CC7}"/>
               </a:ext>
             </a:extLst>
           </p:cNvPr>
@@ -2511,7 +2511,7 @@
           <p:cNvPr id="2" name="Marcador de fecha 1">
             <a:extLst>
               <a:ext uri="{FF2B5EF4-FFF2-40B4-BE49-F238E27FC236}">
-                <a16:creationId xmlns="" xmlns:a16="http://schemas.microsoft.com/office/drawing/2014/main" id="{DE40A591-B9B4-C1D0-2520-DB39CAD388E6}"/>
+                <a16:creationId xmlns:a16="http://schemas.microsoft.com/office/drawing/2014/main" xmlns="" id="{DE40A591-B9B4-C1D0-2520-DB39CAD388E6}"/>
               </a:ext>
             </a:extLst>
           </p:cNvPr>
@@ -2540,7 +2540,7 @@
           <p:cNvPr id="3" name="Marcador de pie de página 2">
             <a:extLst>
               <a:ext uri="{FF2B5EF4-FFF2-40B4-BE49-F238E27FC236}">
-                <a16:creationId xmlns="" xmlns:a16="http://schemas.microsoft.com/office/drawing/2014/main" id="{59DB7BC8-513F-96E7-0F35-8CDD700E2FC2}"/>
+                <a16:creationId xmlns:a16="http://schemas.microsoft.com/office/drawing/2014/main" xmlns="" id="{59DB7BC8-513F-96E7-0F35-8CDD700E2FC2}"/>
               </a:ext>
             </a:extLst>
           </p:cNvPr>
@@ -2565,7 +2565,7 @@
           <p:cNvPr id="4" name="Marcador de número de diapositiva 3">
             <a:extLst>
               <a:ext uri="{FF2B5EF4-FFF2-40B4-BE49-F238E27FC236}">
-                <a16:creationId xmlns="" xmlns:a16="http://schemas.microsoft.com/office/drawing/2014/main" id="{7AE4AC45-E002-BEEB-8B8E-44514FE6BF11}"/>
+                <a16:creationId xmlns:a16="http://schemas.microsoft.com/office/drawing/2014/main" xmlns="" id="{7AE4AC45-E002-BEEB-8B8E-44514FE6BF11}"/>
               </a:ext>
             </a:extLst>
           </p:cNvPr>
@@ -2624,7 +2624,7 @@
           <p:cNvPr id="2" name="Título 1">
             <a:extLst>
               <a:ext uri="{FF2B5EF4-FFF2-40B4-BE49-F238E27FC236}">
-                <a16:creationId xmlns="" xmlns:a16="http://schemas.microsoft.com/office/drawing/2014/main" id="{A6FC0222-34BC-EBA6-7A21-952CD9074429}"/>
+                <a16:creationId xmlns:a16="http://schemas.microsoft.com/office/drawing/2014/main" xmlns="" id="{A6FC0222-34BC-EBA6-7A21-952CD9074429}"/>
               </a:ext>
             </a:extLst>
           </p:cNvPr>
@@ -2662,7 +2662,7 @@
           <p:cNvPr id="3" name="Marcador de contenido 2">
             <a:extLst>
               <a:ext uri="{FF2B5EF4-FFF2-40B4-BE49-F238E27FC236}">
-                <a16:creationId xmlns="" xmlns:a16="http://schemas.microsoft.com/office/drawing/2014/main" id="{1B2DED37-96F5-2838-76FF-E8FC4633590A}"/>
+                <a16:creationId xmlns:a16="http://schemas.microsoft.com/office/drawing/2014/main" xmlns="" id="{1B2DED37-96F5-2838-76FF-E8FC4633590A}"/>
               </a:ext>
             </a:extLst>
           </p:cNvPr>
@@ -2753,7 +2753,7 @@
           <p:cNvPr id="4" name="Marcador de texto 3">
             <a:extLst>
               <a:ext uri="{FF2B5EF4-FFF2-40B4-BE49-F238E27FC236}">
-                <a16:creationId xmlns="" xmlns:a16="http://schemas.microsoft.com/office/drawing/2014/main" id="{F7204234-1783-9477-4B7F-9E1C2285F215}"/>
+                <a16:creationId xmlns:a16="http://schemas.microsoft.com/office/drawing/2014/main" xmlns="" id="{F7204234-1783-9477-4B7F-9E1C2285F215}"/>
               </a:ext>
             </a:extLst>
           </p:cNvPr>
@@ -2824,7 +2824,7 @@
           <p:cNvPr id="5" name="Marcador de fecha 4">
             <a:extLst>
               <a:ext uri="{FF2B5EF4-FFF2-40B4-BE49-F238E27FC236}">
-                <a16:creationId xmlns="" xmlns:a16="http://schemas.microsoft.com/office/drawing/2014/main" id="{E4AB8F47-7E0B-AC5B-B99B-1397BBF4E1B0}"/>
+                <a16:creationId xmlns:a16="http://schemas.microsoft.com/office/drawing/2014/main" xmlns="" id="{E4AB8F47-7E0B-AC5B-B99B-1397BBF4E1B0}"/>
               </a:ext>
             </a:extLst>
           </p:cNvPr>
@@ -2853,7 +2853,7 @@
           <p:cNvPr id="6" name="Marcador de pie de página 5">
             <a:extLst>
               <a:ext uri="{FF2B5EF4-FFF2-40B4-BE49-F238E27FC236}">
-                <a16:creationId xmlns="" xmlns:a16="http://schemas.microsoft.com/office/drawing/2014/main" id="{27444E72-2B34-6E35-EB8C-540D1757191F}"/>
+                <a16:creationId xmlns:a16="http://schemas.microsoft.com/office/drawing/2014/main" xmlns="" id="{27444E72-2B34-6E35-EB8C-540D1757191F}"/>
               </a:ext>
             </a:extLst>
           </p:cNvPr>
@@ -2878,7 +2878,7 @@
           <p:cNvPr id="7" name="Marcador de número de diapositiva 6">
             <a:extLst>
               <a:ext uri="{FF2B5EF4-FFF2-40B4-BE49-F238E27FC236}">
-                <a16:creationId xmlns="" xmlns:a16="http://schemas.microsoft.com/office/drawing/2014/main" id="{BA0BA796-5219-8949-D532-E68CFCD5B791}"/>
+                <a16:creationId xmlns:a16="http://schemas.microsoft.com/office/drawing/2014/main" xmlns="" id="{BA0BA796-5219-8949-D532-E68CFCD5B791}"/>
               </a:ext>
             </a:extLst>
           </p:cNvPr>
@@ -2937,7 +2937,7 @@
           <p:cNvPr id="2" name="Título 1">
             <a:extLst>
               <a:ext uri="{FF2B5EF4-FFF2-40B4-BE49-F238E27FC236}">
-                <a16:creationId xmlns="" xmlns:a16="http://schemas.microsoft.com/office/drawing/2014/main" id="{DF931805-E0DF-1EF9-C110-CAC93E17C24B}"/>
+                <a16:creationId xmlns:a16="http://schemas.microsoft.com/office/drawing/2014/main" xmlns="" id="{DF931805-E0DF-1EF9-C110-CAC93E17C24B}"/>
               </a:ext>
             </a:extLst>
           </p:cNvPr>
@@ -2975,7 +2975,7 @@
           <p:cNvPr id="3" name="Marcador de posición de imagen 2">
             <a:extLst>
               <a:ext uri="{FF2B5EF4-FFF2-40B4-BE49-F238E27FC236}">
-                <a16:creationId xmlns="" xmlns:a16="http://schemas.microsoft.com/office/drawing/2014/main" id="{D13ACECD-8E37-357C-8FBF-04124CEBC472}"/>
+                <a16:creationId xmlns:a16="http://schemas.microsoft.com/office/drawing/2014/main" xmlns="" id="{D13ACECD-8E37-357C-8FBF-04124CEBC472}"/>
               </a:ext>
             </a:extLst>
           </p:cNvPr>
@@ -3042,7 +3042,7 @@
           <p:cNvPr id="4" name="Marcador de texto 3">
             <a:extLst>
               <a:ext uri="{FF2B5EF4-FFF2-40B4-BE49-F238E27FC236}">
-                <a16:creationId xmlns="" xmlns:a16="http://schemas.microsoft.com/office/drawing/2014/main" id="{A76933F9-CE62-7A51-2526-EF47F52B49CD}"/>
+                <a16:creationId xmlns:a16="http://schemas.microsoft.com/office/drawing/2014/main" xmlns="" id="{A76933F9-CE62-7A51-2526-EF47F52B49CD}"/>
               </a:ext>
             </a:extLst>
           </p:cNvPr>
@@ -3113,7 +3113,7 @@
           <p:cNvPr id="5" name="Marcador de fecha 4">
             <a:extLst>
               <a:ext uri="{FF2B5EF4-FFF2-40B4-BE49-F238E27FC236}">
-                <a16:creationId xmlns="" xmlns:a16="http://schemas.microsoft.com/office/drawing/2014/main" id="{61295AB3-0527-0650-4A5E-8E39C3FEBC5F}"/>
+                <a16:creationId xmlns:a16="http://schemas.microsoft.com/office/drawing/2014/main" xmlns="" id="{61295AB3-0527-0650-4A5E-8E39C3FEBC5F}"/>
               </a:ext>
             </a:extLst>
           </p:cNvPr>
@@ -3142,7 +3142,7 @@
           <p:cNvPr id="6" name="Marcador de pie de página 5">
             <a:extLst>
               <a:ext uri="{FF2B5EF4-FFF2-40B4-BE49-F238E27FC236}">
-                <a16:creationId xmlns="" xmlns:a16="http://schemas.microsoft.com/office/drawing/2014/main" id="{EC74B01D-04E3-41D7-9835-5139255EA9B1}"/>
+                <a16:creationId xmlns:a16="http://schemas.microsoft.com/office/drawing/2014/main" xmlns="" id="{EC74B01D-04E3-41D7-9835-5139255EA9B1}"/>
               </a:ext>
             </a:extLst>
           </p:cNvPr>
@@ -3167,7 +3167,7 @@
           <p:cNvPr id="7" name="Marcador de número de diapositiva 6">
             <a:extLst>
               <a:ext uri="{FF2B5EF4-FFF2-40B4-BE49-F238E27FC236}">
-                <a16:creationId xmlns="" xmlns:a16="http://schemas.microsoft.com/office/drawing/2014/main" id="{09D3E2DD-D6F1-4D4F-8C0B-D77DCA7B4F41}"/>
+                <a16:creationId xmlns:a16="http://schemas.microsoft.com/office/drawing/2014/main" xmlns="" id="{09D3E2DD-D6F1-4D4F-8C0B-D77DCA7B4F41}"/>
               </a:ext>
             </a:extLst>
           </p:cNvPr>
@@ -3231,7 +3231,7 @@
           <p:cNvPr id="2" name="Marcador de título 1">
             <a:extLst>
               <a:ext uri="{FF2B5EF4-FFF2-40B4-BE49-F238E27FC236}">
-                <a16:creationId xmlns="" xmlns:a16="http://schemas.microsoft.com/office/drawing/2014/main" id="{D700FFC7-6AF2-7718-31AD-61B3B9EAFA0E}"/>
+                <a16:creationId xmlns:a16="http://schemas.microsoft.com/office/drawing/2014/main" xmlns="" id="{D700FFC7-6AF2-7718-31AD-61B3B9EAFA0E}"/>
               </a:ext>
             </a:extLst>
           </p:cNvPr>
@@ -3270,7 +3270,7 @@
           <p:cNvPr id="3" name="Marcador de texto 2">
             <a:extLst>
               <a:ext uri="{FF2B5EF4-FFF2-40B4-BE49-F238E27FC236}">
-                <a16:creationId xmlns="" xmlns:a16="http://schemas.microsoft.com/office/drawing/2014/main" id="{D0845A47-E640-38C6-B77C-4374D64C3E73}"/>
+                <a16:creationId xmlns:a16="http://schemas.microsoft.com/office/drawing/2014/main" xmlns="" id="{D0845A47-E640-38C6-B77C-4374D64C3E73}"/>
               </a:ext>
             </a:extLst>
           </p:cNvPr>
@@ -3338,7 +3338,7 @@
           <p:cNvPr id="4" name="Marcador de fecha 3">
             <a:extLst>
               <a:ext uri="{FF2B5EF4-FFF2-40B4-BE49-F238E27FC236}">
-                <a16:creationId xmlns="" xmlns:a16="http://schemas.microsoft.com/office/drawing/2014/main" id="{BA621615-6EE4-8999-4974-FC8345B0F043}"/>
+                <a16:creationId xmlns:a16="http://schemas.microsoft.com/office/drawing/2014/main" xmlns="" id="{BA621615-6EE4-8999-4974-FC8345B0F043}"/>
               </a:ext>
             </a:extLst>
           </p:cNvPr>
@@ -3385,7 +3385,7 @@
           <p:cNvPr id="5" name="Marcador de pie de página 4">
             <a:extLst>
               <a:ext uri="{FF2B5EF4-FFF2-40B4-BE49-F238E27FC236}">
-                <a16:creationId xmlns="" xmlns:a16="http://schemas.microsoft.com/office/drawing/2014/main" id="{1453D141-D99F-08DF-89A5-CE133A10F331}"/>
+                <a16:creationId xmlns:a16="http://schemas.microsoft.com/office/drawing/2014/main" xmlns="" id="{1453D141-D99F-08DF-89A5-CE133A10F331}"/>
               </a:ext>
             </a:extLst>
           </p:cNvPr>
@@ -3428,7 +3428,7 @@
           <p:cNvPr id="6" name="Marcador de número de diapositiva 5">
             <a:extLst>
               <a:ext uri="{FF2B5EF4-FFF2-40B4-BE49-F238E27FC236}">
-                <a16:creationId xmlns="" xmlns:a16="http://schemas.microsoft.com/office/drawing/2014/main" id="{E4B33CF8-1115-CD03-F7AD-24C3565823E7}"/>
+                <a16:creationId xmlns:a16="http://schemas.microsoft.com/office/drawing/2014/main" xmlns="" id="{E4B33CF8-1115-CD03-F7AD-24C3565823E7}"/>
               </a:ext>
             </a:extLst>
           </p:cNvPr>
@@ -3796,7 +3796,7 @@
           <p:cNvPr id="9" name="Imagen 8">
             <a:extLst>
               <a:ext uri="{FF2B5EF4-FFF2-40B4-BE49-F238E27FC236}">
-                <a16:creationId xmlns="" xmlns:a16="http://schemas.microsoft.com/office/drawing/2014/main" id="{6635DCF3-F7E3-2C45-9336-47CAE85718A4}"/>
+                <a16:creationId xmlns:a16="http://schemas.microsoft.com/office/drawing/2014/main" xmlns="" id="{6635DCF3-F7E3-2C45-9336-47CAE85718A4}"/>
               </a:ext>
             </a:extLst>
           </p:cNvPr>
@@ -3825,7 +3825,7 @@
           <p:cNvPr id="2" name="Título 1">
             <a:extLst>
               <a:ext uri="{FF2B5EF4-FFF2-40B4-BE49-F238E27FC236}">
-                <a16:creationId xmlns="" xmlns:a16="http://schemas.microsoft.com/office/drawing/2014/main" id="{5EF8233C-F3DA-2ABC-9288-4BCD7433344C}"/>
+                <a16:creationId xmlns:a16="http://schemas.microsoft.com/office/drawing/2014/main" xmlns="" id="{5EF8233C-F3DA-2ABC-9288-4BCD7433344C}"/>
               </a:ext>
             </a:extLst>
           </p:cNvPr>
@@ -3900,7 +3900,7 @@
           <p:cNvPr id="3" name="Subtítulo 2">
             <a:extLst>
               <a:ext uri="{FF2B5EF4-FFF2-40B4-BE49-F238E27FC236}">
-                <a16:creationId xmlns="" xmlns:a16="http://schemas.microsoft.com/office/drawing/2014/main" id="{EC6C3CBE-087A-6EFC-794A-BF6D55DB7543}"/>
+                <a16:creationId xmlns:a16="http://schemas.microsoft.com/office/drawing/2014/main" xmlns="" id="{EC6C3CBE-087A-6EFC-794A-BF6D55DB7543}"/>
               </a:ext>
             </a:extLst>
           </p:cNvPr>
@@ -3961,7 +3961,7 @@
           <p:cNvPr id="12" name="Subtítulo 2">
             <a:extLst>
               <a:ext uri="{FF2B5EF4-FFF2-40B4-BE49-F238E27FC236}">
-                <a16:creationId xmlns="" xmlns:a16="http://schemas.microsoft.com/office/drawing/2014/main" id="{ECC718EC-22DC-2FC1-E7BF-660F4465FB20}"/>
+                <a16:creationId xmlns:a16="http://schemas.microsoft.com/office/drawing/2014/main" xmlns="" id="{ECC718EC-22DC-2FC1-E7BF-660F4465FB20}"/>
               </a:ext>
             </a:extLst>
           </p:cNvPr>
@@ -4164,7 +4164,7 @@
           <p:cNvPr id="1028" name="Picture 4" descr="Uanl vector logo - Uanl logo vector free download">
             <a:extLst>
               <a:ext uri="{FF2B5EF4-FFF2-40B4-BE49-F238E27FC236}">
-                <a16:creationId xmlns="" xmlns:a16="http://schemas.microsoft.com/office/drawing/2014/main" id="{A1EF89F4-4576-B62D-20F9-D2FF8A2E246A}"/>
+                <a16:creationId xmlns:a16="http://schemas.microsoft.com/office/drawing/2014/main" xmlns="" id="{A1EF89F4-4576-B62D-20F9-D2FF8A2E246A}"/>
               </a:ext>
             </a:extLst>
           </p:cNvPr>
@@ -4211,7 +4211,7 @@
           <p:cNvPr id="17" name="Grupo 16">
             <a:extLst>
               <a:ext uri="{FF2B5EF4-FFF2-40B4-BE49-F238E27FC236}">
-                <a16:creationId xmlns="" xmlns:a16="http://schemas.microsoft.com/office/drawing/2014/main" id="{BD8C79D3-8F40-4825-FCB3-7DA537F5D17C}"/>
+                <a16:creationId xmlns:a16="http://schemas.microsoft.com/office/drawing/2014/main" xmlns="" id="{BD8C79D3-8F40-4825-FCB3-7DA537F5D17C}"/>
               </a:ext>
             </a:extLst>
           </p:cNvPr>
@@ -4231,7 +4231,7 @@
             <p:cNvPr id="14" name="Grupo 13">
               <a:extLst>
                 <a:ext uri="{FF2B5EF4-FFF2-40B4-BE49-F238E27FC236}">
-                  <a16:creationId xmlns="" xmlns:a16="http://schemas.microsoft.com/office/drawing/2014/main" id="{7618CDC3-6984-FA21-1D90-EF5639665330}"/>
+                  <a16:creationId xmlns:a16="http://schemas.microsoft.com/office/drawing/2014/main" xmlns="" id="{7618CDC3-6984-FA21-1D90-EF5639665330}"/>
                 </a:ext>
               </a:extLst>
             </p:cNvPr>
@@ -4251,7 +4251,7 @@
               <p:cNvPr id="1034" name="Picture 10" descr="Universidad Autónoma de Nuevo León">
                 <a:extLst>
                   <a:ext uri="{FF2B5EF4-FFF2-40B4-BE49-F238E27FC236}">
-                    <a16:creationId xmlns="" xmlns:a16="http://schemas.microsoft.com/office/drawing/2014/main" id="{614962FF-F8BC-8C60-D531-371C411ED902}"/>
+                    <a16:creationId xmlns:a16="http://schemas.microsoft.com/office/drawing/2014/main" xmlns="" id="{614962FF-F8BC-8C60-D531-371C411ED902}"/>
                   </a:ext>
                 </a:extLst>
               </p:cNvPr>
@@ -4298,7 +4298,7 @@
               <p:cNvPr id="1036" name="Picture 12" descr="Fisico Matematico Logo Símbolos Coloridos De La Matemáticas 3d Stock">
                 <a:extLst>
                   <a:ext uri="{FF2B5EF4-FFF2-40B4-BE49-F238E27FC236}">
-                    <a16:creationId xmlns="" xmlns:a16="http://schemas.microsoft.com/office/drawing/2014/main" id="{9DCF93C1-4712-9517-4CC0-A6074B26C461}"/>
+                    <a16:creationId xmlns:a16="http://schemas.microsoft.com/office/drawing/2014/main" xmlns="" id="{9DCF93C1-4712-9517-4CC0-A6074B26C461}"/>
                   </a:ext>
                 </a:extLst>
               </p:cNvPr>
@@ -4344,7 +4344,7 @@
             <p:cNvPr id="16" name="Imagen 15" descr="Logotipo, nombre de la empresa&#10;&#10;El contenido generado por IA puede ser incorrecto.">
               <a:extLst>
                 <a:ext uri="{FF2B5EF4-FFF2-40B4-BE49-F238E27FC236}">
-                  <a16:creationId xmlns="" xmlns:a16="http://schemas.microsoft.com/office/drawing/2014/main" id="{75D454CB-F38D-CAA4-CC76-179590684C55}"/>
+                  <a16:creationId xmlns:a16="http://schemas.microsoft.com/office/drawing/2014/main" xmlns="" id="{75D454CB-F38D-CAA4-CC76-179590684C55}"/>
                 </a:ext>
               </a:extLst>
             </p:cNvPr>
@@ -4418,7 +4418,7 @@
           <p:cNvPr id="2" name="Título 1">
             <a:extLst>
               <a:ext uri="{FF2B5EF4-FFF2-40B4-BE49-F238E27FC236}">
-                <a16:creationId xmlns="" xmlns:a16="http://schemas.microsoft.com/office/drawing/2014/main" id="{7C97405F-E812-8ECA-0FBF-DE395633D086}"/>
+                <a16:creationId xmlns:a16="http://schemas.microsoft.com/office/drawing/2014/main" xmlns="" id="{7C97405F-E812-8ECA-0FBF-DE395633D086}"/>
               </a:ext>
             </a:extLst>
           </p:cNvPr>
@@ -4451,7 +4451,7 @@
           <p:cNvPr id="3" name="Marcador de contenido 2">
             <a:extLst>
               <a:ext uri="{FF2B5EF4-FFF2-40B4-BE49-F238E27FC236}">
-                <a16:creationId xmlns="" xmlns:a16="http://schemas.microsoft.com/office/drawing/2014/main" id="{4895F9A4-5583-A4D7-2C26-2C99E36AFD03}"/>
+                <a16:creationId xmlns:a16="http://schemas.microsoft.com/office/drawing/2014/main" xmlns="" id="{4895F9A4-5583-A4D7-2C26-2C99E36AFD03}"/>
               </a:ext>
             </a:extLst>
           </p:cNvPr>
@@ -4594,7 +4594,7 @@
           <p:cNvPr id="11" name="Imagen 10">
             <a:extLst>
               <a:ext uri="{FF2B5EF4-FFF2-40B4-BE49-F238E27FC236}">
-                <a16:creationId xmlns="" xmlns:a16="http://schemas.microsoft.com/office/drawing/2014/main" id="{0D66D670-FACF-9D43-855E-DD4781E3E832}"/>
+                <a16:creationId xmlns:a16="http://schemas.microsoft.com/office/drawing/2014/main" xmlns="" id="{0D66D670-FACF-9D43-855E-DD4781E3E832}"/>
               </a:ext>
             </a:extLst>
           </p:cNvPr>
@@ -4660,7 +4660,7 @@
           <p:cNvPr id="2" name="Título 1">
             <a:extLst>
               <a:ext uri="{FF2B5EF4-FFF2-40B4-BE49-F238E27FC236}">
-                <a16:creationId xmlns="" xmlns:a16="http://schemas.microsoft.com/office/drawing/2014/main" id="{670F0C23-FE50-8839-B107-C21CD5459C01}"/>
+                <a16:creationId xmlns:a16="http://schemas.microsoft.com/office/drawing/2014/main" xmlns="" id="{670F0C23-FE50-8839-B107-C21CD5459C01}"/>
               </a:ext>
             </a:extLst>
           </p:cNvPr>
@@ -4706,7 +4706,7 @@
           <p:cNvPr id="3" name="Marcador de contenido 2">
             <a:extLst>
               <a:ext uri="{FF2B5EF4-FFF2-40B4-BE49-F238E27FC236}">
-                <a16:creationId xmlns="" xmlns:a16="http://schemas.microsoft.com/office/drawing/2014/main" id="{3D773A57-4E75-6D1E-BD6A-ACA49DF5A864}"/>
+                <a16:creationId xmlns:a16="http://schemas.microsoft.com/office/drawing/2014/main" xmlns="" id="{3D773A57-4E75-6D1E-BD6A-ACA49DF5A864}"/>
               </a:ext>
             </a:extLst>
           </p:cNvPr>
@@ -4791,7 +4791,7 @@
           <p:cNvPr id="4" name="Marcador de contenido 3">
             <a:extLst>
               <a:ext uri="{FF2B5EF4-FFF2-40B4-BE49-F238E27FC236}">
-                <a16:creationId xmlns="" xmlns:a16="http://schemas.microsoft.com/office/drawing/2014/main" id="{3AE55076-95D7-6938-72E0-C14CE7451679}"/>
+                <a16:creationId xmlns:a16="http://schemas.microsoft.com/office/drawing/2014/main" xmlns="" id="{3AE55076-95D7-6938-72E0-C14CE7451679}"/>
               </a:ext>
             </a:extLst>
           </p:cNvPr>
@@ -4929,7 +4929,7 @@
           <p:cNvPr id="5" name="Tabla 4">
             <a:extLst>
               <a:ext uri="{FF2B5EF4-FFF2-40B4-BE49-F238E27FC236}">
-                <a16:creationId xmlns="" xmlns:a16="http://schemas.microsoft.com/office/drawing/2014/main" id="{3F889370-93F9-1314-1BDB-2E9965A626D3}"/>
+                <a16:creationId xmlns:a16="http://schemas.microsoft.com/office/drawing/2014/main" xmlns="" id="{3F889370-93F9-1314-1BDB-2E9965A626D3}"/>
               </a:ext>
             </a:extLst>
           </p:cNvPr>
@@ -4958,35 +4958,35 @@
                 <a:gridCol w="805862">
                   <a:extLst>
                     <a:ext uri="{9D8B030D-6E8A-4147-A177-3AD203B41FA5}">
-                      <a16:colId xmlns="" xmlns:a16="http://schemas.microsoft.com/office/drawing/2014/main" val="2750924333"/>
+                      <a16:colId xmlns:a16="http://schemas.microsoft.com/office/drawing/2014/main" xmlns="" val="2750924333"/>
                     </a:ext>
                   </a:extLst>
                 </a:gridCol>
                 <a:gridCol w="929594">
                   <a:extLst>
                     <a:ext uri="{9D8B030D-6E8A-4147-A177-3AD203B41FA5}">
-                      <a16:colId xmlns="" xmlns:a16="http://schemas.microsoft.com/office/drawing/2014/main" val="3380261392"/>
+                      <a16:colId xmlns:a16="http://schemas.microsoft.com/office/drawing/2014/main" xmlns="" val="3380261392"/>
                     </a:ext>
                   </a:extLst>
                 </a:gridCol>
                 <a:gridCol w="1005840">
                   <a:extLst>
                     <a:ext uri="{9D8B030D-6E8A-4147-A177-3AD203B41FA5}">
-                      <a16:colId xmlns="" xmlns:a16="http://schemas.microsoft.com/office/drawing/2014/main" val="1252838564"/>
+                      <a16:colId xmlns:a16="http://schemas.microsoft.com/office/drawing/2014/main" xmlns="" val="1252838564"/>
                     </a:ext>
                   </a:extLst>
                 </a:gridCol>
                 <a:gridCol w="994410">
                   <a:extLst>
                     <a:ext uri="{9D8B030D-6E8A-4147-A177-3AD203B41FA5}">
-                      <a16:colId xmlns="" xmlns:a16="http://schemas.microsoft.com/office/drawing/2014/main" val="3201789192"/>
+                      <a16:colId xmlns:a16="http://schemas.microsoft.com/office/drawing/2014/main" xmlns="" val="3201789192"/>
                     </a:ext>
                   </a:extLst>
                 </a:gridCol>
                 <a:gridCol w="1123949">
                   <a:extLst>
                     <a:ext uri="{9D8B030D-6E8A-4147-A177-3AD203B41FA5}">
-                      <a16:colId xmlns="" xmlns:a16="http://schemas.microsoft.com/office/drawing/2014/main" val="3139399000"/>
+                      <a16:colId xmlns:a16="http://schemas.microsoft.com/office/drawing/2014/main" xmlns="" val="3139399000"/>
                     </a:ext>
                   </a:extLst>
                 </a:gridCol>
@@ -5131,7 +5131,7 @@
                 </a:tc>
                 <a:extLst>
                   <a:ext uri="{0D108BD9-81ED-4DB2-BD59-A6C34878D82A}">
-                    <a16:rowId xmlns="" xmlns:a16="http://schemas.microsoft.com/office/drawing/2014/main" val="2526786794"/>
+                    <a16:rowId xmlns:a16="http://schemas.microsoft.com/office/drawing/2014/main" xmlns="" val="2526786794"/>
                   </a:ext>
                 </a:extLst>
               </a:tr>
@@ -5268,7 +5268,7 @@
                 </a:tc>
                 <a:extLst>
                   <a:ext uri="{0D108BD9-81ED-4DB2-BD59-A6C34878D82A}">
-                    <a16:rowId xmlns="" xmlns:a16="http://schemas.microsoft.com/office/drawing/2014/main" val="2478043974"/>
+                    <a16:rowId xmlns:a16="http://schemas.microsoft.com/office/drawing/2014/main" xmlns="" val="2478043974"/>
                   </a:ext>
                 </a:extLst>
               </a:tr>
@@ -5318,7 +5318,7 @@
           <p:cNvPr id="2" name="Título 1">
             <a:extLst>
               <a:ext uri="{FF2B5EF4-FFF2-40B4-BE49-F238E27FC236}">
-                <a16:creationId xmlns="" xmlns:a16="http://schemas.microsoft.com/office/drawing/2014/main" id="{BAB3C702-D01F-22C8-A53B-ED6B01BB12EA}"/>
+                <a16:creationId xmlns:a16="http://schemas.microsoft.com/office/drawing/2014/main" xmlns="" id="{BAB3C702-D01F-22C8-A53B-ED6B01BB12EA}"/>
               </a:ext>
             </a:extLst>
           </p:cNvPr>
@@ -5337,7 +5337,10 @@
           <a:lstStyle/>
           <a:p>
             <a:r>
-              <a:rPr lang="es-MX" sz="3600" dirty="0"/>
+              <a:rPr lang="es-MX" sz="3400" dirty="0">
+                <a:latin typeface="Times New Roman" panose="02020603050405020304" pitchFamily="18" charset="0"/>
+                <a:cs typeface="Times New Roman" panose="02020603050405020304" pitchFamily="18" charset="0"/>
+              </a:rPr>
               <a:t>Antecedentes</a:t>
             </a:r>
           </a:p>
@@ -5348,7 +5351,7 @@
           <p:cNvPr id="3" name="Marcador de contenido 2">
             <a:extLst>
               <a:ext uri="{FF2B5EF4-FFF2-40B4-BE49-F238E27FC236}">
-                <a16:creationId xmlns="" xmlns:a16="http://schemas.microsoft.com/office/drawing/2014/main" id="{2D8CD9DD-E26B-97A0-50D8-9A66444B9BE2}"/>
+                <a16:creationId xmlns:a16="http://schemas.microsoft.com/office/drawing/2014/main" xmlns="" id="{2D8CD9DD-E26B-97A0-50D8-9A66444B9BE2}"/>
               </a:ext>
             </a:extLst>
           </p:cNvPr>
@@ -5359,17 +5362,228 @@
             <p:ph idx="1"/>
           </p:nvPr>
         </p:nvSpPr>
-        <p:spPr/>
-        <p:txBody>
-          <a:bodyPr/>
+        <p:spPr>
+          <a:xfrm>
+            <a:off x="838200" y="1436914"/>
+            <a:ext cx="7038703" cy="4740049"/>
+          </a:xfrm>
+        </p:spPr>
+        <p:txBody>
+          <a:bodyPr>
+            <a:normAutofit fontScale="92500" lnSpcReduction="10000"/>
+          </a:bodyPr>
           <a:lstStyle/>
+          <a:p>
+            <a:pPr marL="514350" indent="-514350">
+              <a:buFont typeface="+mj-lt"/>
+              <a:buAutoNum type="romanUcPeriod"/>
+            </a:pPr>
+            <a:r>
+              <a:rPr lang="es-ES" sz="2400" dirty="0" smtClean="0">
+                <a:latin typeface="Times New Roman" panose="02020603050405020304" pitchFamily="18" charset="0"/>
+                <a:cs typeface="Times New Roman" panose="02020603050405020304" pitchFamily="18" charset="0"/>
+              </a:rPr>
+              <a:t>Los </a:t>
+            </a:r>
+            <a:r>
+              <a:rPr lang="es-ES" sz="2400" dirty="0">
+                <a:latin typeface="Times New Roman" panose="02020603050405020304" pitchFamily="18" charset="0"/>
+                <a:cs typeface="Times New Roman" panose="02020603050405020304" pitchFamily="18" charset="0"/>
+              </a:rPr>
+              <a:t>primeros SRM (motores de cohete de combustible sólido) fueron usados por los chinos hace 2000 años en fuegos artificiales</a:t>
+            </a:r>
+            <a:r>
+              <a:rPr lang="es-ES" sz="2400" dirty="0" smtClean="0">
+                <a:latin typeface="Times New Roman" panose="02020603050405020304" pitchFamily="18" charset="0"/>
+                <a:cs typeface="Times New Roman" panose="02020603050405020304" pitchFamily="18" charset="0"/>
+              </a:rPr>
+              <a:t>.</a:t>
+            </a:r>
+          </a:p>
+          <a:p>
+            <a:pPr marL="514350" indent="-514350">
+              <a:buFont typeface="+mj-lt"/>
+              <a:buAutoNum type="romanUcPeriod"/>
+            </a:pPr>
+            <a:r>
+              <a:rPr lang="es-ES" sz="2400" dirty="0" smtClean="0">
+                <a:latin typeface="Times New Roman" panose="02020603050405020304" pitchFamily="18" charset="0"/>
+                <a:cs typeface="Times New Roman" panose="02020603050405020304" pitchFamily="18" charset="0"/>
+              </a:rPr>
+              <a:t>Poca </a:t>
+            </a:r>
+            <a:r>
+              <a:rPr lang="es-ES" sz="2400" dirty="0">
+                <a:latin typeface="Times New Roman" panose="02020603050405020304" pitchFamily="18" charset="0"/>
+                <a:cs typeface="Times New Roman" panose="02020603050405020304" pitchFamily="18" charset="0"/>
+              </a:rPr>
+              <a:t>precisión debido a la falta de buenos </a:t>
+            </a:r>
+            <a:r>
+              <a:rPr lang="es-ES" sz="2400" dirty="0" err="1">
+                <a:latin typeface="Times New Roman" panose="02020603050405020304" pitchFamily="18" charset="0"/>
+                <a:cs typeface="Times New Roman" panose="02020603050405020304" pitchFamily="18" charset="0"/>
+              </a:rPr>
+              <a:t>propelentes</a:t>
+            </a:r>
+            <a:r>
+              <a:rPr lang="es-ES" sz="2400" dirty="0" smtClean="0">
+                <a:latin typeface="Times New Roman" panose="02020603050405020304" pitchFamily="18" charset="0"/>
+                <a:cs typeface="Times New Roman" panose="02020603050405020304" pitchFamily="18" charset="0"/>
+              </a:rPr>
+              <a:t>.</a:t>
+            </a:r>
+          </a:p>
+          <a:p>
+            <a:pPr marL="514350" indent="-514350">
+              <a:buFont typeface="+mj-lt"/>
+              <a:buAutoNum type="romanUcPeriod"/>
+            </a:pPr>
+            <a:r>
+              <a:rPr lang="es-ES" sz="2400" dirty="0" smtClean="0">
+                <a:latin typeface="Times New Roman" panose="02020603050405020304" pitchFamily="18" charset="0"/>
+                <a:cs typeface="Times New Roman" panose="02020603050405020304" pitchFamily="18" charset="0"/>
+              </a:rPr>
+              <a:t>Entre </a:t>
+            </a:r>
+            <a:r>
+              <a:rPr lang="es-ES" sz="2400" dirty="0">
+                <a:latin typeface="Times New Roman" panose="02020603050405020304" pitchFamily="18" charset="0"/>
+                <a:cs typeface="Times New Roman" panose="02020603050405020304" pitchFamily="18" charset="0"/>
+              </a:rPr>
+              <a:t>1890 y 1940, los </a:t>
+            </a:r>
+            <a:r>
+              <a:rPr lang="es-ES" sz="2400" dirty="0" err="1">
+                <a:latin typeface="Times New Roman" panose="02020603050405020304" pitchFamily="18" charset="0"/>
+                <a:cs typeface="Times New Roman" panose="02020603050405020304" pitchFamily="18" charset="0"/>
+              </a:rPr>
+              <a:t>propelentes</a:t>
+            </a:r>
+            <a:r>
+              <a:rPr lang="es-ES" sz="2400" dirty="0">
+                <a:latin typeface="Times New Roman" panose="02020603050405020304" pitchFamily="18" charset="0"/>
+                <a:cs typeface="Times New Roman" panose="02020603050405020304" pitchFamily="18" charset="0"/>
+              </a:rPr>
+              <a:t> sólidos (SP) fueron considerados para vuelos espaciales, pero se desarrolló un progreso significativo más durante la Segunda Guerra Mundial</a:t>
+            </a:r>
+            <a:r>
+              <a:rPr lang="es-ES" sz="2400" dirty="0" smtClean="0">
+                <a:latin typeface="Times New Roman" panose="02020603050405020304" pitchFamily="18" charset="0"/>
+                <a:cs typeface="Times New Roman" panose="02020603050405020304" pitchFamily="18" charset="0"/>
+              </a:rPr>
+              <a:t>.</a:t>
+            </a:r>
+          </a:p>
+          <a:p>
+            <a:pPr marL="514350" indent="-514350">
+              <a:buFont typeface="+mj-lt"/>
+              <a:buAutoNum type="romanUcPeriod"/>
+            </a:pPr>
+            <a:r>
+              <a:rPr lang="es-ES" sz="2400" dirty="0" smtClean="0">
+                <a:latin typeface="Times New Roman" panose="02020603050405020304" pitchFamily="18" charset="0"/>
+                <a:cs typeface="Times New Roman" panose="02020603050405020304" pitchFamily="18" charset="0"/>
+              </a:rPr>
+              <a:t>La </a:t>
+            </a:r>
+            <a:r>
+              <a:rPr lang="es-ES" sz="2400" dirty="0">
+                <a:latin typeface="Times New Roman" panose="02020603050405020304" pitchFamily="18" charset="0"/>
+                <a:cs typeface="Times New Roman" panose="02020603050405020304" pitchFamily="18" charset="0"/>
+              </a:rPr>
+              <a:t>propulsión de cohetes sólidos moderna comenzó cuando Jack Parsons inventó el SRM compuesto moldeable (</a:t>
+            </a:r>
+            <a:r>
+              <a:rPr lang="es-ES" sz="2400" dirty="0" err="1">
+                <a:latin typeface="Times New Roman" panose="02020603050405020304" pitchFamily="18" charset="0"/>
+                <a:cs typeface="Times New Roman" panose="02020603050405020304" pitchFamily="18" charset="0"/>
+              </a:rPr>
+              <a:t>castable</a:t>
+            </a:r>
+            <a:r>
+              <a:rPr lang="es-ES" sz="2400" dirty="0">
+                <a:latin typeface="Times New Roman" panose="02020603050405020304" pitchFamily="18" charset="0"/>
+                <a:cs typeface="Times New Roman" panose="02020603050405020304" pitchFamily="18" charset="0"/>
+              </a:rPr>
+              <a:t> </a:t>
+            </a:r>
+            <a:r>
+              <a:rPr lang="es-ES" sz="2400" dirty="0" err="1">
+                <a:latin typeface="Times New Roman" panose="02020603050405020304" pitchFamily="18" charset="0"/>
+                <a:cs typeface="Times New Roman" panose="02020603050405020304" pitchFamily="18" charset="0"/>
+              </a:rPr>
+              <a:t>composite</a:t>
+            </a:r>
+            <a:r>
+              <a:rPr lang="es-ES" sz="2400" dirty="0">
+                <a:latin typeface="Times New Roman" panose="02020603050405020304" pitchFamily="18" charset="0"/>
+                <a:cs typeface="Times New Roman" panose="02020603050405020304" pitchFamily="18" charset="0"/>
+              </a:rPr>
+              <a:t>) en 1942.</a:t>
+            </a:r>
+            <a:endParaRPr lang="es-MX" sz="2400" dirty="0" smtClean="0">
+              <a:latin typeface="Times New Roman" panose="02020603050405020304" pitchFamily="18" charset="0"/>
+              <a:cs typeface="Times New Roman" panose="02020603050405020304" pitchFamily="18" charset="0"/>
+            </a:endParaRPr>
+          </a:p>
+          <a:p>
+            <a:pPr marL="0" indent="0">
+              <a:buNone/>
+            </a:pPr>
+            <a:r>
+              <a:rPr lang="es-MX" sz="2400" dirty="0" smtClean="0">
+                <a:latin typeface="Times New Roman" panose="02020603050405020304" pitchFamily="18" charset="0"/>
+                <a:cs typeface="Times New Roman" panose="02020603050405020304" pitchFamily="18" charset="0"/>
+              </a:rPr>
+              <a:t>Organizaciones </a:t>
+            </a:r>
+            <a:r>
+              <a:rPr lang="es-MX" sz="2400" dirty="0">
+                <a:latin typeface="Times New Roman" panose="02020603050405020304" pitchFamily="18" charset="0"/>
+                <a:cs typeface="Times New Roman" panose="02020603050405020304" pitchFamily="18" charset="0"/>
+              </a:rPr>
+              <a:t>(</a:t>
+            </a:r>
+            <a:r>
+              <a:rPr lang="es-MX" sz="2400" dirty="0" err="1">
+                <a:latin typeface="Times New Roman" panose="02020603050405020304" pitchFamily="18" charset="0"/>
+                <a:cs typeface="Times New Roman" panose="02020603050405020304" pitchFamily="18" charset="0"/>
+              </a:rPr>
+              <a:t>tripoli</a:t>
+            </a:r>
+            <a:r>
+              <a:rPr lang="es-MX" sz="2400" dirty="0">
+                <a:latin typeface="Times New Roman" panose="02020603050405020304" pitchFamily="18" charset="0"/>
+                <a:cs typeface="Times New Roman" panose="02020603050405020304" pitchFamily="18" charset="0"/>
+              </a:rPr>
+              <a:t>, </a:t>
+            </a:r>
+            <a:r>
+              <a:rPr lang="es-MX" sz="2400" dirty="0" err="1">
+                <a:latin typeface="Times New Roman" panose="02020603050405020304" pitchFamily="18" charset="0"/>
+                <a:cs typeface="Times New Roman" panose="02020603050405020304" pitchFamily="18" charset="0"/>
+              </a:rPr>
+              <a:t>nar</a:t>
+            </a:r>
+            <a:r>
+              <a:rPr lang="es-MX" sz="2400" dirty="0">
+                <a:latin typeface="Times New Roman" panose="02020603050405020304" pitchFamily="18" charset="0"/>
+                <a:cs typeface="Times New Roman" panose="02020603050405020304" pitchFamily="18" charset="0"/>
+              </a:rPr>
+              <a:t>)</a:t>
+            </a:r>
+          </a:p>
           <a:p>
             <a:pPr marL="514350" indent="-514350">
               <a:buAutoNum type="arabicPeriod"/>
             </a:pPr>
             <a:r>
-              <a:rPr lang="es-MX" dirty="0"/>
-              <a:t>Primer cohete combustible solido</a:t>
+              <a:rPr lang="es-MX" sz="2400" dirty="0">
+                <a:latin typeface="Times New Roman" panose="02020603050405020304" pitchFamily="18" charset="0"/>
+                <a:cs typeface="Times New Roman" panose="02020603050405020304" pitchFamily="18" charset="0"/>
+              </a:rPr>
+              <a:t>Competencias</a:t>
             </a:r>
           </a:p>
           <a:p>
@@ -5377,55 +5591,350 @@
               <a:buAutoNum type="arabicPeriod"/>
             </a:pPr>
             <a:r>
-              <a:rPr lang="es-MX" dirty="0"/>
-              <a:t>El lanzamiento más utilizado</a:t>
-            </a:r>
-          </a:p>
-          <a:p>
-            <a:pPr marL="514350" indent="-514350">
-              <a:buAutoNum type="arabicPeriod"/>
-            </a:pPr>
-            <a:r>
-              <a:rPr lang="es-MX" dirty="0"/>
-              <a:t>Organizaciones (</a:t>
-            </a:r>
-            <a:r>
-              <a:rPr lang="es-MX" dirty="0" err="1"/>
-              <a:t>tripoli</a:t>
-            </a:r>
-            <a:r>
-              <a:rPr lang="es-MX" dirty="0"/>
-              <a:t>, </a:t>
-            </a:r>
-            <a:r>
-              <a:rPr lang="es-MX" dirty="0" err="1"/>
-              <a:t>nar</a:t>
-            </a:r>
-            <a:r>
-              <a:rPr lang="es-MX" dirty="0"/>
-              <a:t>)</a:t>
-            </a:r>
-          </a:p>
-          <a:p>
-            <a:pPr marL="514350" indent="-514350">
-              <a:buAutoNum type="arabicPeriod"/>
-            </a:pPr>
-            <a:r>
-              <a:rPr lang="es-MX" dirty="0"/>
-              <a:t>Competencias</a:t>
-            </a:r>
-          </a:p>
-          <a:p>
-            <a:pPr marL="514350" indent="-514350">
-              <a:buAutoNum type="arabicPeriod"/>
-            </a:pPr>
-            <a:r>
-              <a:rPr lang="es-MX" dirty="0"/>
+              <a:rPr lang="es-MX" sz="2400" dirty="0">
+                <a:latin typeface="Times New Roman" panose="02020603050405020304" pitchFamily="18" charset="0"/>
+                <a:cs typeface="Times New Roman" panose="02020603050405020304" pitchFamily="18" charset="0"/>
+              </a:rPr>
               <a:t>R.N.</a:t>
             </a:r>
           </a:p>
         </p:txBody>
       </p:sp>
+      <p:pic>
+        <p:nvPicPr>
+          <p:cNvPr id="4" name="Picture 3"/>
+          <p:cNvPicPr>
+            <a:picLocks noChangeAspect="1"/>
+          </p:cNvPicPr>
+          <p:nvPr/>
+        </p:nvPicPr>
+        <p:blipFill>
+          <a:blip r:embed="rId2"/>
+          <a:stretch>
+            <a:fillRect/>
+          </a:stretch>
+        </p:blipFill>
+        <p:spPr>
+          <a:xfrm rot="5400000">
+            <a:off x="6612325" y="1278326"/>
+            <a:ext cx="6844254" cy="4315097"/>
+          </a:xfrm>
+          <a:prstGeom prst="rect">
+            <a:avLst/>
+          </a:prstGeom>
+        </p:spPr>
+      </p:pic>
+      <p:pic>
+        <p:nvPicPr>
+          <p:cNvPr id="1029" name="Picture 5" descr="https://upload.wikimedia.org/wikipedia/commons/thumb/c/ca/Tripoli-rocketry-association.svg/250px-Tripoli-rocketry-association.svg.png"/>
+          <p:cNvPicPr>
+            <a:picLocks noChangeAspect="1" noChangeArrowheads="1"/>
+          </p:cNvPicPr>
+          <p:nvPr/>
+        </p:nvPicPr>
+        <p:blipFill>
+          <a:blip r:embed="rId3">
+            <a:extLst>
+              <a:ext uri="{28A0092B-C50C-407E-A947-70E740481C1C}">
+                <a14:useLocalDpi xmlns:a14="http://schemas.microsoft.com/office/drawing/2010/main" val="0"/>
+              </a:ext>
+            </a:extLst>
+          </a:blip>
+          <a:srcRect/>
+          <a:stretch>
+            <a:fillRect/>
+          </a:stretch>
+        </p:blipFill>
+        <p:spPr bwMode="auto">
+          <a:xfrm>
+            <a:off x="4357551" y="70600"/>
+            <a:ext cx="2381250" cy="1190625"/>
+          </a:xfrm>
+          <a:prstGeom prst="rect">
+            <a:avLst/>
+          </a:prstGeom>
+          <a:noFill/>
+          <a:extLst>
+            <a:ext uri="{909E8E84-426E-40DD-AFC4-6F175D3DCCD1}">
+              <a14:hiddenFill xmlns:a14="http://schemas.microsoft.com/office/drawing/2010/main">
+                <a:solidFill>
+                  <a:srgbClr val="FFFFFF"/>
+                </a:solidFill>
+              </a14:hiddenFill>
+            </a:ext>
+          </a:extLst>
+        </p:spPr>
+      </p:pic>
+      <p:pic>
+        <p:nvPicPr>
+          <p:cNvPr id="1031" name="Picture 7" descr="https://upload.wikimedia.org/wikipedia/commons/thumb/a/a9/National-association-of-rocketry.svg/250px-National-association-of-rocketry.svg.png"/>
+          <p:cNvPicPr>
+            <a:picLocks noChangeAspect="1" noChangeArrowheads="1"/>
+          </p:cNvPicPr>
+          <p:nvPr/>
+        </p:nvPicPr>
+        <p:blipFill>
+          <a:blip r:embed="rId4" cstate="print">
+            <a:extLst>
+              <a:ext uri="{28A0092B-C50C-407E-A947-70E740481C1C}">
+                <a14:useLocalDpi xmlns:a14="http://schemas.microsoft.com/office/drawing/2010/main" val="0"/>
+              </a:ext>
+            </a:extLst>
+          </a:blip>
+          <a:srcRect/>
+          <a:stretch>
+            <a:fillRect/>
+          </a:stretch>
+        </p:blipFill>
+        <p:spPr bwMode="auto">
+          <a:xfrm>
+            <a:off x="6747667" y="72664"/>
+            <a:ext cx="930094" cy="1465829"/>
+          </a:xfrm>
+          <a:prstGeom prst="rect">
+            <a:avLst/>
+          </a:prstGeom>
+          <a:noFill/>
+          <a:extLst>
+            <a:ext uri="{909E8E84-426E-40DD-AFC4-6F175D3DCCD1}">
+              <a14:hiddenFill xmlns:a14="http://schemas.microsoft.com/office/drawing/2010/main">
+                <a:solidFill>
+                  <a:srgbClr val="FFFFFF"/>
+                </a:solidFill>
+              </a14:hiddenFill>
+            </a:ext>
+          </a:extLst>
+        </p:spPr>
+      </p:pic>
+      <p:pic>
+        <p:nvPicPr>
+          <p:cNvPr id="1033" name="Picture 9" descr="https://upload.wikimedia.org/wikipedia/commons/thumb/c/c8/Seal_of_the_United_States_Federal_Aviation_Administration.svg/250px-Seal_of_the_United_States_Federal_Aviation_Administration.svg.png"/>
+          <p:cNvPicPr>
+            <a:picLocks noChangeAspect="1" noChangeArrowheads="1"/>
+          </p:cNvPicPr>
+          <p:nvPr/>
+        </p:nvPicPr>
+        <p:blipFill>
+          <a:blip r:embed="rId5" cstate="print">
+            <a:extLst>
+              <a:ext uri="{28A0092B-C50C-407E-A947-70E740481C1C}">
+                <a14:useLocalDpi xmlns:a14="http://schemas.microsoft.com/office/drawing/2010/main" val="0"/>
+              </a:ext>
+            </a:extLst>
+          </a:blip>
+          <a:srcRect/>
+          <a:stretch>
+            <a:fillRect/>
+          </a:stretch>
+        </p:blipFill>
+        <p:spPr bwMode="auto">
+          <a:xfrm>
+            <a:off x="3471698" y="243660"/>
+            <a:ext cx="1017565" cy="1017565"/>
+          </a:xfrm>
+          <a:prstGeom prst="rect">
+            <a:avLst/>
+          </a:prstGeom>
+          <a:noFill/>
+          <a:extLst>
+            <a:ext uri="{909E8E84-426E-40DD-AFC4-6F175D3DCCD1}">
+              <a14:hiddenFill xmlns:a14="http://schemas.microsoft.com/office/drawing/2010/main">
+                <a:solidFill>
+                  <a:srgbClr val="FFFFFF"/>
+                </a:solidFill>
+              </a14:hiddenFill>
+            </a:ext>
+          </a:extLst>
+        </p:spPr>
+      </p:pic>
+      <p:pic>
+        <p:nvPicPr>
+          <p:cNvPr id="1035" name="Picture 11" descr="UKRA Logo"/>
+          <p:cNvPicPr>
+            <a:picLocks noChangeAspect="1" noChangeArrowheads="1"/>
+          </p:cNvPicPr>
+          <p:nvPr/>
+        </p:nvPicPr>
+        <p:blipFill>
+          <a:blip r:embed="rId6" cstate="print">
+            <a:extLst>
+              <a:ext uri="{28A0092B-C50C-407E-A947-70E740481C1C}">
+                <a14:useLocalDpi xmlns:a14="http://schemas.microsoft.com/office/drawing/2010/main" val="0"/>
+              </a:ext>
+            </a:extLst>
+          </a:blip>
+          <a:srcRect/>
+          <a:stretch>
+            <a:fillRect/>
+          </a:stretch>
+        </p:blipFill>
+        <p:spPr bwMode="auto">
+          <a:xfrm>
+            <a:off x="7478619" y="160088"/>
+            <a:ext cx="885825" cy="885825"/>
+          </a:xfrm>
+          <a:prstGeom prst="rect">
+            <a:avLst/>
+          </a:prstGeom>
+          <a:noFill/>
+          <a:extLst>
+            <a:ext uri="{909E8E84-426E-40DD-AFC4-6F175D3DCCD1}">
+              <a14:hiddenFill xmlns:a14="http://schemas.microsoft.com/office/drawing/2010/main">
+                <a:solidFill>
+                  <a:srgbClr val="FFFFFF"/>
+                </a:solidFill>
+              </a14:hiddenFill>
+            </a:ext>
+          </a:extLst>
+        </p:spPr>
+      </p:pic>
+      <p:pic>
+        <p:nvPicPr>
+          <p:cNvPr id="1037" name="Picture 13" descr="Spaceport America"/>
+          <p:cNvPicPr>
+            <a:picLocks noChangeAspect="1" noChangeArrowheads="1"/>
+          </p:cNvPicPr>
+          <p:nvPr/>
+        </p:nvPicPr>
+        <p:blipFill>
+          <a:blip r:embed="rId7">
+            <a:extLst>
+              <a:ext uri="{28A0092B-C50C-407E-A947-70E740481C1C}">
+                <a14:useLocalDpi xmlns:a14="http://schemas.microsoft.com/office/drawing/2010/main" val="0"/>
+              </a:ext>
+            </a:extLst>
+          </a:blip>
+          <a:srcRect/>
+          <a:stretch>
+            <a:fillRect/>
+          </a:stretch>
+        </p:blipFill>
+        <p:spPr bwMode="auto">
+          <a:xfrm>
+            <a:off x="4346596" y="5710193"/>
+            <a:ext cx="2866118" cy="807290"/>
+          </a:xfrm>
+          <a:prstGeom prst="rect">
+            <a:avLst/>
+          </a:prstGeom>
+          <a:noFill/>
+          <a:extLst>
+            <a:ext uri="{909E8E84-426E-40DD-AFC4-6F175D3DCCD1}">
+              <a14:hiddenFill xmlns:a14="http://schemas.microsoft.com/office/drawing/2010/main">
+                <a:solidFill>
+                  <a:srgbClr val="FFFFFF"/>
+                </a:solidFill>
+              </a14:hiddenFill>
+            </a:ext>
+          </a:extLst>
+        </p:spPr>
+      </p:pic>
+      <p:pic>
+        <p:nvPicPr>
+          <p:cNvPr id="1039" name="Picture 15" descr="Picture"/>
+          <p:cNvPicPr>
+            <a:picLocks noChangeAspect="1" noChangeArrowheads="1"/>
+          </p:cNvPicPr>
+          <p:nvPr/>
+        </p:nvPicPr>
+        <p:blipFill>
+          <a:blip r:embed="rId8" cstate="print">
+            <a:extLst>
+              <a:ext uri="{28A0092B-C50C-407E-A947-70E740481C1C}">
+                <a14:useLocalDpi xmlns:a14="http://schemas.microsoft.com/office/drawing/2010/main" val="0"/>
+              </a:ext>
+            </a:extLst>
+          </a:blip>
+          <a:srcRect/>
+          <a:stretch>
+            <a:fillRect/>
+          </a:stretch>
+        </p:blipFill>
+        <p:spPr bwMode="auto">
+          <a:xfrm>
+            <a:off x="2448831" y="5150589"/>
+            <a:ext cx="4381241" cy="1119208"/>
+          </a:xfrm>
+          <a:prstGeom prst="rect">
+            <a:avLst/>
+          </a:prstGeom>
+          <a:noFill/>
+          <a:extLst>
+            <a:ext uri="{909E8E84-426E-40DD-AFC4-6F175D3DCCD1}">
+              <a14:hiddenFill xmlns:a14="http://schemas.microsoft.com/office/drawing/2010/main">
+                <a:solidFill>
+                  <a:srgbClr val="FFFFFF"/>
+                </a:solidFill>
+              </a14:hiddenFill>
+            </a:ext>
+          </a:extLst>
+        </p:spPr>
+      </p:pic>
+      <p:pic>
+        <p:nvPicPr>
+          <p:cNvPr id="8" name="Picture 7"/>
+          <p:cNvPicPr>
+            <a:picLocks noChangeAspect="1"/>
+          </p:cNvPicPr>
+          <p:nvPr/>
+        </p:nvPicPr>
+        <p:blipFill>
+          <a:blip r:embed="rId9"/>
+          <a:stretch>
+            <a:fillRect/>
+          </a:stretch>
+        </p:blipFill>
+        <p:spPr>
+          <a:xfrm>
+            <a:off x="6994128" y="5244336"/>
+            <a:ext cx="1000265" cy="1286054"/>
+          </a:xfrm>
+          <a:prstGeom prst="rect">
+            <a:avLst/>
+          </a:prstGeom>
+        </p:spPr>
+      </p:pic>
+      <p:pic>
+        <p:nvPicPr>
+          <p:cNvPr id="1041" name="Picture 17" descr="Latin American Space Challenge"/>
+          <p:cNvPicPr>
+            <a:picLocks noChangeAspect="1" noChangeArrowheads="1"/>
+          </p:cNvPicPr>
+          <p:nvPr/>
+        </p:nvPicPr>
+        <p:blipFill>
+          <a:blip r:embed="rId10">
+            <a:extLst>
+              <a:ext uri="{28A0092B-C50C-407E-A947-70E740481C1C}">
+                <a14:useLocalDpi xmlns:a14="http://schemas.microsoft.com/office/drawing/2010/main" val="0"/>
+              </a:ext>
+            </a:extLst>
+          </a:blip>
+          <a:srcRect/>
+          <a:stretch>
+            <a:fillRect/>
+          </a:stretch>
+        </p:blipFill>
+        <p:spPr bwMode="auto">
+          <a:xfrm>
+            <a:off x="3115400" y="5492762"/>
+            <a:ext cx="1242151" cy="1242151"/>
+          </a:xfrm>
+          <a:prstGeom prst="rect">
+            <a:avLst/>
+          </a:prstGeom>
+          <a:noFill/>
+          <a:extLst>
+            <a:ext uri="{909E8E84-426E-40DD-AFC4-6F175D3DCCD1}">
+              <a14:hiddenFill xmlns:a14="http://schemas.microsoft.com/office/drawing/2010/main">
+                <a:solidFill>
+                  <a:srgbClr val="FFFFFF"/>
+                </a:solidFill>
+              </a14:hiddenFill>
+            </a:ext>
+          </a:extLst>
+        </p:spPr>
+      </p:pic>
     </p:spTree>
     <p:extLst>
       <p:ext uri="{BB962C8B-B14F-4D97-AF65-F5344CB8AC3E}">
@@ -5454,7 +5963,7 @@
         <p:cNvPr id="1" name="">
           <a:extLst>
             <a:ext uri="{FF2B5EF4-FFF2-40B4-BE49-F238E27FC236}">
-              <a16:creationId xmlns="" xmlns:a16="http://schemas.microsoft.com/office/drawing/2014/main" id="{619A8279-F2C7-EF83-0B18-F69ED4157015}"/>
+              <a16:creationId xmlns:a16="http://schemas.microsoft.com/office/drawing/2014/main" xmlns="" id="{619A8279-F2C7-EF83-0B18-F69ED4157015}"/>
             </a:ext>
           </a:extLst>
         </p:cNvPr>
@@ -5474,7 +5983,7 @@
           <p:cNvPr id="2" name="Título 1">
             <a:extLst>
               <a:ext uri="{FF2B5EF4-FFF2-40B4-BE49-F238E27FC236}">
-                <a16:creationId xmlns="" xmlns:a16="http://schemas.microsoft.com/office/drawing/2014/main" id="{20D59896-C85B-852E-698C-D506FB62DF06}"/>
+                <a16:creationId xmlns:a16="http://schemas.microsoft.com/office/drawing/2014/main" xmlns="" id="{20D59896-C85B-852E-698C-D506FB62DF06}"/>
               </a:ext>
             </a:extLst>
           </p:cNvPr>
@@ -5493,7 +6002,10 @@
           <a:lstStyle/>
           <a:p>
             <a:r>
-              <a:rPr lang="es-MX" sz="3600" dirty="0"/>
+              <a:rPr lang="es-MX" sz="3400" dirty="0">
+                <a:latin typeface="Times New Roman" panose="02020603050405020304" pitchFamily="18" charset="0"/>
+                <a:cs typeface="Times New Roman" panose="02020603050405020304" pitchFamily="18" charset="0"/>
+              </a:rPr>
               <a:t>Metodología – Puntos de diseño</a:t>
             </a:r>
           </a:p>
@@ -5504,7 +6016,7 @@
           <p:cNvPr id="3" name="Marcador de contenido 2">
             <a:extLst>
               <a:ext uri="{FF2B5EF4-FFF2-40B4-BE49-F238E27FC236}">
-                <a16:creationId xmlns="" xmlns:a16="http://schemas.microsoft.com/office/drawing/2014/main" id="{DE950F92-179A-6A18-9630-BAB1FD13673F}"/>
+                <a16:creationId xmlns:a16="http://schemas.microsoft.com/office/drawing/2014/main" xmlns="" id="{DE950F92-179A-6A18-9630-BAB1FD13673F}"/>
               </a:ext>
             </a:extLst>
           </p:cNvPr>
@@ -5592,7 +6104,7 @@
           <p:cNvPr id="4" name="Marcador de contenido 3">
             <a:extLst>
               <a:ext uri="{FF2B5EF4-FFF2-40B4-BE49-F238E27FC236}">
-                <a16:creationId xmlns="" xmlns:a16="http://schemas.microsoft.com/office/drawing/2014/main" id="{A5CEACF8-E932-108E-7ABE-547DAAA851ED}"/>
+                <a16:creationId xmlns:a16="http://schemas.microsoft.com/office/drawing/2014/main" xmlns="" id="{A5CEACF8-E932-108E-7ABE-547DAAA851ED}"/>
               </a:ext>
             </a:extLst>
           </p:cNvPr>
@@ -5757,7 +6269,7 @@
         <p:cNvPr id="1" name="">
           <a:extLst>
             <a:ext uri="{FF2B5EF4-FFF2-40B4-BE49-F238E27FC236}">
-              <a16:creationId xmlns="" xmlns:a16="http://schemas.microsoft.com/office/drawing/2014/main" id="{BE571F52-05EF-1021-3347-CDB2E8EB7C99}"/>
+              <a16:creationId xmlns:a16="http://schemas.microsoft.com/office/drawing/2014/main" xmlns="" id="{BE571F52-05EF-1021-3347-CDB2E8EB7C99}"/>
             </a:ext>
           </a:extLst>
         </p:cNvPr>
@@ -5777,7 +6289,7 @@
           <p:cNvPr id="2" name="Título 1">
             <a:extLst>
               <a:ext uri="{FF2B5EF4-FFF2-40B4-BE49-F238E27FC236}">
-                <a16:creationId xmlns="" xmlns:a16="http://schemas.microsoft.com/office/drawing/2014/main" id="{5DF2C60B-4C6E-7437-4245-1CC0A26AA7B3}"/>
+                <a16:creationId xmlns:a16="http://schemas.microsoft.com/office/drawing/2014/main" xmlns="" id="{5DF2C60B-4C6E-7437-4245-1CC0A26AA7B3}"/>
               </a:ext>
             </a:extLst>
           </p:cNvPr>
@@ -5807,7 +6319,7 @@
           <p:cNvPr id="6" name="Marcador de contenido 3">
             <a:extLst>
               <a:ext uri="{FF2B5EF4-FFF2-40B4-BE49-F238E27FC236}">
-                <a16:creationId xmlns="" xmlns:a16="http://schemas.microsoft.com/office/drawing/2014/main" id="{A5CEACF8-E932-108E-7ABE-547DAAA851ED}"/>
+                <a16:creationId xmlns:a16="http://schemas.microsoft.com/office/drawing/2014/main" xmlns="" id="{A5CEACF8-E932-108E-7ABE-547DAAA851ED}"/>
               </a:ext>
             </a:extLst>
           </p:cNvPr>
@@ -5977,7 +6489,7 @@
         <p:cNvPr id="1" name="">
           <a:extLst>
             <a:ext uri="{FF2B5EF4-FFF2-40B4-BE49-F238E27FC236}">
-              <a16:creationId xmlns="" xmlns:a16="http://schemas.microsoft.com/office/drawing/2014/main" id="{BAA8E253-6747-9B1F-FBE9-E6CD87C5A445}"/>
+              <a16:creationId xmlns:a16="http://schemas.microsoft.com/office/drawing/2014/main" xmlns="" id="{BAA8E253-6747-9B1F-FBE9-E6CD87C5A445}"/>
             </a:ext>
           </a:extLst>
         </p:cNvPr>
@@ -5997,7 +6509,7 @@
           <p:cNvPr id="2" name="Título 1">
             <a:extLst>
               <a:ext uri="{FF2B5EF4-FFF2-40B4-BE49-F238E27FC236}">
-                <a16:creationId xmlns="" xmlns:a16="http://schemas.microsoft.com/office/drawing/2014/main" id="{6396FCE1-269E-47E7-6B0B-83CB1C803157}"/>
+                <a16:creationId xmlns:a16="http://schemas.microsoft.com/office/drawing/2014/main" xmlns="" id="{6396FCE1-269E-47E7-6B0B-83CB1C803157}"/>
               </a:ext>
             </a:extLst>
           </p:cNvPr>
@@ -6027,7 +6539,7 @@
           <p:cNvPr id="3" name="Marcador de contenido 2">
             <a:extLst>
               <a:ext uri="{FF2B5EF4-FFF2-40B4-BE49-F238E27FC236}">
-                <a16:creationId xmlns="" xmlns:a16="http://schemas.microsoft.com/office/drawing/2014/main" id="{65EDB4A7-80AE-EB79-5B23-32C347FD2312}"/>
+                <a16:creationId xmlns:a16="http://schemas.microsoft.com/office/drawing/2014/main" xmlns="" id="{65EDB4A7-80AE-EB79-5B23-32C347FD2312}"/>
               </a:ext>
             </a:extLst>
           </p:cNvPr>
@@ -6056,7 +6568,7 @@
           <p:cNvPr id="4" name="Marcador de contenido 3">
             <a:extLst>
               <a:ext uri="{FF2B5EF4-FFF2-40B4-BE49-F238E27FC236}">
-                <a16:creationId xmlns="" xmlns:a16="http://schemas.microsoft.com/office/drawing/2014/main" id="{1D6431B4-69A1-CB17-CB70-D9632CC15269}"/>
+                <a16:creationId xmlns:a16="http://schemas.microsoft.com/office/drawing/2014/main" xmlns="" id="{1D6431B4-69A1-CB17-CB70-D9632CC15269}"/>
               </a:ext>
             </a:extLst>
           </p:cNvPr>
@@ -6124,7 +6636,7 @@
         <p:cNvPr id="1" name="">
           <a:extLst>
             <a:ext uri="{FF2B5EF4-FFF2-40B4-BE49-F238E27FC236}">
-              <a16:creationId xmlns="" xmlns:a16="http://schemas.microsoft.com/office/drawing/2014/main" id="{1B05AE3F-3E46-25CF-7795-E72C123AB1CA}"/>
+              <a16:creationId xmlns:a16="http://schemas.microsoft.com/office/drawing/2014/main" xmlns="" id="{1B05AE3F-3E46-25CF-7795-E72C123AB1CA}"/>
             </a:ext>
           </a:extLst>
         </p:cNvPr>
@@ -6144,7 +6656,7 @@
           <p:cNvPr id="2" name="Título 1">
             <a:extLst>
               <a:ext uri="{FF2B5EF4-FFF2-40B4-BE49-F238E27FC236}">
-                <a16:creationId xmlns="" xmlns:a16="http://schemas.microsoft.com/office/drawing/2014/main" id="{D86BF721-CFA0-0B79-12AE-967BA8A80533}"/>
+                <a16:creationId xmlns:a16="http://schemas.microsoft.com/office/drawing/2014/main" xmlns="" id="{D86BF721-CFA0-0B79-12AE-967BA8A80533}"/>
               </a:ext>
             </a:extLst>
           </p:cNvPr>
@@ -6174,7 +6686,7 @@
           <p:cNvPr id="3" name="Marcador de contenido 2">
             <a:extLst>
               <a:ext uri="{FF2B5EF4-FFF2-40B4-BE49-F238E27FC236}">
-                <a16:creationId xmlns="" xmlns:a16="http://schemas.microsoft.com/office/drawing/2014/main" id="{1A4A8CD1-135B-E096-AE71-BC1C655CF49F}"/>
+                <a16:creationId xmlns:a16="http://schemas.microsoft.com/office/drawing/2014/main" xmlns="" id="{1A4A8CD1-135B-E096-AE71-BC1C655CF49F}"/>
               </a:ext>
             </a:extLst>
           </p:cNvPr>
@@ -6203,7 +6715,7 @@
           <p:cNvPr id="4" name="Marcador de contenido 3">
             <a:extLst>
               <a:ext uri="{FF2B5EF4-FFF2-40B4-BE49-F238E27FC236}">
-                <a16:creationId xmlns="" xmlns:a16="http://schemas.microsoft.com/office/drawing/2014/main" id="{8A49EB46-BCFB-0531-809D-2CF4707CCB6C}"/>
+                <a16:creationId xmlns:a16="http://schemas.microsoft.com/office/drawing/2014/main" xmlns="" id="{8A49EB46-BCFB-0531-809D-2CF4707CCB6C}"/>
               </a:ext>
             </a:extLst>
           </p:cNvPr>

</xml_diff>